<commit_message>
Añadida parte de Weka a la presentación final
</commit_message>
<xml_diff>
--- a/docs/PresentacionFinal.pptx
+++ b/docs/PresentacionFinal.pptx
@@ -15,6 +15,9 @@
     <p:sldId id="263" r:id="rId9"/>
     <p:sldId id="264" r:id="rId10"/>
     <p:sldId id="265" r:id="rId11"/>
+    <p:sldId id="266" r:id="rId12"/>
+    <p:sldId id="267" r:id="rId13"/>
+    <p:sldId id="268" r:id="rId14"/>
   </p:sldIdLst>
   <p:sldSz cx="12192000" cy="6858000"/>
   <p:notesSz cx="6858000" cy="9144000"/>
@@ -261,7 +264,7 @@
           <a:p>
             <a:fld id="{B951A33D-190D-42DB-9BC7-255E6333FEAF}" type="datetimeFigureOut">
               <a:rPr lang="es-ES" smtClean="0"/>
-              <a:t>10/12/2016</a:t>
+              <a:t>11/12/2016</a:t>
             </a:fld>
             <a:endParaRPr lang="es-ES"/>
           </a:p>
@@ -429,7 +432,7 @@
           <a:p>
             <a:fld id="{B951A33D-190D-42DB-9BC7-255E6333FEAF}" type="datetimeFigureOut">
               <a:rPr lang="es-ES" smtClean="0"/>
-              <a:t>10/12/2016</a:t>
+              <a:t>11/12/2016</a:t>
             </a:fld>
             <a:endParaRPr lang="es-ES"/>
           </a:p>
@@ -607,7 +610,7 @@
           <a:p>
             <a:fld id="{B951A33D-190D-42DB-9BC7-255E6333FEAF}" type="datetimeFigureOut">
               <a:rPr lang="es-ES" smtClean="0"/>
-              <a:t>10/12/2016</a:t>
+              <a:t>11/12/2016</a:t>
             </a:fld>
             <a:endParaRPr lang="es-ES"/>
           </a:p>
@@ -775,7 +778,7 @@
           <a:p>
             <a:fld id="{B951A33D-190D-42DB-9BC7-255E6333FEAF}" type="datetimeFigureOut">
               <a:rPr lang="es-ES" smtClean="0"/>
-              <a:t>10/12/2016</a:t>
+              <a:t>11/12/2016</a:t>
             </a:fld>
             <a:endParaRPr lang="es-ES"/>
           </a:p>
@@ -1020,7 +1023,7 @@
           <a:p>
             <a:fld id="{B951A33D-190D-42DB-9BC7-255E6333FEAF}" type="datetimeFigureOut">
               <a:rPr lang="es-ES" smtClean="0"/>
-              <a:t>10/12/2016</a:t>
+              <a:t>11/12/2016</a:t>
             </a:fld>
             <a:endParaRPr lang="es-ES"/>
           </a:p>
@@ -1249,7 +1252,7 @@
           <a:p>
             <a:fld id="{B951A33D-190D-42DB-9BC7-255E6333FEAF}" type="datetimeFigureOut">
               <a:rPr lang="es-ES" smtClean="0"/>
-              <a:t>10/12/2016</a:t>
+              <a:t>11/12/2016</a:t>
             </a:fld>
             <a:endParaRPr lang="es-ES"/>
           </a:p>
@@ -1613,7 +1616,7 @@
           <a:p>
             <a:fld id="{B951A33D-190D-42DB-9BC7-255E6333FEAF}" type="datetimeFigureOut">
               <a:rPr lang="es-ES" smtClean="0"/>
-              <a:t>10/12/2016</a:t>
+              <a:t>11/12/2016</a:t>
             </a:fld>
             <a:endParaRPr lang="es-ES"/>
           </a:p>
@@ -1730,7 +1733,7 @@
           <a:p>
             <a:fld id="{B951A33D-190D-42DB-9BC7-255E6333FEAF}" type="datetimeFigureOut">
               <a:rPr lang="es-ES" smtClean="0"/>
-              <a:t>10/12/2016</a:t>
+              <a:t>11/12/2016</a:t>
             </a:fld>
             <a:endParaRPr lang="es-ES"/>
           </a:p>
@@ -1825,7 +1828,7 @@
           <a:p>
             <a:fld id="{B951A33D-190D-42DB-9BC7-255E6333FEAF}" type="datetimeFigureOut">
               <a:rPr lang="es-ES" smtClean="0"/>
-              <a:t>10/12/2016</a:t>
+              <a:t>11/12/2016</a:t>
             </a:fld>
             <a:endParaRPr lang="es-ES"/>
           </a:p>
@@ -2100,7 +2103,7 @@
           <a:p>
             <a:fld id="{B951A33D-190D-42DB-9BC7-255E6333FEAF}" type="datetimeFigureOut">
               <a:rPr lang="es-ES" smtClean="0"/>
-              <a:t>10/12/2016</a:t>
+              <a:t>11/12/2016</a:t>
             </a:fld>
             <a:endParaRPr lang="es-ES"/>
           </a:p>
@@ -2352,7 +2355,7 @@
           <a:p>
             <a:fld id="{B951A33D-190D-42DB-9BC7-255E6333FEAF}" type="datetimeFigureOut">
               <a:rPr lang="es-ES" smtClean="0"/>
-              <a:t>10/12/2016</a:t>
+              <a:t>11/12/2016</a:t>
             </a:fld>
             <a:endParaRPr lang="es-ES"/>
           </a:p>
@@ -2563,7 +2566,7 @@
           <a:p>
             <a:fld id="{B951A33D-190D-42DB-9BC7-255E6333FEAF}" type="datetimeFigureOut">
               <a:rPr lang="es-ES" smtClean="0"/>
-              <a:t>10/12/2016</a:t>
+              <a:t>11/12/2016</a:t>
             </a:fld>
             <a:endParaRPr lang="es-ES"/>
           </a:p>
@@ -3670,7 +3673,7 @@
         </p:spPr>
         <p:txBody>
           <a:bodyPr>
-            <a:normAutofit/>
+            <a:normAutofit fontScale="92500" lnSpcReduction="10000"/>
           </a:bodyPr>
           <a:lstStyle/>
           <a:p>
@@ -3683,7 +3686,21 @@
             <a:pPr lvl="1"/>
             <a:r>
               <a:rPr lang="es-ES" sz="2800" dirty="0"/>
-              <a:t>Lo que hayáis usado</a:t>
+              <a:t>J48</a:t>
+            </a:r>
+          </a:p>
+          <a:p>
+            <a:pPr lvl="1"/>
+            <a:r>
+              <a:rPr lang="es-ES" sz="2800" dirty="0"/>
+              <a:t>LMT</a:t>
+            </a:r>
+          </a:p>
+          <a:p>
+            <a:pPr lvl="1"/>
+            <a:r>
+              <a:rPr lang="es-ES" sz="2800" dirty="0"/>
+              <a:t>Redes de neuronas</a:t>
             </a:r>
           </a:p>
           <a:p>
@@ -3763,7 +3780,7 @@
 </p:sld>
 </file>
 
-<file path=ppt/slides/slide2.xml><?xml version="1.0" encoding="utf-8"?>
+<file path=ppt/slides/slide11.xml><?xml version="1.0" encoding="utf-8"?>
 <p:sld xmlns:a="http://schemas.openxmlformats.org/drawingml/2006/main" xmlns:r="http://schemas.openxmlformats.org/officeDocument/2006/relationships" xmlns:p="http://schemas.openxmlformats.org/presentationml/2006/main">
   <p:cSld>
     <p:spTree>
@@ -4058,7 +4075,7 @@
           <a:p>
             <a:r>
               <a:rPr lang="es-ES" dirty="0"/>
-              <a:t>OBJETIVO</a:t>
+              <a:t>WEKA</a:t>
             </a:r>
           </a:p>
         </p:txBody>
@@ -4086,63 +4103,67 @@
           <a:lstStyle/>
           <a:p>
             <a:r>
-              <a:rPr lang="es-ES" sz="2000" dirty="0"/>
-              <a:t>Nuestro objetivo será estudiar la posibilidad de predecir si la bolsa subirá o bajará al día siguiente</a:t>
+              <a:rPr lang="es-ES" sz="2800" dirty="0"/>
+              <a:t>Hemos utilizado tres algoritmos clasificadores:</a:t>
             </a:r>
           </a:p>
           <a:p>
             <a:pPr lvl="1"/>
             <a:r>
-              <a:rPr lang="es-ES" sz="1600" dirty="0"/>
-              <a:t>Ibex 35</a:t>
+              <a:rPr lang="es-ES" dirty="0"/>
+              <a:t>J48</a:t>
             </a:r>
           </a:p>
           <a:p>
             <a:pPr lvl="1"/>
             <a:r>
-              <a:rPr lang="es-ES" sz="1600" dirty="0"/>
-              <a:t>Objetivo complicado, pero con grandes recompensas</a:t>
-            </a:r>
-          </a:p>
-          <a:p>
-            <a:r>
-              <a:rPr lang="es-ES" sz="2000" dirty="0"/>
-              <a:t>En Python, con la plataforma Anaconda</a:t>
+              <a:rPr lang="es-ES" dirty="0"/>
+              <a:t>LMT</a:t>
             </a:r>
           </a:p>
           <a:p>
             <a:pPr lvl="1"/>
             <a:r>
-              <a:rPr lang="es-ES" sz="1600" dirty="0"/>
-              <a:t>Distribución de Python</a:t>
+              <a:rPr lang="es-ES" dirty="0" err="1"/>
+              <a:t>Perceptrón</a:t>
+            </a:r>
+            <a:r>
+              <a:rPr lang="es-ES" dirty="0"/>
+              <a:t> multicapa</a:t>
+            </a:r>
+          </a:p>
+          <a:p>
+            <a:r>
+              <a:rPr lang="es-ES" dirty="0"/>
+              <a:t>Como entrada tenemos los archivos .</a:t>
+            </a:r>
+            <a:r>
+              <a:rPr lang="es-ES" dirty="0" err="1"/>
+              <a:t>arff</a:t>
+            </a:r>
+            <a:r>
+              <a:rPr lang="es-ES" dirty="0"/>
+              <a:t> de los datos recogidos</a:t>
             </a:r>
           </a:p>
           <a:p>
             <a:pPr lvl="1"/>
             <a:r>
-              <a:rPr lang="es-ES" sz="1600" dirty="0"/>
-              <a:t>Librerías de análisis y obtención de datos</a:t>
-            </a:r>
-          </a:p>
-          <a:p>
-            <a:r>
-              <a:rPr lang="es-ES" sz="2000" dirty="0"/>
-              <a:t>Los datos serán posteriormente </a:t>
-            </a:r>
-            <a:r>
-              <a:rPr lang="es-ES" sz="2000" dirty="0" err="1"/>
-              <a:t>preprocesados</a:t>
-            </a:r>
-            <a:r>
-              <a:rPr lang="es-ES" sz="2000" dirty="0"/>
-              <a:t> y estudiados por nosotros.</a:t>
+              <a:rPr lang="es-ES" dirty="0"/>
+              <a:t>Previsión a un día</a:t>
             </a:r>
           </a:p>
           <a:p>
             <a:pPr lvl="1"/>
             <a:r>
-              <a:rPr lang="es-ES" sz="1600" dirty="0"/>
-              <a:t>Redes de neuronas artificiales</a:t>
+              <a:rPr lang="es-ES" dirty="0"/>
+              <a:t>Previsión a cinco días</a:t>
+            </a:r>
+          </a:p>
+          <a:p>
+            <a:r>
+              <a:rPr lang="es-ES" dirty="0"/>
+              <a:t>Sin filtros aplicados</a:t>
             </a:r>
           </a:p>
         </p:txBody>
@@ -4150,7 +4171,7 @@
     </p:spTree>
     <p:extLst>
       <p:ext uri="{BB962C8B-B14F-4D97-AF65-F5344CB8AC3E}">
-        <p14:creationId xmlns:p14="http://schemas.microsoft.com/office/powerpoint/2010/main" val="162548143"/>
+        <p14:creationId xmlns:p14="http://schemas.microsoft.com/office/powerpoint/2010/main" val="3295904946"/>
       </p:ext>
     </p:extLst>
   </p:cSld>
@@ -4160,7 +4181,7 @@
 </p:sld>
 </file>
 
-<file path=ppt/slides/slide3.xml><?xml version="1.0" encoding="utf-8"?>
+<file path=ppt/slides/slide12.xml><?xml version="1.0" encoding="utf-8"?>
 <p:sld xmlns:a="http://schemas.openxmlformats.org/drawingml/2006/main" xmlns:r="http://schemas.openxmlformats.org/officeDocument/2006/relationships" xmlns:p="http://schemas.openxmlformats.org/presentationml/2006/main">
   <p:cSld>
     <p:spTree>
@@ -4177,178 +4198,223 @@
           <a:chExt cx="0" cy="0"/>
         </a:xfrm>
       </p:grpSpPr>
+      <p:sp>
+        <p:nvSpPr>
+          <p:cNvPr id="12" name="Rectangle 11"/>
+          <p:cNvSpPr>
+            <a:spLocks noGrp="1" noRot="1" noChangeAspect="1" noMove="1" noResize="1" noEditPoints="1" noAdjustHandles="1" noChangeArrowheads="1" noChangeShapeType="1" noTextEdit="1"/>
+          </p:cNvSpPr>
+          <p:nvPr>
+            <p:extLst>
+              <p:ext uri="{386F3935-93C4-4BCD-93E2-E3B085C9AB24}">
+                <p16:designElem xmlns:p16="http://schemas.microsoft.com/office/powerpoint/2015/main" val="1"/>
+              </p:ext>
+            </p:extLst>
+          </p:nvPr>
+        </p:nvSpPr>
+        <p:spPr bwMode="white">
+          <a:xfrm>
+            <a:off x="0" y="0"/>
+            <a:ext cx="12192000" cy="6858000"/>
+          </a:xfrm>
+          <a:prstGeom prst="rect">
+            <a:avLst/>
+          </a:prstGeom>
+          <a:solidFill>
+            <a:schemeClr val="bg1"/>
+          </a:solidFill>
+          <a:ln>
+            <a:noFill/>
+          </a:ln>
+          <a:effectLst/>
+        </p:spPr>
+      </p:sp>
+      <p:sp>
+        <p:nvSpPr>
+          <p:cNvPr id="13" name="Rectangle 12"/>
+          <p:cNvSpPr>
+            <a:spLocks noGrp="1" noRot="1" noChangeAspect="1" noMove="1" noResize="1" noEditPoints="1" noAdjustHandles="1" noChangeArrowheads="1" noChangeShapeType="1" noTextEdit="1"/>
+          </p:cNvSpPr>
+          <p:nvPr>
+            <p:extLst>
+              <p:ext uri="{386F3935-93C4-4BCD-93E2-E3B085C9AB24}">
+                <p16:designElem xmlns:p16="http://schemas.microsoft.com/office/powerpoint/2015/main" val="1"/>
+              </p:ext>
+            </p:extLst>
+          </p:nvPr>
+        </p:nvSpPr>
+        <p:spPr bwMode="ltGray">
+          <a:xfrm>
+            <a:off x="378068" y="4633546"/>
+            <a:ext cx="11438793" cy="1844256"/>
+          </a:xfrm>
+          <a:prstGeom prst="rect">
+            <a:avLst/>
+          </a:prstGeom>
+          <a:solidFill>
+            <a:schemeClr val="tx1">
+              <a:lumMod val="75000"/>
+              <a:lumOff val="25000"/>
+            </a:schemeClr>
+          </a:solidFill>
+          <a:ln w="127000" cap="sq" cmpd="thinThick">
+            <a:solidFill>
+              <a:schemeClr val="tx1">
+                <a:lumMod val="75000"/>
+                <a:lumOff val="25000"/>
+              </a:schemeClr>
+            </a:solidFill>
+          </a:ln>
+        </p:spPr>
+        <p:style>
+          <a:lnRef idx="2">
+            <a:schemeClr val="accent1">
+              <a:shade val="50000"/>
+            </a:schemeClr>
+          </a:lnRef>
+          <a:fillRef idx="1">
+            <a:schemeClr val="accent1"/>
+          </a:fillRef>
+          <a:effectRef idx="0">
+            <a:schemeClr val="accent1"/>
+          </a:effectRef>
+          <a:fontRef idx="minor">
+            <a:schemeClr val="lt1"/>
+          </a:fontRef>
+        </p:style>
+        <p:txBody>
+          <a:bodyPr rtlCol="0" anchor="ctr"/>
+          <a:lstStyle/>
+          <a:p>
+            <a:pPr algn="ctr"/>
+            <a:endParaRPr lang="en-US"/>
+          </a:p>
+        </p:txBody>
+      </p:sp>
+      <p:cxnSp>
+        <p:nvCxnSpPr>
+          <p:cNvPr id="14" name="Straight Connector 13"/>
+          <p:cNvCxnSpPr>
+            <a:cxnSpLocks noGrp="1" noRot="1" noChangeAspect="1" noMove="1" noResize="1" noEditPoints="1" noAdjustHandles="1" noChangeArrowheads="1" noChangeShapeType="1"/>
+          </p:cNvCxnSpPr>
+          <p:nvPr>
+            <p:extLst>
+              <p:ext uri="{386F3935-93C4-4BCD-93E2-E3B085C9AB24}">
+                <p16:designElem xmlns:p16="http://schemas.microsoft.com/office/powerpoint/2015/main" val="1"/>
+              </p:ext>
+            </p:extLst>
+          </p:nvPr>
+        </p:nvCxnSpPr>
+        <p:spPr>
+          <a:xfrm>
+            <a:off x="2209800" y="5738691"/>
+            <a:ext cx="7772400" cy="0"/>
+          </a:xfrm>
+          <a:prstGeom prst="line">
+            <a:avLst/>
+          </a:prstGeom>
+          <a:ln w="22225">
+            <a:solidFill>
+              <a:schemeClr val="bg1">
+                <a:lumMod val="85000"/>
+              </a:schemeClr>
+            </a:solidFill>
+          </a:ln>
+        </p:spPr>
+        <p:style>
+          <a:lnRef idx="1">
+            <a:schemeClr val="accent1"/>
+          </a:lnRef>
+          <a:fillRef idx="0">
+            <a:schemeClr val="accent1"/>
+          </a:fillRef>
+          <a:effectRef idx="0">
+            <a:schemeClr val="accent1"/>
+          </a:effectRef>
+          <a:fontRef idx="minor">
+            <a:schemeClr val="tx1"/>
+          </a:fontRef>
+        </p:style>
+      </p:cxnSp>
+      <p:cxnSp>
+        <p:nvCxnSpPr>
+          <p:cNvPr id="15" name="Straight Connector 14"/>
+          <p:cNvCxnSpPr>
+            <a:cxnSpLocks noGrp="1" noRot="1" noChangeAspect="1" noMove="1" noResize="1" noEditPoints="1" noAdjustHandles="1" noChangeArrowheads="1" noChangeShapeType="1"/>
+          </p:cNvCxnSpPr>
+          <p:nvPr>
+            <p:extLst>
+              <p:ext uri="{386F3935-93C4-4BCD-93E2-E3B085C9AB24}">
+                <p16:designElem xmlns:p16="http://schemas.microsoft.com/office/powerpoint/2015/main" val="1"/>
+              </p:ext>
+            </p:extLst>
+          </p:nvPr>
+        </p:nvCxnSpPr>
+        <p:spPr>
+          <a:xfrm>
+            <a:off x="4065689" y="477749"/>
+            <a:ext cx="0" cy="3657600"/>
+          </a:xfrm>
+          <a:prstGeom prst="line">
+            <a:avLst/>
+          </a:prstGeom>
+          <a:ln w="101600" cmpd="dbl">
+            <a:solidFill>
+              <a:schemeClr val="tx1">
+                <a:lumMod val="65000"/>
+                <a:lumOff val="35000"/>
+              </a:schemeClr>
+            </a:solidFill>
+          </a:ln>
+        </p:spPr>
+        <p:style>
+          <a:lnRef idx="1">
+            <a:schemeClr val="accent1"/>
+          </a:lnRef>
+          <a:fillRef idx="0">
+            <a:schemeClr val="accent1"/>
+          </a:fillRef>
+          <a:effectRef idx="0">
+            <a:schemeClr val="accent1"/>
+          </a:effectRef>
+          <a:fontRef idx="minor">
+            <a:schemeClr val="tx1"/>
+          </a:fontRef>
+        </p:style>
+      </p:cxnSp>
       <p:pic>
         <p:nvPicPr>
-          <p:cNvPr id="6" name="Marcador de contenido 3"/>
+          <p:cNvPr id="10" name="Imagen 9"/>
           <p:cNvPicPr>
             <a:picLocks noChangeAspect="1"/>
           </p:cNvPicPr>
           <p:nvPr/>
         </p:nvPicPr>
-        <p:blipFill rotWithShape="1">
+        <p:blipFill>
           <a:blip r:embed="rId2">
-            <a:alphaModFix amt="35000"/>
+            <a:extLst>
+              <a:ext uri="{28A0092B-C50C-407E-A947-70E740481C1C}">
+                <a14:useLocalDpi xmlns:a14="http://schemas.microsoft.com/office/drawing/2010/main" val="0"/>
+              </a:ext>
+            </a:extLst>
           </a:blip>
-          <a:srcRect t="4855" b="7935"/>
-          <a:stretch/>
+          <a:stretch>
+            <a:fillRect/>
+          </a:stretch>
         </p:blipFill>
         <p:spPr>
           <a:xfrm>
-            <a:off x="20" y="10"/>
-            <a:ext cx="12191980" cy="6857990"/>
+            <a:off x="8448038" y="1182929"/>
+            <a:ext cx="3425609" cy="1800216"/>
           </a:xfrm>
           <a:prstGeom prst="rect">
             <a:avLst/>
           </a:prstGeom>
         </p:spPr>
       </p:pic>
-      <p:sp>
-        <p:nvSpPr>
-          <p:cNvPr id="5" name="CuadroTexto 4"/>
-          <p:cNvSpPr txBox="1"/>
-          <p:nvPr/>
-        </p:nvSpPr>
-        <p:spPr>
-          <a:xfrm>
-            <a:off x="838200" y="1687153"/>
-            <a:ext cx="10515600" cy="3416320"/>
-          </a:xfrm>
-          <a:prstGeom prst="rect">
-            <a:avLst/>
-          </a:prstGeom>
-          <a:noFill/>
-        </p:spPr>
-        <p:txBody>
-          <a:bodyPr wrap="square" rtlCol="0">
-            <a:spAutoFit/>
-          </a:bodyPr>
-          <a:lstStyle/>
-          <a:p>
-            <a:r>
-              <a:rPr lang="es-ES" sz="2400" dirty="0"/>
-              <a:t>Vamos a obtener los datos históricos de diferentes plazas del mundo:</a:t>
-            </a:r>
-          </a:p>
-          <a:p>
-            <a:pPr marL="342900" indent="-342900">
-              <a:buFont typeface="Arial" panose="020B0604020202020204" pitchFamily="34" charset="0"/>
-              <a:buChar char="•"/>
-            </a:pPr>
-            <a:r>
-              <a:rPr lang="es-ES" sz="2400" dirty="0"/>
-              <a:t>IBEX35 (España)</a:t>
-            </a:r>
-          </a:p>
-          <a:p>
-            <a:pPr marL="342900" indent="-342900">
-              <a:buFont typeface="Arial" panose="020B0604020202020204" pitchFamily="34" charset="0"/>
-              <a:buChar char="•"/>
-            </a:pPr>
-            <a:r>
-              <a:rPr lang="es-ES" sz="2400" dirty="0"/>
-              <a:t>Dow Jones (Estados Unidos de América)</a:t>
-            </a:r>
-          </a:p>
-          <a:p>
-            <a:pPr marL="342900" indent="-342900">
-              <a:buFont typeface="Arial" panose="020B0604020202020204" pitchFamily="34" charset="0"/>
-              <a:buChar char="•"/>
-            </a:pPr>
-            <a:r>
-              <a:rPr lang="es-ES" sz="2400" dirty="0"/>
-              <a:t>Euro Stoxx50 (Común de Europa)</a:t>
-            </a:r>
-          </a:p>
-          <a:p>
-            <a:pPr marL="342900" indent="-342900">
-              <a:buFont typeface="Arial" panose="020B0604020202020204" pitchFamily="34" charset="0"/>
-              <a:buChar char="•"/>
-            </a:pPr>
-            <a:r>
-              <a:rPr lang="es-ES" sz="2400" dirty="0"/>
-              <a:t>Nikkei225 (Japón)</a:t>
-            </a:r>
-          </a:p>
-          <a:p>
-            <a:pPr marL="342900" indent="-342900">
-              <a:buFont typeface="Arial" panose="020B0604020202020204" pitchFamily="34" charset="0"/>
-              <a:buChar char="•"/>
-            </a:pPr>
-            <a:r>
-              <a:rPr lang="es-ES" sz="2400" dirty="0" err="1"/>
-              <a:t>Dax</a:t>
-            </a:r>
-            <a:r>
-              <a:rPr lang="es-ES" sz="2400" dirty="0"/>
-              <a:t> (Alemania)</a:t>
-            </a:r>
-          </a:p>
-          <a:p>
-            <a:pPr marL="342900" indent="-342900">
-              <a:buFont typeface="Arial" panose="020B0604020202020204" pitchFamily="34" charset="0"/>
-              <a:buChar char="•"/>
-            </a:pPr>
-            <a:r>
-              <a:rPr lang="es-ES" sz="2400" dirty="0" err="1"/>
-              <a:t>Cac</a:t>
-            </a:r>
-            <a:r>
-              <a:rPr lang="es-ES" sz="2400" dirty="0"/>
-              <a:t> 40 (Francia)</a:t>
-            </a:r>
-          </a:p>
-          <a:p>
-            <a:endParaRPr lang="es-ES" sz="2400" dirty="0"/>
-          </a:p>
-          <a:p>
-            <a:r>
-              <a:rPr lang="es-ES" sz="2400" dirty="0"/>
-              <a:t>Los datos los obtenemos gracias a la API de Python de </a:t>
-            </a:r>
-            <a:r>
-              <a:rPr lang="es-ES" sz="2400" dirty="0" err="1"/>
-              <a:t>Quandl</a:t>
-            </a:r>
-            <a:endParaRPr lang="es-ES" sz="2400" dirty="0"/>
-          </a:p>
-        </p:txBody>
-      </p:sp>
-      <p:sp>
-        <p:nvSpPr>
-          <p:cNvPr id="2" name="Título 1"/>
-          <p:cNvSpPr>
-            <a:spLocks noGrp="1"/>
-          </p:cNvSpPr>
-          <p:nvPr>
-            <p:ph type="title"/>
-          </p:nvPr>
-        </p:nvSpPr>
-        <p:spPr>
-          <a:xfrm>
-            <a:off x="838200" y="365125"/>
-            <a:ext cx="10515600" cy="1325563"/>
-          </a:xfrm>
-        </p:spPr>
-        <p:txBody>
-          <a:bodyPr>
-            <a:normAutofit/>
-          </a:bodyPr>
-          <a:lstStyle/>
-          <a:p>
-            <a:r>
-              <a:rPr lang="es-ES" dirty="0">
-                <a:solidFill>
-                  <a:srgbClr val="FFFFFF"/>
-                </a:solidFill>
-              </a:rPr>
-              <a:t>OBTENCION DE DATOS</a:t>
-            </a:r>
-          </a:p>
-        </p:txBody>
-      </p:sp>
       <p:pic>
         <p:nvPicPr>
-          <p:cNvPr id="11" name="Imagen 10"/>
+          <p:cNvPr id="8" name="Imagen 7"/>
           <p:cNvPicPr>
             <a:picLocks noChangeAspect="1"/>
           </p:cNvPicPr>
@@ -4368,28 +4434,257 @@
         </p:blipFill>
         <p:spPr>
           <a:xfrm>
-            <a:off x="5291547" y="4950011"/>
-            <a:ext cx="5555817" cy="1907989"/>
+            <a:off x="364014" y="1276622"/>
+            <a:ext cx="3433324" cy="1700488"/>
           </a:xfrm>
           <a:prstGeom prst="rect">
             <a:avLst/>
           </a:prstGeom>
         </p:spPr>
       </p:pic>
+      <p:cxnSp>
+        <p:nvCxnSpPr>
+          <p:cNvPr id="16" name="Straight Connector 15"/>
+          <p:cNvCxnSpPr>
+            <a:cxnSpLocks noGrp="1" noRot="1" noChangeAspect="1" noMove="1" noResize="1" noEditPoints="1" noAdjustHandles="1" noChangeArrowheads="1" noChangeShapeType="1"/>
+          </p:cNvCxnSpPr>
+          <p:nvPr>
+            <p:extLst>
+              <p:ext uri="{386F3935-93C4-4BCD-93E2-E3B085C9AB24}">
+                <p16:designElem xmlns:p16="http://schemas.microsoft.com/office/powerpoint/2015/main" val="1"/>
+              </p:ext>
+            </p:extLst>
+          </p:nvPr>
+        </p:nvCxnSpPr>
+        <p:spPr>
+          <a:xfrm>
+            <a:off x="8129685" y="477749"/>
+            <a:ext cx="0" cy="3657600"/>
+          </a:xfrm>
+          <a:prstGeom prst="line">
+            <a:avLst/>
+          </a:prstGeom>
+          <a:ln w="101600" cmpd="dbl">
+            <a:solidFill>
+              <a:schemeClr val="tx1">
+                <a:lumMod val="65000"/>
+                <a:lumOff val="35000"/>
+              </a:schemeClr>
+            </a:solidFill>
+          </a:ln>
+        </p:spPr>
+        <p:style>
+          <a:lnRef idx="1">
+            <a:schemeClr val="accent1"/>
+          </a:lnRef>
+          <a:fillRef idx="0">
+            <a:schemeClr val="accent1"/>
+          </a:fillRef>
+          <a:effectRef idx="0">
+            <a:schemeClr val="accent1"/>
+          </a:effectRef>
+          <a:fontRef idx="minor">
+            <a:schemeClr val="tx1"/>
+          </a:fontRef>
+        </p:style>
+      </p:cxnSp>
+      <p:pic>
+        <p:nvPicPr>
+          <p:cNvPr id="9" name="Imagen 8"/>
+          <p:cNvPicPr>
+            <a:picLocks noChangeAspect="1"/>
+          </p:cNvPicPr>
+          <p:nvPr/>
+        </p:nvPicPr>
+        <p:blipFill>
+          <a:blip r:embed="rId4">
+            <a:extLst>
+              <a:ext uri="{28A0092B-C50C-407E-A947-70E740481C1C}">
+                <a14:useLocalDpi xmlns:a14="http://schemas.microsoft.com/office/drawing/2010/main" val="0"/>
+              </a:ext>
+            </a:extLst>
+          </a:blip>
+          <a:stretch>
+            <a:fillRect/>
+          </a:stretch>
+        </p:blipFill>
+        <p:spPr>
+          <a:xfrm>
+            <a:off x="4463133" y="1174640"/>
+            <a:ext cx="3423916" cy="1808505"/>
+          </a:xfrm>
+          <a:prstGeom prst="rect">
+            <a:avLst/>
+          </a:prstGeom>
+        </p:spPr>
+      </p:pic>
+      <p:sp>
+        <p:nvSpPr>
+          <p:cNvPr id="2" name="Título 1"/>
+          <p:cNvSpPr>
+            <a:spLocks noGrp="1"/>
+          </p:cNvSpPr>
+          <p:nvPr>
+            <p:ph type="title"/>
+          </p:nvPr>
+        </p:nvSpPr>
+        <p:spPr>
+          <a:xfrm>
+            <a:off x="443648" y="4808244"/>
+            <a:ext cx="11139854" cy="930447"/>
+          </a:xfrm>
+        </p:spPr>
+        <p:txBody>
+          <a:bodyPr vert="horz" lIns="91440" tIns="45720" rIns="91440" bIns="45720" rtlCol="0" anchor="b">
+            <a:normAutofit/>
+          </a:bodyPr>
+          <a:lstStyle/>
+          <a:p>
+            <a:pPr algn="ctr"/>
+            <a:r>
+              <a:rPr lang="en-US" sz="5400" dirty="0">
+                <a:solidFill>
+                  <a:schemeClr val="bg1"/>
+                </a:solidFill>
+              </a:rPr>
+              <a:t>WEKA: </a:t>
+            </a:r>
+            <a:r>
+              <a:rPr lang="en-US" sz="5400" dirty="0" err="1">
+                <a:solidFill>
+                  <a:schemeClr val="bg1"/>
+                </a:solidFill>
+              </a:rPr>
+              <a:t>Previsión</a:t>
+            </a:r>
+            <a:r>
+              <a:rPr lang="en-US" sz="5400" dirty="0">
+                <a:solidFill>
+                  <a:schemeClr val="bg1"/>
+                </a:solidFill>
+              </a:rPr>
+              <a:t> a un </a:t>
+            </a:r>
+            <a:r>
+              <a:rPr lang="en-US" sz="5400" dirty="0" err="1">
+                <a:solidFill>
+                  <a:schemeClr val="bg1"/>
+                </a:solidFill>
+              </a:rPr>
+              <a:t>día</a:t>
+            </a:r>
+            <a:endParaRPr lang="en-US" sz="5400" dirty="0">
+              <a:solidFill>
+                <a:schemeClr val="bg1"/>
+              </a:solidFill>
+            </a:endParaRPr>
+          </a:p>
+        </p:txBody>
+      </p:sp>
+      <p:sp>
+        <p:nvSpPr>
+          <p:cNvPr id="18" name="CuadroTexto 17"/>
+          <p:cNvSpPr txBox="1"/>
+          <p:nvPr/>
+        </p:nvSpPr>
+        <p:spPr>
+          <a:xfrm>
+            <a:off x="320040" y="3498209"/>
+            <a:ext cx="3329171" cy="369332"/>
+          </a:xfrm>
+          <a:prstGeom prst="rect">
+            <a:avLst/>
+          </a:prstGeom>
+          <a:noFill/>
+        </p:spPr>
+        <p:txBody>
+          <a:bodyPr wrap="square" rtlCol="0">
+            <a:spAutoFit/>
+          </a:bodyPr>
+          <a:lstStyle/>
+          <a:p>
+            <a:pPr algn="ctr"/>
+            <a:r>
+              <a:rPr lang="es-ES" dirty="0"/>
+              <a:t>J48</a:t>
+            </a:r>
+          </a:p>
+        </p:txBody>
+      </p:sp>
+      <p:sp>
+        <p:nvSpPr>
+          <p:cNvPr id="19" name="CuadroTexto 18"/>
+          <p:cNvSpPr txBox="1"/>
+          <p:nvPr/>
+        </p:nvSpPr>
+        <p:spPr>
+          <a:xfrm>
+            <a:off x="4557878" y="3498209"/>
+            <a:ext cx="3329171" cy="369332"/>
+          </a:xfrm>
+          <a:prstGeom prst="rect">
+            <a:avLst/>
+          </a:prstGeom>
+          <a:noFill/>
+        </p:spPr>
+        <p:txBody>
+          <a:bodyPr wrap="square" rtlCol="0">
+            <a:spAutoFit/>
+          </a:bodyPr>
+          <a:lstStyle/>
+          <a:p>
+            <a:pPr algn="ctr"/>
+            <a:r>
+              <a:rPr lang="es-ES" dirty="0"/>
+              <a:t>LMT</a:t>
+            </a:r>
+          </a:p>
+        </p:txBody>
+      </p:sp>
+      <p:sp>
+        <p:nvSpPr>
+          <p:cNvPr id="20" name="CuadroTexto 19"/>
+          <p:cNvSpPr txBox="1"/>
+          <p:nvPr/>
+        </p:nvSpPr>
+        <p:spPr>
+          <a:xfrm>
+            <a:off x="8449725" y="3498209"/>
+            <a:ext cx="3329171" cy="646331"/>
+          </a:xfrm>
+          <a:prstGeom prst="rect">
+            <a:avLst/>
+          </a:prstGeom>
+          <a:noFill/>
+        </p:spPr>
+        <p:txBody>
+          <a:bodyPr wrap="square" rtlCol="0">
+            <a:spAutoFit/>
+          </a:bodyPr>
+          <a:lstStyle/>
+          <a:p>
+            <a:pPr algn="ctr"/>
+            <a:r>
+              <a:rPr lang="es-ES" dirty="0"/>
+              <a:t>MLP (5000 instancias, 0.01 aprendizaje)</a:t>
+            </a:r>
+          </a:p>
+        </p:txBody>
+      </p:sp>
     </p:spTree>
     <p:extLst>
       <p:ext uri="{BB962C8B-B14F-4D97-AF65-F5344CB8AC3E}">
-        <p14:creationId xmlns:p14="http://schemas.microsoft.com/office/powerpoint/2010/main" val="84572358"/>
+        <p14:creationId xmlns:p14="http://schemas.microsoft.com/office/powerpoint/2010/main" val="303223344"/>
       </p:ext>
     </p:extLst>
   </p:cSld>
   <p:clrMapOvr>
-    <a:overrideClrMapping bg1="dk1" tx1="lt1" bg2="dk2" tx2="lt2" accent1="accent1" accent2="accent2" accent3="accent3" accent4="accent4" accent5="accent5" accent6="accent6" hlink="hlink" folHlink="folHlink"/>
+    <a:overrideClrMapping bg1="lt1" tx1="dk1" bg2="lt2" tx2="dk2" accent1="accent1" accent2="accent2" accent3="accent3" accent4="accent4" accent5="accent5" accent6="accent6" hlink="hlink" folHlink="folHlink"/>
   </p:clrMapOvr>
 </p:sld>
 </file>
 
-<file path=ppt/slides/slide4.xml><?xml version="1.0" encoding="utf-8"?>
+<file path=ppt/slides/slide13.xml><?xml version="1.0" encoding="utf-8"?>
 <p:sld xmlns:a="http://schemas.openxmlformats.org/drawingml/2006/main" xmlns:r="http://schemas.openxmlformats.org/officeDocument/2006/relationships" xmlns:p="http://schemas.openxmlformats.org/presentationml/2006/main">
   <p:cSld>
     <p:spTree>
@@ -4408,7 +4703,7 @@
       </p:grpSpPr>
       <p:sp>
         <p:nvSpPr>
-          <p:cNvPr id="22" name="Rectangle 7"/>
+          <p:cNvPr id="12" name="Rectangle 11"/>
           <p:cNvSpPr>
             <a:spLocks noGrp="1" noRot="1" noChangeAspect="1" noMove="1" noResize="1" noEditPoints="1" noAdjustHandles="1" noChangeArrowheads="1" noChangeShapeType="1" noTextEdit="1"/>
           </p:cNvSpPr>
@@ -4439,7 +4734,7 @@
       </p:sp>
       <p:sp>
         <p:nvSpPr>
-          <p:cNvPr id="9" name="Rectangle 8"/>
+          <p:cNvPr id="13" name="Rectangle 12"/>
           <p:cNvSpPr>
             <a:spLocks noGrp="1" noRot="1" noChangeAspect="1" noMove="1" noResize="1" noEditPoints="1" noAdjustHandles="1" noChangeArrowheads="1" noChangeShapeType="1" noTextEdit="1"/>
           </p:cNvSpPr>
@@ -4451,21 +4746,27 @@
             </p:extLst>
           </p:nvPr>
         </p:nvSpPr>
-        <p:spPr>
-          <a:xfrm>
-            <a:off x="0" y="651752"/>
-            <a:ext cx="12192000" cy="736551"/>
+        <p:spPr bwMode="ltGray">
+          <a:xfrm>
+            <a:off x="378068" y="4633546"/>
+            <a:ext cx="11438793" cy="1844256"/>
           </a:xfrm>
           <a:prstGeom prst="rect">
             <a:avLst/>
           </a:prstGeom>
           <a:solidFill>
             <a:schemeClr val="tx1">
-              <a:alpha val="75000"/>
+              <a:lumMod val="75000"/>
+              <a:lumOff val="25000"/>
             </a:schemeClr>
           </a:solidFill>
-          <a:ln>
-            <a:noFill/>
+          <a:ln w="127000" cap="sq" cmpd="thinThick">
+            <a:solidFill>
+              <a:schemeClr val="tx1">
+                <a:lumMod val="75000"/>
+                <a:lumOff val="25000"/>
+              </a:schemeClr>
+            </a:solidFill>
           </a:ln>
         </p:spPr>
         <p:style>
@@ -4493,104 +4794,12 @@
           </a:p>
         </p:txBody>
       </p:sp>
-      <p:pic>
-        <p:nvPicPr>
-          <p:cNvPr id="6" name="Marcador de contenido 3"/>
-          <p:cNvPicPr>
-            <a:picLocks noChangeAspect="1"/>
-          </p:cNvPicPr>
-          <p:nvPr/>
-        </p:nvPicPr>
-        <p:blipFill rotWithShape="1">
-          <a:blip r:embed="rId2"/>
-          <a:srcRect/>
-          <a:stretch/>
-        </p:blipFill>
-        <p:spPr>
-          <a:xfrm>
-            <a:off x="704986" y="1508508"/>
-            <a:ext cx="10782028" cy="5229286"/>
-          </a:xfrm>
-          <a:prstGeom prst="rect">
-            <a:avLst/>
-          </a:prstGeom>
-        </p:spPr>
-      </p:pic>
-      <p:sp>
-        <p:nvSpPr>
-          <p:cNvPr id="2" name="Título 1"/>
-          <p:cNvSpPr>
-            <a:spLocks noGrp="1"/>
-          </p:cNvSpPr>
-          <p:nvPr>
-            <p:ph type="title"/>
-          </p:nvPr>
-        </p:nvSpPr>
-        <p:spPr>
-          <a:xfrm>
-            <a:off x="556532" y="643467"/>
-            <a:ext cx="11210925" cy="744836"/>
-          </a:xfrm>
-        </p:spPr>
-        <p:txBody>
-          <a:bodyPr vert="horz" lIns="91440" tIns="45720" rIns="91440" bIns="45720" rtlCol="0" anchor="ctr">
-            <a:normAutofit/>
-          </a:bodyPr>
-          <a:lstStyle/>
-          <a:p>
-            <a:pPr algn="ctr"/>
-            <a:r>
-              <a:rPr lang="en-US" sz="3200">
-                <a:solidFill>
-                  <a:schemeClr val="bg1"/>
-                </a:solidFill>
-              </a:rPr>
-              <a:t>PROCESAMIENTO DE DATOS</a:t>
-            </a:r>
-            <a:endParaRPr lang="en-US" sz="3200">
-              <a:solidFill>
-                <a:schemeClr val="bg1"/>
-              </a:solidFill>
-            </a:endParaRPr>
-          </a:p>
-        </p:txBody>
-      </p:sp>
-    </p:spTree>
-    <p:extLst>
-      <p:ext uri="{BB962C8B-B14F-4D97-AF65-F5344CB8AC3E}">
-        <p14:creationId xmlns:p14="http://schemas.microsoft.com/office/powerpoint/2010/main" val="3844390514"/>
-      </p:ext>
-    </p:extLst>
-  </p:cSld>
-  <p:clrMapOvr>
-    <a:masterClrMapping/>
-  </p:clrMapOvr>
-</p:sld>
-</file>
-
-<file path=ppt/slides/slide5.xml><?xml version="1.0" encoding="utf-8"?>
-<p:sld xmlns:a="http://schemas.openxmlformats.org/drawingml/2006/main" xmlns:r="http://schemas.openxmlformats.org/officeDocument/2006/relationships" xmlns:p="http://schemas.openxmlformats.org/presentationml/2006/main">
-  <p:cSld>
-    <p:spTree>
-      <p:nvGrpSpPr>
-        <p:cNvPr id="1" name=""/>
-        <p:cNvGrpSpPr/>
-        <p:nvPr/>
-      </p:nvGrpSpPr>
-      <p:grpSpPr>
-        <a:xfrm>
-          <a:off x="0" y="0"/>
-          <a:ext cx="0" cy="0"/>
-          <a:chOff x="0" y="0"/>
-          <a:chExt cx="0" cy="0"/>
-        </a:xfrm>
-      </p:grpSpPr>
-      <p:sp>
-        <p:nvSpPr>
-          <p:cNvPr id="12" name="Rectangle 11"/>
-          <p:cNvSpPr>
-            <a:spLocks noGrp="1" noRot="1" noChangeAspect="1" noMove="1" noResize="1" noEditPoints="1" noAdjustHandles="1" noChangeArrowheads="1" noChangeShapeType="1" noTextEdit="1"/>
-          </p:cNvSpPr>
+      <p:cxnSp>
+        <p:nvCxnSpPr>
+          <p:cNvPr id="14" name="Straight Connector 13"/>
+          <p:cNvCxnSpPr>
+            <a:cxnSpLocks noGrp="1" noRot="1" noChangeAspect="1" noMove="1" noResize="1" noEditPoints="1" noAdjustHandles="1" noChangeArrowheads="1" noChangeShapeType="1"/>
+          </p:cNvCxnSpPr>
           <p:nvPr>
             <p:extLst>
               <p:ext uri="{386F3935-93C4-4BCD-93E2-E3B085C9AB24}">
@@ -4598,83 +4807,87 @@
               </p:ext>
             </p:extLst>
           </p:nvPr>
-        </p:nvSpPr>
-        <p:spPr bwMode="white">
-          <a:xfrm>
-            <a:off x="0" y="0"/>
-            <a:ext cx="12192000" cy="6858000"/>
-          </a:xfrm>
-          <a:prstGeom prst="rect">
+        </p:nvCxnSpPr>
+        <p:spPr>
+          <a:xfrm>
+            <a:off x="2209800" y="5738691"/>
+            <a:ext cx="7772400" cy="0"/>
+          </a:xfrm>
+          <a:prstGeom prst="line">
             <a:avLst/>
           </a:prstGeom>
-          <a:solidFill>
-            <a:schemeClr val="bg1"/>
-          </a:solidFill>
-          <a:ln>
-            <a:noFill/>
+          <a:ln w="22225">
+            <a:solidFill>
+              <a:schemeClr val="bg1">
+                <a:lumMod val="85000"/>
+              </a:schemeClr>
+            </a:solidFill>
           </a:ln>
-          <a:effectLst/>
-        </p:spPr>
-      </p:sp>
-      <p:sp>
-        <p:nvSpPr>
-          <p:cNvPr id="13" name="Rectangle 12"/>
-          <p:cNvSpPr>
-            <a:spLocks noGrp="1" noRot="1" noChangeAspect="1" noMove="1" noResize="1" noEditPoints="1" noAdjustHandles="1" noChangeArrowheads="1" noChangeShapeType="1" noTextEdit="1"/>
-          </p:cNvSpPr>
-          <p:nvPr>
-            <p:extLst>
-              <p:ext uri="{386F3935-93C4-4BCD-93E2-E3B085C9AB24}">
-                <p16:designElem xmlns:p16="http://schemas.microsoft.com/office/powerpoint/2015/main" val="1"/>
-              </p:ext>
-            </p:extLst>
-          </p:nvPr>
-        </p:nvSpPr>
-        <p:spPr>
-          <a:xfrm>
-            <a:off x="0" y="651752"/>
-            <a:ext cx="12192000" cy="736551"/>
-          </a:xfrm>
-          <a:prstGeom prst="rect">
-            <a:avLst/>
-          </a:prstGeom>
-          <a:solidFill>
-            <a:schemeClr val="tx1">
-              <a:alpha val="75000"/>
-            </a:schemeClr>
-          </a:solidFill>
-          <a:ln>
-            <a:noFill/>
-          </a:ln>
         </p:spPr>
         <p:style>
-          <a:lnRef idx="2">
-            <a:schemeClr val="accent1">
-              <a:shade val="50000"/>
-            </a:schemeClr>
+          <a:lnRef idx="1">
+            <a:schemeClr val="accent1"/>
           </a:lnRef>
-          <a:fillRef idx="1">
+          <a:fillRef idx="0">
             <a:schemeClr val="accent1"/>
           </a:fillRef>
           <a:effectRef idx="0">
             <a:schemeClr val="accent1"/>
           </a:effectRef>
           <a:fontRef idx="minor">
-            <a:schemeClr val="lt1"/>
+            <a:schemeClr val="tx1"/>
           </a:fontRef>
         </p:style>
-        <p:txBody>
-          <a:bodyPr rtlCol="0" anchor="ctr"/>
-          <a:lstStyle/>
-          <a:p>
-            <a:pPr algn="ctr"/>
-            <a:endParaRPr lang="en-US"/>
-          </a:p>
-        </p:txBody>
-      </p:sp>
+      </p:cxnSp>
+      <p:cxnSp>
+        <p:nvCxnSpPr>
+          <p:cNvPr id="15" name="Straight Connector 14"/>
+          <p:cNvCxnSpPr>
+            <a:cxnSpLocks noGrp="1" noRot="1" noChangeAspect="1" noMove="1" noResize="1" noEditPoints="1" noAdjustHandles="1" noChangeArrowheads="1" noChangeShapeType="1"/>
+          </p:cNvCxnSpPr>
+          <p:nvPr>
+            <p:extLst>
+              <p:ext uri="{386F3935-93C4-4BCD-93E2-E3B085C9AB24}">
+                <p16:designElem xmlns:p16="http://schemas.microsoft.com/office/powerpoint/2015/main" val="1"/>
+              </p:ext>
+            </p:extLst>
+          </p:nvPr>
+        </p:nvCxnSpPr>
+        <p:spPr>
+          <a:xfrm>
+            <a:off x="4065689" y="477749"/>
+            <a:ext cx="0" cy="3657600"/>
+          </a:xfrm>
+          <a:prstGeom prst="line">
+            <a:avLst/>
+          </a:prstGeom>
+          <a:ln w="101600" cmpd="dbl">
+            <a:solidFill>
+              <a:schemeClr val="tx1">
+                <a:lumMod val="65000"/>
+                <a:lumOff val="35000"/>
+              </a:schemeClr>
+            </a:solidFill>
+          </a:ln>
+        </p:spPr>
+        <p:style>
+          <a:lnRef idx="1">
+            <a:schemeClr val="accent1"/>
+          </a:lnRef>
+          <a:fillRef idx="0">
+            <a:schemeClr val="accent1"/>
+          </a:fillRef>
+          <a:effectRef idx="0">
+            <a:schemeClr val="accent1"/>
+          </a:effectRef>
+          <a:fontRef idx="minor">
+            <a:schemeClr val="tx1"/>
+          </a:fontRef>
+        </p:style>
+      </p:cxnSp>
       <p:pic>
         <p:nvPicPr>
-          <p:cNvPr id="8" name="Imagen 7"/>
+          <p:cNvPr id="9" name="Imagen 8"/>
           <p:cNvPicPr>
             <a:picLocks noChangeAspect="1"/>
           </p:cNvPicPr>
@@ -4694,175 +4907,24 @@
         </p:blipFill>
         <p:spPr>
           <a:xfrm>
-            <a:off x="754523" y="1388303"/>
-            <a:ext cx="10682953" cy="5421600"/>
+            <a:off x="4384042" y="1399854"/>
+            <a:ext cx="3425609" cy="1796414"/>
           </a:xfrm>
           <a:prstGeom prst="rect">
             <a:avLst/>
           </a:prstGeom>
         </p:spPr>
       </p:pic>
-      <p:sp>
-        <p:nvSpPr>
-          <p:cNvPr id="2" name="Título 1"/>
-          <p:cNvSpPr>
-            <a:spLocks noGrp="1"/>
-          </p:cNvSpPr>
-          <p:nvPr>
-            <p:ph type="title"/>
-          </p:nvPr>
-        </p:nvSpPr>
-        <p:spPr>
-          <a:xfrm>
-            <a:off x="556532" y="643467"/>
-            <a:ext cx="11210925" cy="744836"/>
-          </a:xfrm>
-        </p:spPr>
-        <p:txBody>
-          <a:bodyPr vert="horz" lIns="91440" tIns="45720" rIns="91440" bIns="45720" rtlCol="0" anchor="ctr">
-            <a:normAutofit/>
-          </a:bodyPr>
-          <a:lstStyle/>
-          <a:p>
-            <a:pPr algn="ctr"/>
-            <a:r>
-              <a:rPr lang="en-US" sz="3200" dirty="0">
-                <a:solidFill>
-                  <a:schemeClr val="bg1"/>
-                </a:solidFill>
-              </a:rPr>
-              <a:t>PROCESAMIENTO DE DATOS</a:t>
-            </a:r>
-          </a:p>
-        </p:txBody>
-      </p:sp>
-    </p:spTree>
-    <p:extLst>
-      <p:ext uri="{BB962C8B-B14F-4D97-AF65-F5344CB8AC3E}">
-        <p14:creationId xmlns:p14="http://schemas.microsoft.com/office/powerpoint/2010/main" val="38684972"/>
-      </p:ext>
-    </p:extLst>
-  </p:cSld>
-  <p:clrMapOvr>
-    <a:masterClrMapping/>
-  </p:clrMapOvr>
-</p:sld>
-</file>
-
-<file path=ppt/slides/slide6.xml><?xml version="1.0" encoding="utf-8"?>
-<p:sld xmlns:a="http://schemas.openxmlformats.org/drawingml/2006/main" xmlns:r="http://schemas.openxmlformats.org/officeDocument/2006/relationships" xmlns:p="http://schemas.openxmlformats.org/presentationml/2006/main">
-  <p:cSld>
-    <p:spTree>
-      <p:nvGrpSpPr>
-        <p:cNvPr id="1" name=""/>
-        <p:cNvGrpSpPr/>
-        <p:nvPr/>
-      </p:nvGrpSpPr>
-      <p:grpSpPr>
-        <a:xfrm>
-          <a:off x="0" y="0"/>
-          <a:ext cx="0" cy="0"/>
-          <a:chOff x="0" y="0"/>
-          <a:chExt cx="0" cy="0"/>
-        </a:xfrm>
-      </p:grpSpPr>
-      <p:sp>
-        <p:nvSpPr>
-          <p:cNvPr id="12" name="Rectangle 11"/>
-          <p:cNvSpPr>
-            <a:spLocks noGrp="1" noRot="1" noChangeAspect="1" noMove="1" noResize="1" noEditPoints="1" noAdjustHandles="1" noChangeArrowheads="1" noChangeShapeType="1" noTextEdit="1"/>
-          </p:cNvSpPr>
-          <p:nvPr>
-            <p:extLst>
-              <p:ext uri="{386F3935-93C4-4BCD-93E2-E3B085C9AB24}">
-                <p16:designElem xmlns:p16="http://schemas.microsoft.com/office/powerpoint/2015/main" val="1"/>
-              </p:ext>
-            </p:extLst>
-          </p:nvPr>
-        </p:nvSpPr>
-        <p:spPr bwMode="white">
-          <a:xfrm>
-            <a:off x="0" y="0"/>
-            <a:ext cx="12192000" cy="6858000"/>
-          </a:xfrm>
-          <a:prstGeom prst="rect">
-            <a:avLst/>
-          </a:prstGeom>
-          <a:solidFill>
-            <a:schemeClr val="bg1"/>
-          </a:solidFill>
-          <a:ln>
-            <a:noFill/>
-          </a:ln>
-          <a:effectLst/>
-        </p:spPr>
-      </p:sp>
-      <p:sp>
-        <p:nvSpPr>
-          <p:cNvPr id="13" name="Rectangle 12"/>
-          <p:cNvSpPr>
-            <a:spLocks noGrp="1" noRot="1" noChangeAspect="1" noMove="1" noResize="1" noEditPoints="1" noAdjustHandles="1" noChangeArrowheads="1" noChangeShapeType="1" noTextEdit="1"/>
-          </p:cNvSpPr>
-          <p:nvPr>
-            <p:extLst>
-              <p:ext uri="{386F3935-93C4-4BCD-93E2-E3B085C9AB24}">
-                <p16:designElem xmlns:p16="http://schemas.microsoft.com/office/powerpoint/2015/main" val="1"/>
-              </p:ext>
-            </p:extLst>
-          </p:nvPr>
-        </p:nvSpPr>
-        <p:spPr>
-          <a:xfrm>
-            <a:off x="0" y="651752"/>
-            <a:ext cx="12192000" cy="736551"/>
-          </a:xfrm>
-          <a:prstGeom prst="rect">
-            <a:avLst/>
-          </a:prstGeom>
-          <a:solidFill>
-            <a:schemeClr val="tx1">
-              <a:alpha val="75000"/>
-            </a:schemeClr>
-          </a:solidFill>
-          <a:ln>
-            <a:noFill/>
-          </a:ln>
-        </p:spPr>
-        <p:style>
-          <a:lnRef idx="2">
-            <a:schemeClr val="accent1">
-              <a:shade val="50000"/>
-            </a:schemeClr>
-          </a:lnRef>
-          <a:fillRef idx="1">
-            <a:schemeClr val="accent1"/>
-          </a:fillRef>
-          <a:effectRef idx="0">
-            <a:schemeClr val="accent1"/>
-          </a:effectRef>
-          <a:fontRef idx="minor">
-            <a:schemeClr val="lt1"/>
-          </a:fontRef>
-        </p:style>
-        <p:txBody>
-          <a:bodyPr rtlCol="0" anchor="ctr"/>
-          <a:lstStyle/>
-          <a:p>
-            <a:pPr algn="ctr"/>
-            <a:endParaRPr lang="en-US"/>
-          </a:p>
-        </p:txBody>
-      </p:sp>
       <p:pic>
         <p:nvPicPr>
-          <p:cNvPr id="3" name="Imagen 2"/>
+          <p:cNvPr id="8" name="Imagen 7"/>
           <p:cNvPicPr>
             <a:picLocks noChangeAspect="1"/>
           </p:cNvPicPr>
           <p:nvPr/>
         </p:nvPicPr>
         <p:blipFill>
-          <a:blip r:embed="rId2">
+          <a:blip r:embed="rId3">
             <a:extLst>
               <a:ext uri="{28A0092B-C50C-407E-A947-70E740481C1C}">
                 <a14:useLocalDpi xmlns:a14="http://schemas.microsoft.com/office/drawing/2010/main" val="0"/>
@@ -4875,14 +4937,90 @@
         </p:blipFill>
         <p:spPr>
           <a:xfrm>
-            <a:off x="753776" y="1388303"/>
-            <a:ext cx="10684448" cy="5422359"/>
+            <a:off x="254298" y="1437278"/>
+            <a:ext cx="3433324" cy="1758990"/>
           </a:xfrm>
           <a:prstGeom prst="rect">
             <a:avLst/>
           </a:prstGeom>
         </p:spPr>
       </p:pic>
+      <p:cxnSp>
+        <p:nvCxnSpPr>
+          <p:cNvPr id="16" name="Straight Connector 15"/>
+          <p:cNvCxnSpPr>
+            <a:cxnSpLocks noGrp="1" noRot="1" noChangeAspect="1" noMove="1" noResize="1" noEditPoints="1" noAdjustHandles="1" noChangeArrowheads="1" noChangeShapeType="1"/>
+          </p:cNvCxnSpPr>
+          <p:nvPr>
+            <p:extLst>
+              <p:ext uri="{386F3935-93C4-4BCD-93E2-E3B085C9AB24}">
+                <p16:designElem xmlns:p16="http://schemas.microsoft.com/office/powerpoint/2015/main" val="1"/>
+              </p:ext>
+            </p:extLst>
+          </p:nvPr>
+        </p:nvCxnSpPr>
+        <p:spPr>
+          <a:xfrm>
+            <a:off x="8129685" y="477749"/>
+            <a:ext cx="0" cy="3657600"/>
+          </a:xfrm>
+          <a:prstGeom prst="line">
+            <a:avLst/>
+          </a:prstGeom>
+          <a:ln w="101600" cmpd="dbl">
+            <a:solidFill>
+              <a:schemeClr val="tx1">
+                <a:lumMod val="65000"/>
+                <a:lumOff val="35000"/>
+              </a:schemeClr>
+            </a:solidFill>
+          </a:ln>
+        </p:spPr>
+        <p:style>
+          <a:lnRef idx="1">
+            <a:schemeClr val="accent1"/>
+          </a:lnRef>
+          <a:fillRef idx="0">
+            <a:schemeClr val="accent1"/>
+          </a:fillRef>
+          <a:effectRef idx="0">
+            <a:schemeClr val="accent1"/>
+          </a:effectRef>
+          <a:fontRef idx="minor">
+            <a:schemeClr val="tx1"/>
+          </a:fontRef>
+        </p:style>
+      </p:cxnSp>
+      <p:pic>
+        <p:nvPicPr>
+          <p:cNvPr id="10" name="Imagen 9"/>
+          <p:cNvPicPr>
+            <a:picLocks noChangeAspect="1"/>
+          </p:cNvPicPr>
+          <p:nvPr/>
+        </p:nvPicPr>
+        <p:blipFill>
+          <a:blip r:embed="rId4">
+            <a:extLst>
+              <a:ext uri="{28A0092B-C50C-407E-A947-70E740481C1C}">
+                <a14:useLocalDpi xmlns:a14="http://schemas.microsoft.com/office/drawing/2010/main" val="0"/>
+              </a:ext>
+            </a:extLst>
+          </a:blip>
+          <a:stretch>
+            <a:fillRect/>
+          </a:stretch>
+        </p:blipFill>
+        <p:spPr>
+          <a:xfrm>
+            <a:off x="8448885" y="1383453"/>
+            <a:ext cx="3423916" cy="1829215"/>
+          </a:xfrm>
+          <a:prstGeom prst="rect">
+            <a:avLst/>
+          </a:prstGeom>
+        </p:spPr>
+      </p:pic>
       <p:sp>
         <p:nvSpPr>
           <p:cNvPr id="2" name="Título 1"/>
@@ -4895,34 +5033,34 @@
         </p:nvSpPr>
         <p:spPr>
           <a:xfrm>
-            <a:off x="556532" y="643467"/>
-            <a:ext cx="11210925" cy="744836"/>
-          </a:xfrm>
-        </p:spPr>
-        <p:txBody>
-          <a:bodyPr vert="horz" lIns="91440" tIns="45720" rIns="91440" bIns="45720" rtlCol="0" anchor="ctr">
+            <a:off x="527538" y="4756638"/>
+            <a:ext cx="11139854" cy="930447"/>
+          </a:xfrm>
+        </p:spPr>
+        <p:txBody>
+          <a:bodyPr vert="horz" lIns="91440" tIns="45720" rIns="91440" bIns="45720" rtlCol="0" anchor="b">
             <a:normAutofit/>
           </a:bodyPr>
           <a:lstStyle/>
           <a:p>
             <a:pPr algn="ctr"/>
             <a:r>
-              <a:rPr lang="en-US" sz="3200">
+              <a:rPr lang="en-US" sz="5400">
                 <a:solidFill>
                   <a:schemeClr val="bg1"/>
                 </a:solidFill>
               </a:rPr>
-              <a:t>PROCESAMIENTO </a:t>
-            </a:r>
-            <a:r>
-              <a:rPr lang="en-US" sz="3200">
+              <a:t>WEKA: Previsión a </a:t>
+            </a:r>
+            <a:r>
+              <a:rPr lang="en-US" sz="5400">
                 <a:solidFill>
                   <a:schemeClr val="bg1"/>
                 </a:solidFill>
               </a:rPr>
-              <a:t>DE DATOS</a:t>
-            </a:r>
-            <a:endParaRPr lang="en-US" sz="3200">
+              <a:t>5 días</a:t>
+            </a:r>
+            <a:endParaRPr lang="en-US" sz="5400">
               <a:solidFill>
                 <a:schemeClr val="bg1"/>
               </a:solidFill>
@@ -4930,20 +5068,110 @@
           </a:p>
         </p:txBody>
       </p:sp>
+      <p:sp>
+        <p:nvSpPr>
+          <p:cNvPr id="17" name="CuadroTexto 16"/>
+          <p:cNvSpPr txBox="1"/>
+          <p:nvPr/>
+        </p:nvSpPr>
+        <p:spPr>
+          <a:xfrm>
+            <a:off x="306374" y="3523376"/>
+            <a:ext cx="3329171" cy="369332"/>
+          </a:xfrm>
+          <a:prstGeom prst="rect">
+            <a:avLst/>
+          </a:prstGeom>
+          <a:noFill/>
+        </p:spPr>
+        <p:txBody>
+          <a:bodyPr wrap="square" rtlCol="0">
+            <a:spAutoFit/>
+          </a:bodyPr>
+          <a:lstStyle/>
+          <a:p>
+            <a:pPr algn="ctr"/>
+            <a:r>
+              <a:rPr lang="es-ES" dirty="0"/>
+              <a:t>J48</a:t>
+            </a:r>
+          </a:p>
+        </p:txBody>
+      </p:sp>
+      <p:sp>
+        <p:nvSpPr>
+          <p:cNvPr id="18" name="CuadroTexto 17"/>
+          <p:cNvSpPr txBox="1"/>
+          <p:nvPr/>
+        </p:nvSpPr>
+        <p:spPr>
+          <a:xfrm>
+            <a:off x="4432261" y="3509799"/>
+            <a:ext cx="3329171" cy="369332"/>
+          </a:xfrm>
+          <a:prstGeom prst="rect">
+            <a:avLst/>
+          </a:prstGeom>
+          <a:noFill/>
+        </p:spPr>
+        <p:txBody>
+          <a:bodyPr wrap="square" rtlCol="0">
+            <a:spAutoFit/>
+          </a:bodyPr>
+          <a:lstStyle/>
+          <a:p>
+            <a:pPr algn="ctr"/>
+            <a:r>
+              <a:rPr lang="es-ES" dirty="0"/>
+              <a:t>LMT</a:t>
+            </a:r>
+          </a:p>
+        </p:txBody>
+      </p:sp>
+      <p:sp>
+        <p:nvSpPr>
+          <p:cNvPr id="19" name="CuadroTexto 18"/>
+          <p:cNvSpPr txBox="1"/>
+          <p:nvPr/>
+        </p:nvSpPr>
+        <p:spPr>
+          <a:xfrm>
+            <a:off x="8448885" y="3384876"/>
+            <a:ext cx="3329171" cy="646331"/>
+          </a:xfrm>
+          <a:prstGeom prst="rect">
+            <a:avLst/>
+          </a:prstGeom>
+          <a:noFill/>
+        </p:spPr>
+        <p:txBody>
+          <a:bodyPr wrap="square" rtlCol="0">
+            <a:spAutoFit/>
+          </a:bodyPr>
+          <a:lstStyle/>
+          <a:p>
+            <a:pPr algn="ctr"/>
+            <a:r>
+              <a:rPr lang="es-ES" dirty="0"/>
+              <a:t>MLP (5000 instancias, 0.01 aprendizaje)</a:t>
+            </a:r>
+          </a:p>
+        </p:txBody>
+      </p:sp>
     </p:spTree>
     <p:extLst>
       <p:ext uri="{BB962C8B-B14F-4D97-AF65-F5344CB8AC3E}">
-        <p14:creationId xmlns:p14="http://schemas.microsoft.com/office/powerpoint/2010/main" val="1316324414"/>
+        <p14:creationId xmlns:p14="http://schemas.microsoft.com/office/powerpoint/2010/main" val="3308965500"/>
       </p:ext>
     </p:extLst>
   </p:cSld>
   <p:clrMapOvr>
-    <a:masterClrMapping/>
+    <a:overrideClrMapping bg1="lt1" tx1="dk1" bg2="lt2" tx2="dk2" accent1="accent1" accent2="accent2" accent3="accent3" accent4="accent4" accent5="accent5" accent6="accent6" hlink="hlink" folHlink="folHlink"/>
   </p:clrMapOvr>
 </p:sld>
 </file>
 
-<file path=ppt/slides/slide7.xml><?xml version="1.0" encoding="utf-8"?>
+<file path=ppt/slides/slide2.xml><?xml version="1.0" encoding="utf-8"?>
 <p:sld xmlns:a="http://schemas.openxmlformats.org/drawingml/2006/main" xmlns:r="http://schemas.openxmlformats.org/officeDocument/2006/relationships" xmlns:p="http://schemas.openxmlformats.org/presentationml/2006/main">
   <p:cSld>
     <p:spTree>
@@ -5238,9 +5466,1170 @@
           <a:p>
             <a:r>
               <a:rPr lang="es-ES" dirty="0"/>
+              <a:t>OBJETIVO</a:t>
+            </a:r>
+          </a:p>
+        </p:txBody>
+      </p:sp>
+      <p:sp>
+        <p:nvSpPr>
+          <p:cNvPr id="3" name="Marcador de contenido 2"/>
+          <p:cNvSpPr>
+            <a:spLocks noGrp="1"/>
+          </p:cNvSpPr>
+          <p:nvPr>
+            <p:ph idx="1"/>
+          </p:nvPr>
+        </p:nvSpPr>
+        <p:spPr>
+          <a:xfrm>
+            <a:off x="838201" y="2022601"/>
+            <a:ext cx="10515598" cy="4154361"/>
+          </a:xfrm>
+        </p:spPr>
+        <p:txBody>
+          <a:bodyPr>
+            <a:normAutofit/>
+          </a:bodyPr>
+          <a:lstStyle/>
+          <a:p>
+            <a:r>
+              <a:rPr lang="es-ES" sz="2000" dirty="0"/>
+              <a:t>Nuestro objetivo será estudiar la posibilidad de predecir si la bolsa subirá o bajará al día siguiente</a:t>
+            </a:r>
+          </a:p>
+          <a:p>
+            <a:pPr lvl="1"/>
+            <a:r>
+              <a:rPr lang="es-ES" sz="1600" dirty="0"/>
+              <a:t>Ibex 35</a:t>
+            </a:r>
+          </a:p>
+          <a:p>
+            <a:pPr lvl="1"/>
+            <a:r>
+              <a:rPr lang="es-ES" sz="1600" dirty="0"/>
+              <a:t>Objetivo complicado, pero con grandes recompensas</a:t>
+            </a:r>
+          </a:p>
+          <a:p>
+            <a:r>
+              <a:rPr lang="es-ES" sz="2000" dirty="0"/>
+              <a:t>En Python, con la plataforma Anaconda</a:t>
+            </a:r>
+          </a:p>
+          <a:p>
+            <a:pPr lvl="1"/>
+            <a:r>
+              <a:rPr lang="es-ES" sz="1600" dirty="0"/>
+              <a:t>Distribución de Python</a:t>
+            </a:r>
+          </a:p>
+          <a:p>
+            <a:pPr lvl="1"/>
+            <a:r>
+              <a:rPr lang="es-ES" sz="1600" dirty="0"/>
+              <a:t>Librerías de análisis y obtención de datos</a:t>
+            </a:r>
+          </a:p>
+          <a:p>
+            <a:r>
+              <a:rPr lang="es-ES" sz="2000" dirty="0"/>
+              <a:t>Los datos serán posteriormente </a:t>
+            </a:r>
+            <a:r>
+              <a:rPr lang="es-ES" sz="2000" dirty="0" err="1"/>
+              <a:t>preprocesados</a:t>
+            </a:r>
+            <a:r>
+              <a:rPr lang="es-ES" sz="2000" dirty="0"/>
+              <a:t> y estudiados por nosotros.</a:t>
+            </a:r>
+          </a:p>
+          <a:p>
+            <a:pPr lvl="1"/>
+            <a:r>
+              <a:rPr lang="es-ES" sz="1600" dirty="0"/>
+              <a:t>Redes de neuronas artificiales</a:t>
+            </a:r>
+          </a:p>
+        </p:txBody>
+      </p:sp>
+    </p:spTree>
+    <p:extLst>
+      <p:ext uri="{BB962C8B-B14F-4D97-AF65-F5344CB8AC3E}">
+        <p14:creationId xmlns:p14="http://schemas.microsoft.com/office/powerpoint/2010/main" val="162548143"/>
+      </p:ext>
+    </p:extLst>
+  </p:cSld>
+  <p:clrMapOvr>
+    <a:overrideClrMapping bg1="dk1" tx1="lt1" bg2="dk2" tx2="lt2" accent1="accent1" accent2="accent2" accent3="accent3" accent4="accent4" accent5="accent5" accent6="accent6" hlink="hlink" folHlink="folHlink"/>
+  </p:clrMapOvr>
+</p:sld>
+</file>
+
+<file path=ppt/slides/slide3.xml><?xml version="1.0" encoding="utf-8"?>
+<p:sld xmlns:a="http://schemas.openxmlformats.org/drawingml/2006/main" xmlns:r="http://schemas.openxmlformats.org/officeDocument/2006/relationships" xmlns:p="http://schemas.openxmlformats.org/presentationml/2006/main">
+  <p:cSld>
+    <p:spTree>
+      <p:nvGrpSpPr>
+        <p:cNvPr id="1" name=""/>
+        <p:cNvGrpSpPr/>
+        <p:nvPr/>
+      </p:nvGrpSpPr>
+      <p:grpSpPr>
+        <a:xfrm>
+          <a:off x="0" y="0"/>
+          <a:ext cx="0" cy="0"/>
+          <a:chOff x="0" y="0"/>
+          <a:chExt cx="0" cy="0"/>
+        </a:xfrm>
+      </p:grpSpPr>
+      <p:pic>
+        <p:nvPicPr>
+          <p:cNvPr id="6" name="Marcador de contenido 3"/>
+          <p:cNvPicPr>
+            <a:picLocks noChangeAspect="1"/>
+          </p:cNvPicPr>
+          <p:nvPr/>
+        </p:nvPicPr>
+        <p:blipFill rotWithShape="1">
+          <a:blip r:embed="rId2">
+            <a:alphaModFix amt="35000"/>
+          </a:blip>
+          <a:srcRect t="4855" b="7935"/>
+          <a:stretch/>
+        </p:blipFill>
+        <p:spPr>
+          <a:xfrm>
+            <a:off x="20" y="10"/>
+            <a:ext cx="12191980" cy="6857990"/>
+          </a:xfrm>
+          <a:prstGeom prst="rect">
+            <a:avLst/>
+          </a:prstGeom>
+        </p:spPr>
+      </p:pic>
+      <p:sp>
+        <p:nvSpPr>
+          <p:cNvPr id="5" name="CuadroTexto 4"/>
+          <p:cNvSpPr txBox="1"/>
+          <p:nvPr/>
+        </p:nvSpPr>
+        <p:spPr>
+          <a:xfrm>
+            <a:off x="838200" y="1687153"/>
+            <a:ext cx="10515600" cy="3416320"/>
+          </a:xfrm>
+          <a:prstGeom prst="rect">
+            <a:avLst/>
+          </a:prstGeom>
+          <a:noFill/>
+        </p:spPr>
+        <p:txBody>
+          <a:bodyPr wrap="square" rtlCol="0">
+            <a:spAutoFit/>
+          </a:bodyPr>
+          <a:lstStyle/>
+          <a:p>
+            <a:r>
+              <a:rPr lang="es-ES" sz="2400" dirty="0"/>
+              <a:t>Vamos a obtener los datos históricos de diferentes plazas del mundo:</a:t>
+            </a:r>
+          </a:p>
+          <a:p>
+            <a:pPr marL="342900" indent="-342900">
+              <a:buFont typeface="Arial" panose="020B0604020202020204" pitchFamily="34" charset="0"/>
+              <a:buChar char="•"/>
+            </a:pPr>
+            <a:r>
+              <a:rPr lang="es-ES" sz="2400" dirty="0"/>
+              <a:t>IBEX35 (España)</a:t>
+            </a:r>
+          </a:p>
+          <a:p>
+            <a:pPr marL="342900" indent="-342900">
+              <a:buFont typeface="Arial" panose="020B0604020202020204" pitchFamily="34" charset="0"/>
+              <a:buChar char="•"/>
+            </a:pPr>
+            <a:r>
+              <a:rPr lang="es-ES" sz="2400" dirty="0"/>
+              <a:t>Dow Jones (Estados Unidos de América)</a:t>
+            </a:r>
+          </a:p>
+          <a:p>
+            <a:pPr marL="342900" indent="-342900">
+              <a:buFont typeface="Arial" panose="020B0604020202020204" pitchFamily="34" charset="0"/>
+              <a:buChar char="•"/>
+            </a:pPr>
+            <a:r>
+              <a:rPr lang="es-ES" sz="2400" dirty="0"/>
+              <a:t>Euro Stoxx50 (Común de Europa)</a:t>
+            </a:r>
+          </a:p>
+          <a:p>
+            <a:pPr marL="342900" indent="-342900">
+              <a:buFont typeface="Arial" panose="020B0604020202020204" pitchFamily="34" charset="0"/>
+              <a:buChar char="•"/>
+            </a:pPr>
+            <a:r>
+              <a:rPr lang="es-ES" sz="2400" dirty="0"/>
+              <a:t>Nikkei225 (Japón)</a:t>
+            </a:r>
+          </a:p>
+          <a:p>
+            <a:pPr marL="342900" indent="-342900">
+              <a:buFont typeface="Arial" panose="020B0604020202020204" pitchFamily="34" charset="0"/>
+              <a:buChar char="•"/>
+            </a:pPr>
+            <a:r>
+              <a:rPr lang="es-ES" sz="2400" dirty="0" err="1"/>
+              <a:t>Dax</a:t>
+            </a:r>
+            <a:r>
+              <a:rPr lang="es-ES" sz="2400" dirty="0"/>
+              <a:t> (Alemania)</a:t>
+            </a:r>
+          </a:p>
+          <a:p>
+            <a:pPr marL="342900" indent="-342900">
+              <a:buFont typeface="Arial" panose="020B0604020202020204" pitchFamily="34" charset="0"/>
+              <a:buChar char="•"/>
+            </a:pPr>
+            <a:r>
+              <a:rPr lang="es-ES" sz="2400" dirty="0" err="1"/>
+              <a:t>Cac</a:t>
+            </a:r>
+            <a:r>
+              <a:rPr lang="es-ES" sz="2400" dirty="0"/>
+              <a:t> 40 (Francia)</a:t>
+            </a:r>
+          </a:p>
+          <a:p>
+            <a:endParaRPr lang="es-ES" sz="2400" dirty="0"/>
+          </a:p>
+          <a:p>
+            <a:r>
+              <a:rPr lang="es-ES" sz="2400" dirty="0"/>
+              <a:t>Los datos los obtenemos gracias a la API de Python de </a:t>
+            </a:r>
+            <a:r>
+              <a:rPr lang="es-ES" sz="2400" dirty="0" err="1"/>
+              <a:t>Quandl</a:t>
+            </a:r>
+            <a:endParaRPr lang="es-ES" sz="2400" dirty="0"/>
+          </a:p>
+        </p:txBody>
+      </p:sp>
+      <p:sp>
+        <p:nvSpPr>
+          <p:cNvPr id="2" name="Título 1"/>
+          <p:cNvSpPr>
+            <a:spLocks noGrp="1"/>
+          </p:cNvSpPr>
+          <p:nvPr>
+            <p:ph type="title"/>
+          </p:nvPr>
+        </p:nvSpPr>
+        <p:spPr>
+          <a:xfrm>
+            <a:off x="838200" y="365125"/>
+            <a:ext cx="10515600" cy="1325563"/>
+          </a:xfrm>
+        </p:spPr>
+        <p:txBody>
+          <a:bodyPr>
+            <a:normAutofit/>
+          </a:bodyPr>
+          <a:lstStyle/>
+          <a:p>
+            <a:r>
+              <a:rPr lang="es-ES" dirty="0">
+                <a:solidFill>
+                  <a:srgbClr val="FFFFFF"/>
+                </a:solidFill>
+              </a:rPr>
+              <a:t>OBTENCION DE DATOS</a:t>
+            </a:r>
+          </a:p>
+        </p:txBody>
+      </p:sp>
+      <p:pic>
+        <p:nvPicPr>
+          <p:cNvPr id="11" name="Imagen 10"/>
+          <p:cNvPicPr>
+            <a:picLocks noChangeAspect="1"/>
+          </p:cNvPicPr>
+          <p:nvPr/>
+        </p:nvPicPr>
+        <p:blipFill>
+          <a:blip r:embed="rId3">
+            <a:extLst>
+              <a:ext uri="{28A0092B-C50C-407E-A947-70E740481C1C}">
+                <a14:useLocalDpi xmlns:a14="http://schemas.microsoft.com/office/drawing/2010/main" val="0"/>
+              </a:ext>
+            </a:extLst>
+          </a:blip>
+          <a:stretch>
+            <a:fillRect/>
+          </a:stretch>
+        </p:blipFill>
+        <p:spPr>
+          <a:xfrm>
+            <a:off x="5291547" y="4950011"/>
+            <a:ext cx="5555817" cy="1907989"/>
+          </a:xfrm>
+          <a:prstGeom prst="rect">
+            <a:avLst/>
+          </a:prstGeom>
+        </p:spPr>
+      </p:pic>
+    </p:spTree>
+    <p:extLst>
+      <p:ext uri="{BB962C8B-B14F-4D97-AF65-F5344CB8AC3E}">
+        <p14:creationId xmlns:p14="http://schemas.microsoft.com/office/powerpoint/2010/main" val="84572358"/>
+      </p:ext>
+    </p:extLst>
+  </p:cSld>
+  <p:clrMapOvr>
+    <a:overrideClrMapping bg1="dk1" tx1="lt1" bg2="dk2" tx2="lt2" accent1="accent1" accent2="accent2" accent3="accent3" accent4="accent4" accent5="accent5" accent6="accent6" hlink="hlink" folHlink="folHlink"/>
+  </p:clrMapOvr>
+</p:sld>
+</file>
+
+<file path=ppt/slides/slide4.xml><?xml version="1.0" encoding="utf-8"?>
+<p:sld xmlns:a="http://schemas.openxmlformats.org/drawingml/2006/main" xmlns:r="http://schemas.openxmlformats.org/officeDocument/2006/relationships" xmlns:p="http://schemas.openxmlformats.org/presentationml/2006/main">
+  <p:cSld>
+    <p:spTree>
+      <p:nvGrpSpPr>
+        <p:cNvPr id="1" name=""/>
+        <p:cNvGrpSpPr/>
+        <p:nvPr/>
+      </p:nvGrpSpPr>
+      <p:grpSpPr>
+        <a:xfrm>
+          <a:off x="0" y="0"/>
+          <a:ext cx="0" cy="0"/>
+          <a:chOff x="0" y="0"/>
+          <a:chExt cx="0" cy="0"/>
+        </a:xfrm>
+      </p:grpSpPr>
+      <p:sp>
+        <p:nvSpPr>
+          <p:cNvPr id="22" name="Rectangle 7"/>
+          <p:cNvSpPr>
+            <a:spLocks noGrp="1" noRot="1" noChangeAspect="1" noMove="1" noResize="1" noEditPoints="1" noAdjustHandles="1" noChangeArrowheads="1" noChangeShapeType="1" noTextEdit="1"/>
+          </p:cNvSpPr>
+          <p:nvPr>
+            <p:extLst>
+              <p:ext uri="{386F3935-93C4-4BCD-93E2-E3B085C9AB24}">
+                <p16:designElem xmlns:p16="http://schemas.microsoft.com/office/powerpoint/2015/main" val="1"/>
+              </p:ext>
+            </p:extLst>
+          </p:nvPr>
+        </p:nvSpPr>
+        <p:spPr bwMode="white">
+          <a:xfrm>
+            <a:off x="0" y="0"/>
+            <a:ext cx="12192000" cy="6858000"/>
+          </a:xfrm>
+          <a:prstGeom prst="rect">
+            <a:avLst/>
+          </a:prstGeom>
+          <a:solidFill>
+            <a:schemeClr val="bg1"/>
+          </a:solidFill>
+          <a:ln>
+            <a:noFill/>
+          </a:ln>
+          <a:effectLst/>
+        </p:spPr>
+      </p:sp>
+      <p:sp>
+        <p:nvSpPr>
+          <p:cNvPr id="9" name="Rectangle 8"/>
+          <p:cNvSpPr>
+            <a:spLocks noGrp="1" noRot="1" noChangeAspect="1" noMove="1" noResize="1" noEditPoints="1" noAdjustHandles="1" noChangeArrowheads="1" noChangeShapeType="1" noTextEdit="1"/>
+          </p:cNvSpPr>
+          <p:nvPr>
+            <p:extLst>
+              <p:ext uri="{386F3935-93C4-4BCD-93E2-E3B085C9AB24}">
+                <p16:designElem xmlns:p16="http://schemas.microsoft.com/office/powerpoint/2015/main" val="1"/>
+              </p:ext>
+            </p:extLst>
+          </p:nvPr>
+        </p:nvSpPr>
+        <p:spPr>
+          <a:xfrm>
+            <a:off x="0" y="651752"/>
+            <a:ext cx="12192000" cy="736551"/>
+          </a:xfrm>
+          <a:prstGeom prst="rect">
+            <a:avLst/>
+          </a:prstGeom>
+          <a:solidFill>
+            <a:schemeClr val="tx1">
+              <a:alpha val="75000"/>
+            </a:schemeClr>
+          </a:solidFill>
+          <a:ln>
+            <a:noFill/>
+          </a:ln>
+        </p:spPr>
+        <p:style>
+          <a:lnRef idx="2">
+            <a:schemeClr val="accent1">
+              <a:shade val="50000"/>
+            </a:schemeClr>
+          </a:lnRef>
+          <a:fillRef idx="1">
+            <a:schemeClr val="accent1"/>
+          </a:fillRef>
+          <a:effectRef idx="0">
+            <a:schemeClr val="accent1"/>
+          </a:effectRef>
+          <a:fontRef idx="minor">
+            <a:schemeClr val="lt1"/>
+          </a:fontRef>
+        </p:style>
+        <p:txBody>
+          <a:bodyPr rtlCol="0" anchor="ctr"/>
+          <a:lstStyle/>
+          <a:p>
+            <a:pPr algn="ctr"/>
+            <a:endParaRPr lang="en-US"/>
+          </a:p>
+        </p:txBody>
+      </p:sp>
+      <p:pic>
+        <p:nvPicPr>
+          <p:cNvPr id="6" name="Marcador de contenido 3"/>
+          <p:cNvPicPr>
+            <a:picLocks noChangeAspect="1"/>
+          </p:cNvPicPr>
+          <p:nvPr/>
+        </p:nvPicPr>
+        <p:blipFill rotWithShape="1">
+          <a:blip r:embed="rId2"/>
+          <a:srcRect/>
+          <a:stretch/>
+        </p:blipFill>
+        <p:spPr>
+          <a:xfrm>
+            <a:off x="704986" y="1508508"/>
+            <a:ext cx="10782028" cy="5229286"/>
+          </a:xfrm>
+          <a:prstGeom prst="rect">
+            <a:avLst/>
+          </a:prstGeom>
+        </p:spPr>
+      </p:pic>
+      <p:sp>
+        <p:nvSpPr>
+          <p:cNvPr id="2" name="Título 1"/>
+          <p:cNvSpPr>
+            <a:spLocks noGrp="1"/>
+          </p:cNvSpPr>
+          <p:nvPr>
+            <p:ph type="title"/>
+          </p:nvPr>
+        </p:nvSpPr>
+        <p:spPr>
+          <a:xfrm>
+            <a:off x="556532" y="643467"/>
+            <a:ext cx="11210925" cy="744836"/>
+          </a:xfrm>
+        </p:spPr>
+        <p:txBody>
+          <a:bodyPr vert="horz" lIns="91440" tIns="45720" rIns="91440" bIns="45720" rtlCol="0" anchor="ctr">
+            <a:normAutofit/>
+          </a:bodyPr>
+          <a:lstStyle/>
+          <a:p>
+            <a:pPr algn="ctr"/>
+            <a:r>
+              <a:rPr lang="en-US" sz="3200">
+                <a:solidFill>
+                  <a:schemeClr val="bg1"/>
+                </a:solidFill>
+              </a:rPr>
               <a:t>PROCESAMIENTO DE DATOS</a:t>
             </a:r>
-            <a:endParaRPr lang="es-ES" dirty="0"/>
+          </a:p>
+        </p:txBody>
+      </p:sp>
+    </p:spTree>
+    <p:extLst>
+      <p:ext uri="{BB962C8B-B14F-4D97-AF65-F5344CB8AC3E}">
+        <p14:creationId xmlns:p14="http://schemas.microsoft.com/office/powerpoint/2010/main" val="3844390514"/>
+      </p:ext>
+    </p:extLst>
+  </p:cSld>
+  <p:clrMapOvr>
+    <a:masterClrMapping/>
+  </p:clrMapOvr>
+</p:sld>
+</file>
+
+<file path=ppt/slides/slide5.xml><?xml version="1.0" encoding="utf-8"?>
+<p:sld xmlns:a="http://schemas.openxmlformats.org/drawingml/2006/main" xmlns:r="http://schemas.openxmlformats.org/officeDocument/2006/relationships" xmlns:p="http://schemas.openxmlformats.org/presentationml/2006/main">
+  <p:cSld>
+    <p:spTree>
+      <p:nvGrpSpPr>
+        <p:cNvPr id="1" name=""/>
+        <p:cNvGrpSpPr/>
+        <p:nvPr/>
+      </p:nvGrpSpPr>
+      <p:grpSpPr>
+        <a:xfrm>
+          <a:off x="0" y="0"/>
+          <a:ext cx="0" cy="0"/>
+          <a:chOff x="0" y="0"/>
+          <a:chExt cx="0" cy="0"/>
+        </a:xfrm>
+      </p:grpSpPr>
+      <p:sp>
+        <p:nvSpPr>
+          <p:cNvPr id="12" name="Rectangle 11"/>
+          <p:cNvSpPr>
+            <a:spLocks noGrp="1" noRot="1" noChangeAspect="1" noMove="1" noResize="1" noEditPoints="1" noAdjustHandles="1" noChangeArrowheads="1" noChangeShapeType="1" noTextEdit="1"/>
+          </p:cNvSpPr>
+          <p:nvPr>
+            <p:extLst>
+              <p:ext uri="{386F3935-93C4-4BCD-93E2-E3B085C9AB24}">
+                <p16:designElem xmlns:p16="http://schemas.microsoft.com/office/powerpoint/2015/main" val="1"/>
+              </p:ext>
+            </p:extLst>
+          </p:nvPr>
+        </p:nvSpPr>
+        <p:spPr bwMode="white">
+          <a:xfrm>
+            <a:off x="0" y="0"/>
+            <a:ext cx="12192000" cy="6858000"/>
+          </a:xfrm>
+          <a:prstGeom prst="rect">
+            <a:avLst/>
+          </a:prstGeom>
+          <a:solidFill>
+            <a:schemeClr val="bg1"/>
+          </a:solidFill>
+          <a:ln>
+            <a:noFill/>
+          </a:ln>
+          <a:effectLst/>
+        </p:spPr>
+      </p:sp>
+      <p:sp>
+        <p:nvSpPr>
+          <p:cNvPr id="13" name="Rectangle 12"/>
+          <p:cNvSpPr>
+            <a:spLocks noGrp="1" noRot="1" noChangeAspect="1" noMove="1" noResize="1" noEditPoints="1" noAdjustHandles="1" noChangeArrowheads="1" noChangeShapeType="1" noTextEdit="1"/>
+          </p:cNvSpPr>
+          <p:nvPr>
+            <p:extLst>
+              <p:ext uri="{386F3935-93C4-4BCD-93E2-E3B085C9AB24}">
+                <p16:designElem xmlns:p16="http://schemas.microsoft.com/office/powerpoint/2015/main" val="1"/>
+              </p:ext>
+            </p:extLst>
+          </p:nvPr>
+        </p:nvSpPr>
+        <p:spPr>
+          <a:xfrm>
+            <a:off x="0" y="651752"/>
+            <a:ext cx="12192000" cy="736551"/>
+          </a:xfrm>
+          <a:prstGeom prst="rect">
+            <a:avLst/>
+          </a:prstGeom>
+          <a:solidFill>
+            <a:schemeClr val="tx1">
+              <a:alpha val="75000"/>
+            </a:schemeClr>
+          </a:solidFill>
+          <a:ln>
+            <a:noFill/>
+          </a:ln>
+        </p:spPr>
+        <p:style>
+          <a:lnRef idx="2">
+            <a:schemeClr val="accent1">
+              <a:shade val="50000"/>
+            </a:schemeClr>
+          </a:lnRef>
+          <a:fillRef idx="1">
+            <a:schemeClr val="accent1"/>
+          </a:fillRef>
+          <a:effectRef idx="0">
+            <a:schemeClr val="accent1"/>
+          </a:effectRef>
+          <a:fontRef idx="minor">
+            <a:schemeClr val="lt1"/>
+          </a:fontRef>
+        </p:style>
+        <p:txBody>
+          <a:bodyPr rtlCol="0" anchor="ctr"/>
+          <a:lstStyle/>
+          <a:p>
+            <a:pPr algn="ctr"/>
+            <a:endParaRPr lang="en-US"/>
+          </a:p>
+        </p:txBody>
+      </p:sp>
+      <p:pic>
+        <p:nvPicPr>
+          <p:cNvPr id="8" name="Imagen 7"/>
+          <p:cNvPicPr>
+            <a:picLocks noChangeAspect="1"/>
+          </p:cNvPicPr>
+          <p:nvPr/>
+        </p:nvPicPr>
+        <p:blipFill>
+          <a:blip r:embed="rId2">
+            <a:extLst>
+              <a:ext uri="{28A0092B-C50C-407E-A947-70E740481C1C}">
+                <a14:useLocalDpi xmlns:a14="http://schemas.microsoft.com/office/drawing/2010/main" val="0"/>
+              </a:ext>
+            </a:extLst>
+          </a:blip>
+          <a:stretch>
+            <a:fillRect/>
+          </a:stretch>
+        </p:blipFill>
+        <p:spPr>
+          <a:xfrm>
+            <a:off x="754523" y="1388303"/>
+            <a:ext cx="10682953" cy="5421600"/>
+          </a:xfrm>
+          <a:prstGeom prst="rect">
+            <a:avLst/>
+          </a:prstGeom>
+        </p:spPr>
+      </p:pic>
+      <p:sp>
+        <p:nvSpPr>
+          <p:cNvPr id="2" name="Título 1"/>
+          <p:cNvSpPr>
+            <a:spLocks noGrp="1"/>
+          </p:cNvSpPr>
+          <p:nvPr>
+            <p:ph type="title"/>
+          </p:nvPr>
+        </p:nvSpPr>
+        <p:spPr>
+          <a:xfrm>
+            <a:off x="556532" y="643467"/>
+            <a:ext cx="11210925" cy="744836"/>
+          </a:xfrm>
+        </p:spPr>
+        <p:txBody>
+          <a:bodyPr vert="horz" lIns="91440" tIns="45720" rIns="91440" bIns="45720" rtlCol="0" anchor="ctr">
+            <a:normAutofit/>
+          </a:bodyPr>
+          <a:lstStyle/>
+          <a:p>
+            <a:pPr algn="ctr"/>
+            <a:r>
+              <a:rPr lang="en-US" sz="3200" dirty="0">
+                <a:solidFill>
+                  <a:schemeClr val="bg1"/>
+                </a:solidFill>
+              </a:rPr>
+              <a:t>PROCESAMIENTO DE DATOS</a:t>
+            </a:r>
+          </a:p>
+        </p:txBody>
+      </p:sp>
+    </p:spTree>
+    <p:extLst>
+      <p:ext uri="{BB962C8B-B14F-4D97-AF65-F5344CB8AC3E}">
+        <p14:creationId xmlns:p14="http://schemas.microsoft.com/office/powerpoint/2010/main" val="38684972"/>
+      </p:ext>
+    </p:extLst>
+  </p:cSld>
+  <p:clrMapOvr>
+    <a:masterClrMapping/>
+  </p:clrMapOvr>
+</p:sld>
+</file>
+
+<file path=ppt/slides/slide6.xml><?xml version="1.0" encoding="utf-8"?>
+<p:sld xmlns:a="http://schemas.openxmlformats.org/drawingml/2006/main" xmlns:r="http://schemas.openxmlformats.org/officeDocument/2006/relationships" xmlns:p="http://schemas.openxmlformats.org/presentationml/2006/main">
+  <p:cSld>
+    <p:spTree>
+      <p:nvGrpSpPr>
+        <p:cNvPr id="1" name=""/>
+        <p:cNvGrpSpPr/>
+        <p:nvPr/>
+      </p:nvGrpSpPr>
+      <p:grpSpPr>
+        <a:xfrm>
+          <a:off x="0" y="0"/>
+          <a:ext cx="0" cy="0"/>
+          <a:chOff x="0" y="0"/>
+          <a:chExt cx="0" cy="0"/>
+        </a:xfrm>
+      </p:grpSpPr>
+      <p:sp>
+        <p:nvSpPr>
+          <p:cNvPr id="12" name="Rectangle 11"/>
+          <p:cNvSpPr>
+            <a:spLocks noGrp="1" noRot="1" noChangeAspect="1" noMove="1" noResize="1" noEditPoints="1" noAdjustHandles="1" noChangeArrowheads="1" noChangeShapeType="1" noTextEdit="1"/>
+          </p:cNvSpPr>
+          <p:nvPr>
+            <p:extLst>
+              <p:ext uri="{386F3935-93C4-4BCD-93E2-E3B085C9AB24}">
+                <p16:designElem xmlns:p16="http://schemas.microsoft.com/office/powerpoint/2015/main" val="1"/>
+              </p:ext>
+            </p:extLst>
+          </p:nvPr>
+        </p:nvSpPr>
+        <p:spPr bwMode="white">
+          <a:xfrm>
+            <a:off x="0" y="0"/>
+            <a:ext cx="12192000" cy="6858000"/>
+          </a:xfrm>
+          <a:prstGeom prst="rect">
+            <a:avLst/>
+          </a:prstGeom>
+          <a:solidFill>
+            <a:schemeClr val="bg1"/>
+          </a:solidFill>
+          <a:ln>
+            <a:noFill/>
+          </a:ln>
+          <a:effectLst/>
+        </p:spPr>
+      </p:sp>
+      <p:sp>
+        <p:nvSpPr>
+          <p:cNvPr id="13" name="Rectangle 12"/>
+          <p:cNvSpPr>
+            <a:spLocks noGrp="1" noRot="1" noChangeAspect="1" noMove="1" noResize="1" noEditPoints="1" noAdjustHandles="1" noChangeArrowheads="1" noChangeShapeType="1" noTextEdit="1"/>
+          </p:cNvSpPr>
+          <p:nvPr>
+            <p:extLst>
+              <p:ext uri="{386F3935-93C4-4BCD-93E2-E3B085C9AB24}">
+                <p16:designElem xmlns:p16="http://schemas.microsoft.com/office/powerpoint/2015/main" val="1"/>
+              </p:ext>
+            </p:extLst>
+          </p:nvPr>
+        </p:nvSpPr>
+        <p:spPr>
+          <a:xfrm>
+            <a:off x="0" y="651752"/>
+            <a:ext cx="12192000" cy="736551"/>
+          </a:xfrm>
+          <a:prstGeom prst="rect">
+            <a:avLst/>
+          </a:prstGeom>
+          <a:solidFill>
+            <a:schemeClr val="tx1">
+              <a:alpha val="75000"/>
+            </a:schemeClr>
+          </a:solidFill>
+          <a:ln>
+            <a:noFill/>
+          </a:ln>
+        </p:spPr>
+        <p:style>
+          <a:lnRef idx="2">
+            <a:schemeClr val="accent1">
+              <a:shade val="50000"/>
+            </a:schemeClr>
+          </a:lnRef>
+          <a:fillRef idx="1">
+            <a:schemeClr val="accent1"/>
+          </a:fillRef>
+          <a:effectRef idx="0">
+            <a:schemeClr val="accent1"/>
+          </a:effectRef>
+          <a:fontRef idx="minor">
+            <a:schemeClr val="lt1"/>
+          </a:fontRef>
+        </p:style>
+        <p:txBody>
+          <a:bodyPr rtlCol="0" anchor="ctr"/>
+          <a:lstStyle/>
+          <a:p>
+            <a:pPr algn="ctr"/>
+            <a:endParaRPr lang="en-US"/>
+          </a:p>
+        </p:txBody>
+      </p:sp>
+      <p:pic>
+        <p:nvPicPr>
+          <p:cNvPr id="3" name="Imagen 2"/>
+          <p:cNvPicPr>
+            <a:picLocks noChangeAspect="1"/>
+          </p:cNvPicPr>
+          <p:nvPr/>
+        </p:nvPicPr>
+        <p:blipFill>
+          <a:blip r:embed="rId2">
+            <a:extLst>
+              <a:ext uri="{28A0092B-C50C-407E-A947-70E740481C1C}">
+                <a14:useLocalDpi xmlns:a14="http://schemas.microsoft.com/office/drawing/2010/main" val="0"/>
+              </a:ext>
+            </a:extLst>
+          </a:blip>
+          <a:stretch>
+            <a:fillRect/>
+          </a:stretch>
+        </p:blipFill>
+        <p:spPr>
+          <a:xfrm>
+            <a:off x="753776" y="1388303"/>
+            <a:ext cx="10684448" cy="5422359"/>
+          </a:xfrm>
+          <a:prstGeom prst="rect">
+            <a:avLst/>
+          </a:prstGeom>
+        </p:spPr>
+      </p:pic>
+      <p:sp>
+        <p:nvSpPr>
+          <p:cNvPr id="2" name="Título 1"/>
+          <p:cNvSpPr>
+            <a:spLocks noGrp="1"/>
+          </p:cNvSpPr>
+          <p:nvPr>
+            <p:ph type="title"/>
+          </p:nvPr>
+        </p:nvSpPr>
+        <p:spPr>
+          <a:xfrm>
+            <a:off x="556532" y="643467"/>
+            <a:ext cx="11210925" cy="744836"/>
+          </a:xfrm>
+        </p:spPr>
+        <p:txBody>
+          <a:bodyPr vert="horz" lIns="91440" tIns="45720" rIns="91440" bIns="45720" rtlCol="0" anchor="ctr">
+            <a:normAutofit/>
+          </a:bodyPr>
+          <a:lstStyle/>
+          <a:p>
+            <a:pPr algn="ctr"/>
+            <a:r>
+              <a:rPr lang="en-US" sz="3200">
+                <a:solidFill>
+                  <a:schemeClr val="bg1"/>
+                </a:solidFill>
+              </a:rPr>
+              <a:t>PROCESAMIENTO DE DATOS</a:t>
+            </a:r>
+          </a:p>
+        </p:txBody>
+      </p:sp>
+    </p:spTree>
+    <p:extLst>
+      <p:ext uri="{BB962C8B-B14F-4D97-AF65-F5344CB8AC3E}">
+        <p14:creationId xmlns:p14="http://schemas.microsoft.com/office/powerpoint/2010/main" val="1316324414"/>
+      </p:ext>
+    </p:extLst>
+  </p:cSld>
+  <p:clrMapOvr>
+    <a:masterClrMapping/>
+  </p:clrMapOvr>
+</p:sld>
+</file>
+
+<file path=ppt/slides/slide7.xml><?xml version="1.0" encoding="utf-8"?>
+<p:sld xmlns:a="http://schemas.openxmlformats.org/drawingml/2006/main" xmlns:r="http://schemas.openxmlformats.org/officeDocument/2006/relationships" xmlns:p="http://schemas.openxmlformats.org/presentationml/2006/main">
+  <p:cSld>
+    <p:spTree>
+      <p:nvGrpSpPr>
+        <p:cNvPr id="1" name=""/>
+        <p:cNvGrpSpPr/>
+        <p:nvPr/>
+      </p:nvGrpSpPr>
+      <p:grpSpPr>
+        <a:xfrm>
+          <a:off x="0" y="0"/>
+          <a:ext cx="0" cy="0"/>
+          <a:chOff x="0" y="0"/>
+          <a:chExt cx="0" cy="0"/>
+        </a:xfrm>
+      </p:grpSpPr>
+      <p:sp>
+        <p:nvSpPr>
+          <p:cNvPr id="5" name="Rectangle 4"/>
+          <p:cNvSpPr>
+            <a:spLocks noGrp="1" noRot="1" noChangeAspect="1" noMove="1" noResize="1" noEditPoints="1" noAdjustHandles="1" noChangeArrowheads="1" noChangeShapeType="1" noTextEdit="1"/>
+          </p:cNvSpPr>
+          <p:nvPr>
+            <p:extLst>
+              <p:ext uri="{386F3935-93C4-4BCD-93E2-E3B085C9AB24}">
+                <p16:designElem xmlns:p16="http://schemas.microsoft.com/office/powerpoint/2015/main" val="1"/>
+              </p:ext>
+            </p:extLst>
+          </p:nvPr>
+        </p:nvSpPr>
+        <p:spPr>
+          <a:xfrm>
+            <a:off x="0" y="-3324"/>
+            <a:ext cx="12192000" cy="6861324"/>
+          </a:xfrm>
+          <a:prstGeom prst="rect">
+            <a:avLst/>
+          </a:prstGeom>
+          <a:solidFill>
+            <a:srgbClr val="404040"/>
+          </a:solidFill>
+          <a:ln>
+            <a:noFill/>
+          </a:ln>
+        </p:spPr>
+        <p:style>
+          <a:lnRef idx="2">
+            <a:schemeClr val="accent1">
+              <a:shade val="50000"/>
+            </a:schemeClr>
+          </a:lnRef>
+          <a:fillRef idx="1">
+            <a:schemeClr val="accent1"/>
+          </a:fillRef>
+          <a:effectRef idx="0">
+            <a:schemeClr val="accent1"/>
+          </a:effectRef>
+          <a:fontRef idx="minor">
+            <a:schemeClr val="lt1"/>
+          </a:fontRef>
+        </p:style>
+        <p:txBody>
+          <a:bodyPr rtlCol="0" anchor="ctr"/>
+          <a:lstStyle/>
+          <a:p>
+            <a:pPr algn="ctr"/>
+            <a:endParaRPr lang="en-US"/>
+          </a:p>
+        </p:txBody>
+      </p:sp>
+      <p:sp>
+        <p:nvSpPr>
+          <p:cNvPr id="6" name="Freeform 13"/>
+          <p:cNvSpPr>
+            <a:spLocks noGrp="1" noRot="1" noChangeAspect="1" noMove="1" noResize="1" noEditPoints="1" noAdjustHandles="1" noChangeArrowheads="1" noChangeShapeType="1" noTextEdit="1"/>
+          </p:cNvSpPr>
+          <p:nvPr>
+            <p:extLst>
+              <p:ext uri="{386F3935-93C4-4BCD-93E2-E3B085C9AB24}">
+                <p16:designElem xmlns:p16="http://schemas.microsoft.com/office/powerpoint/2015/main" val="1"/>
+              </p:ext>
+            </p:extLst>
+          </p:nvPr>
+        </p:nvSpPr>
+        <p:spPr>
+          <a:xfrm>
+            <a:off x="0" y="0"/>
+            <a:ext cx="11786754" cy="6858000"/>
+          </a:xfrm>
+          <a:custGeom>
+            <a:avLst/>
+            <a:gdLst>
+              <a:gd name="connsiteX0" fmla="*/ 0 w 11786754"/>
+              <a:gd name="connsiteY0" fmla="*/ 0 h 6858000"/>
+              <a:gd name="connsiteX1" fmla="*/ 8610600 w 11786754"/>
+              <a:gd name="connsiteY1" fmla="*/ 0 h 6858000"/>
+              <a:gd name="connsiteX2" fmla="*/ 11786754 w 11786754"/>
+              <a:gd name="connsiteY2" fmla="*/ 6858000 h 6858000"/>
+              <a:gd name="connsiteX3" fmla="*/ 0 w 11786754"/>
+              <a:gd name="connsiteY3" fmla="*/ 6858000 h 6858000"/>
+            </a:gdLst>
+            <a:ahLst/>
+            <a:cxnLst>
+              <a:cxn ang="0">
+                <a:pos x="connsiteX0" y="connsiteY0"/>
+              </a:cxn>
+              <a:cxn ang="0">
+                <a:pos x="connsiteX1" y="connsiteY1"/>
+              </a:cxn>
+              <a:cxn ang="0">
+                <a:pos x="connsiteX2" y="connsiteY2"/>
+              </a:cxn>
+              <a:cxn ang="0">
+                <a:pos x="connsiteX3" y="connsiteY3"/>
+              </a:cxn>
+            </a:cxnLst>
+            <a:rect l="l" t="t" r="r" b="b"/>
+            <a:pathLst>
+              <a:path w="11786754" h="6858000">
+                <a:moveTo>
+                  <a:pt x="0" y="0"/>
+                </a:moveTo>
+                <a:lnTo>
+                  <a:pt x="8610600" y="0"/>
+                </a:lnTo>
+                <a:lnTo>
+                  <a:pt x="11786754" y="6858000"/>
+                </a:lnTo>
+                <a:lnTo>
+                  <a:pt x="0" y="6858000"/>
+                </a:lnTo>
+                <a:close/>
+              </a:path>
+            </a:pathLst>
+          </a:custGeom>
+          <a:solidFill>
+            <a:schemeClr val="bg1">
+              <a:alpha val="30000"/>
+            </a:schemeClr>
+          </a:solidFill>
+          <a:ln>
+            <a:noFill/>
+          </a:ln>
+        </p:spPr>
+        <p:style>
+          <a:lnRef idx="2">
+            <a:schemeClr val="accent1">
+              <a:shade val="50000"/>
+            </a:schemeClr>
+          </a:lnRef>
+          <a:fillRef idx="1">
+            <a:schemeClr val="accent1"/>
+          </a:fillRef>
+          <a:effectRef idx="0">
+            <a:schemeClr val="accent1"/>
+          </a:effectRef>
+          <a:fontRef idx="minor">
+            <a:schemeClr val="lt1"/>
+          </a:fontRef>
+        </p:style>
+        <p:txBody>
+          <a:bodyPr rtlCol="0" anchor="ctr"/>
+          <a:lstStyle/>
+          <a:p>
+            <a:pPr algn="ctr"/>
+            <a:endParaRPr lang="en-US"/>
+          </a:p>
+        </p:txBody>
+      </p:sp>
+      <p:sp>
+        <p:nvSpPr>
+          <p:cNvPr id="7" name="Freeform 11"/>
+          <p:cNvSpPr>
+            <a:spLocks noGrp="1" noRot="1" noChangeAspect="1" noMove="1" noResize="1" noEditPoints="1" noAdjustHandles="1" noChangeArrowheads="1" noChangeShapeType="1" noTextEdit="1"/>
+          </p:cNvSpPr>
+          <p:nvPr>
+            <p:extLst>
+              <p:ext uri="{386F3935-93C4-4BCD-93E2-E3B085C9AB24}">
+                <p16:designElem xmlns:p16="http://schemas.microsoft.com/office/powerpoint/2015/main" val="1"/>
+              </p:ext>
+            </p:extLst>
+          </p:nvPr>
+        </p:nvSpPr>
+        <p:spPr>
+          <a:xfrm>
+            <a:off x="0" y="0"/>
+            <a:ext cx="3581400" cy="6858000"/>
+          </a:xfrm>
+          <a:custGeom>
+            <a:avLst/>
+            <a:gdLst>
+              <a:gd name="connsiteX0" fmla="*/ 0 w 3581400"/>
+              <a:gd name="connsiteY0" fmla="*/ 0 h 6858000"/>
+              <a:gd name="connsiteX1" fmla="*/ 405246 w 3581400"/>
+              <a:gd name="connsiteY1" fmla="*/ 0 h 6858000"/>
+              <a:gd name="connsiteX2" fmla="*/ 3581400 w 3581400"/>
+              <a:gd name="connsiteY2" fmla="*/ 6858000 h 6858000"/>
+              <a:gd name="connsiteX3" fmla="*/ 0 w 3581400"/>
+              <a:gd name="connsiteY3" fmla="*/ 6858000 h 6858000"/>
+            </a:gdLst>
+            <a:ahLst/>
+            <a:cxnLst>
+              <a:cxn ang="0">
+                <a:pos x="connsiteX0" y="connsiteY0"/>
+              </a:cxn>
+              <a:cxn ang="0">
+                <a:pos x="connsiteX1" y="connsiteY1"/>
+              </a:cxn>
+              <a:cxn ang="0">
+                <a:pos x="connsiteX2" y="connsiteY2"/>
+              </a:cxn>
+              <a:cxn ang="0">
+                <a:pos x="connsiteX3" y="connsiteY3"/>
+              </a:cxn>
+            </a:cxnLst>
+            <a:rect l="l" t="t" r="r" b="b"/>
+            <a:pathLst>
+              <a:path w="3581400" h="6858000">
+                <a:moveTo>
+                  <a:pt x="0" y="0"/>
+                </a:moveTo>
+                <a:lnTo>
+                  <a:pt x="405246" y="0"/>
+                </a:lnTo>
+                <a:lnTo>
+                  <a:pt x="3581400" y="6858000"/>
+                </a:lnTo>
+                <a:lnTo>
+                  <a:pt x="0" y="6858000"/>
+                </a:lnTo>
+                <a:close/>
+              </a:path>
+            </a:pathLst>
+          </a:custGeom>
+          <a:solidFill>
+            <a:schemeClr val="bg1">
+              <a:alpha val="30000"/>
+            </a:schemeClr>
+          </a:solidFill>
+          <a:ln>
+            <a:noFill/>
+          </a:ln>
+        </p:spPr>
+        <p:style>
+          <a:lnRef idx="2">
+            <a:schemeClr val="accent1">
+              <a:shade val="50000"/>
+            </a:schemeClr>
+          </a:lnRef>
+          <a:fillRef idx="1">
+            <a:schemeClr val="accent1"/>
+          </a:fillRef>
+          <a:effectRef idx="0">
+            <a:schemeClr val="accent1"/>
+          </a:effectRef>
+          <a:fontRef idx="minor">
+            <a:schemeClr val="lt1"/>
+          </a:fontRef>
+        </p:style>
+        <p:txBody>
+          <a:bodyPr wrap="square" rtlCol="0" anchor="ctr">
+            <a:noAutofit/>
+          </a:bodyPr>
+          <a:lstStyle/>
+          <a:p>
+            <a:pPr algn="ctr"/>
+            <a:endParaRPr lang="en-US"/>
+          </a:p>
+        </p:txBody>
+      </p:sp>
+      <p:sp>
+        <p:nvSpPr>
+          <p:cNvPr id="2" name="Título 1"/>
+          <p:cNvSpPr>
+            <a:spLocks noGrp="1"/>
+          </p:cNvSpPr>
+          <p:nvPr>
+            <p:ph type="title"/>
+          </p:nvPr>
+        </p:nvSpPr>
+        <p:spPr>
+          <a:xfrm>
+            <a:off x="833002" y="365125"/>
+            <a:ext cx="10520702" cy="1325563"/>
+          </a:xfrm>
+        </p:spPr>
+        <p:txBody>
+          <a:bodyPr>
+            <a:normAutofit/>
+          </a:bodyPr>
+          <a:lstStyle/>
+          <a:p>
+            <a:r>
+              <a:rPr lang="es-ES" dirty="0"/>
+              <a:t>PROCESAMIENTO DE DATOS</a:t>
+            </a:r>
           </a:p>
         </p:txBody>
       </p:sp>

</xml_diff>

<commit_message>
añadida parte de knn, random forest etc a la presentación
</commit_message>
<xml_diff>
--- a/docs/PresentacionFinal.pptx
+++ b/docs/PresentacionFinal.pptx
@@ -20,6 +20,9 @@
     <p:sldId id="268" r:id="rId14"/>
     <p:sldId id="269" r:id="rId15"/>
     <p:sldId id="270" r:id="rId16"/>
+    <p:sldId id="271" r:id="rId17"/>
+    <p:sldId id="272" r:id="rId18"/>
+    <p:sldId id="273" r:id="rId19"/>
   </p:sldIdLst>
   <p:sldSz cx="12192000" cy="6858000"/>
   <p:notesSz cx="6858000" cy="9144000"/>
@@ -5640,7 +5643,7 @@
           <a:p>
             <a:r>
               <a:rPr lang="es-ES" dirty="0"/>
-              <a:t>REDES DE NEURONAS – PYTHON</a:t>
+              <a:t>PYTHON: Redes de neuronas</a:t>
             </a:r>
           </a:p>
         </p:txBody>
@@ -5673,6 +5676,2742 @@
   </p:cSld>
   <p:clrMapOvr>
     <a:masterClrMapping/>
+  </p:clrMapOvr>
+</p:sld>
+</file>
+
+<file path=ppt/slides/slide16.xml><?xml version="1.0" encoding="utf-8"?>
+<p:sld xmlns:a="http://schemas.openxmlformats.org/drawingml/2006/main" xmlns:r="http://schemas.openxmlformats.org/officeDocument/2006/relationships" xmlns:p="http://schemas.openxmlformats.org/presentationml/2006/main">
+  <p:cSld>
+    <p:spTree>
+      <p:nvGrpSpPr>
+        <p:cNvPr id="1" name=""/>
+        <p:cNvGrpSpPr/>
+        <p:nvPr/>
+      </p:nvGrpSpPr>
+      <p:grpSpPr>
+        <a:xfrm>
+          <a:off x="0" y="0"/>
+          <a:ext cx="0" cy="0"/>
+          <a:chOff x="0" y="0"/>
+          <a:chExt cx="0" cy="0"/>
+        </a:xfrm>
+      </p:grpSpPr>
+      <p:sp>
+        <p:nvSpPr>
+          <p:cNvPr id="5" name="Rectangle 4"/>
+          <p:cNvSpPr>
+            <a:spLocks noGrp="1" noRot="1" noChangeAspect="1" noMove="1" noResize="1" noEditPoints="1" noAdjustHandles="1" noChangeArrowheads="1" noChangeShapeType="1" noTextEdit="1"/>
+          </p:cNvSpPr>
+          <p:nvPr>
+            <p:extLst>
+              <p:ext uri="{386F3935-93C4-4BCD-93E2-E3B085C9AB24}">
+                <p16:designElem xmlns:p16="http://schemas.microsoft.com/office/powerpoint/2015/main" val="1"/>
+              </p:ext>
+            </p:extLst>
+          </p:nvPr>
+        </p:nvSpPr>
+        <p:spPr>
+          <a:xfrm>
+            <a:off x="0" y="-3324"/>
+            <a:ext cx="12192000" cy="6861324"/>
+          </a:xfrm>
+          <a:prstGeom prst="rect">
+            <a:avLst/>
+          </a:prstGeom>
+          <a:solidFill>
+            <a:srgbClr val="404040"/>
+          </a:solidFill>
+          <a:ln>
+            <a:noFill/>
+          </a:ln>
+        </p:spPr>
+        <p:style>
+          <a:lnRef idx="2">
+            <a:schemeClr val="accent1">
+              <a:shade val="50000"/>
+            </a:schemeClr>
+          </a:lnRef>
+          <a:fillRef idx="1">
+            <a:schemeClr val="accent1"/>
+          </a:fillRef>
+          <a:effectRef idx="0">
+            <a:schemeClr val="accent1"/>
+          </a:effectRef>
+          <a:fontRef idx="minor">
+            <a:schemeClr val="lt1"/>
+          </a:fontRef>
+        </p:style>
+        <p:txBody>
+          <a:bodyPr rtlCol="0" anchor="ctr"/>
+          <a:lstStyle/>
+          <a:p>
+            <a:pPr algn="ctr"/>
+            <a:endParaRPr lang="en-US"/>
+          </a:p>
+        </p:txBody>
+      </p:sp>
+      <p:sp>
+        <p:nvSpPr>
+          <p:cNvPr id="6" name="Freeform 13"/>
+          <p:cNvSpPr>
+            <a:spLocks noGrp="1" noRot="1" noChangeAspect="1" noMove="1" noResize="1" noEditPoints="1" noAdjustHandles="1" noChangeArrowheads="1" noChangeShapeType="1" noTextEdit="1"/>
+          </p:cNvSpPr>
+          <p:nvPr>
+            <p:extLst>
+              <p:ext uri="{386F3935-93C4-4BCD-93E2-E3B085C9AB24}">
+                <p16:designElem xmlns:p16="http://schemas.microsoft.com/office/powerpoint/2015/main" val="1"/>
+              </p:ext>
+            </p:extLst>
+          </p:nvPr>
+        </p:nvSpPr>
+        <p:spPr>
+          <a:xfrm>
+            <a:off x="0" y="0"/>
+            <a:ext cx="11786754" cy="6858000"/>
+          </a:xfrm>
+          <a:custGeom>
+            <a:avLst/>
+            <a:gdLst>
+              <a:gd name="connsiteX0" fmla="*/ 0 w 11786754"/>
+              <a:gd name="connsiteY0" fmla="*/ 0 h 6858000"/>
+              <a:gd name="connsiteX1" fmla="*/ 8610600 w 11786754"/>
+              <a:gd name="connsiteY1" fmla="*/ 0 h 6858000"/>
+              <a:gd name="connsiteX2" fmla="*/ 11786754 w 11786754"/>
+              <a:gd name="connsiteY2" fmla="*/ 6858000 h 6858000"/>
+              <a:gd name="connsiteX3" fmla="*/ 0 w 11786754"/>
+              <a:gd name="connsiteY3" fmla="*/ 6858000 h 6858000"/>
+            </a:gdLst>
+            <a:ahLst/>
+            <a:cxnLst>
+              <a:cxn ang="0">
+                <a:pos x="connsiteX0" y="connsiteY0"/>
+              </a:cxn>
+              <a:cxn ang="0">
+                <a:pos x="connsiteX1" y="connsiteY1"/>
+              </a:cxn>
+              <a:cxn ang="0">
+                <a:pos x="connsiteX2" y="connsiteY2"/>
+              </a:cxn>
+              <a:cxn ang="0">
+                <a:pos x="connsiteX3" y="connsiteY3"/>
+              </a:cxn>
+            </a:cxnLst>
+            <a:rect l="l" t="t" r="r" b="b"/>
+            <a:pathLst>
+              <a:path w="11786754" h="6858000">
+                <a:moveTo>
+                  <a:pt x="0" y="0"/>
+                </a:moveTo>
+                <a:lnTo>
+                  <a:pt x="8610600" y="0"/>
+                </a:lnTo>
+                <a:lnTo>
+                  <a:pt x="11786754" y="6858000"/>
+                </a:lnTo>
+                <a:lnTo>
+                  <a:pt x="0" y="6858000"/>
+                </a:lnTo>
+                <a:close/>
+              </a:path>
+            </a:pathLst>
+          </a:custGeom>
+          <a:solidFill>
+            <a:schemeClr val="bg1">
+              <a:alpha val="30000"/>
+            </a:schemeClr>
+          </a:solidFill>
+          <a:ln>
+            <a:noFill/>
+          </a:ln>
+        </p:spPr>
+        <p:style>
+          <a:lnRef idx="2">
+            <a:schemeClr val="accent1">
+              <a:shade val="50000"/>
+            </a:schemeClr>
+          </a:lnRef>
+          <a:fillRef idx="1">
+            <a:schemeClr val="accent1"/>
+          </a:fillRef>
+          <a:effectRef idx="0">
+            <a:schemeClr val="accent1"/>
+          </a:effectRef>
+          <a:fontRef idx="minor">
+            <a:schemeClr val="lt1"/>
+          </a:fontRef>
+        </p:style>
+        <p:txBody>
+          <a:bodyPr rtlCol="0" anchor="ctr"/>
+          <a:lstStyle/>
+          <a:p>
+            <a:pPr algn="ctr"/>
+            <a:endParaRPr lang="en-US"/>
+          </a:p>
+        </p:txBody>
+      </p:sp>
+      <p:sp>
+        <p:nvSpPr>
+          <p:cNvPr id="7" name="Freeform 11"/>
+          <p:cNvSpPr>
+            <a:spLocks noGrp="1" noRot="1" noChangeAspect="1" noMove="1" noResize="1" noEditPoints="1" noAdjustHandles="1" noChangeArrowheads="1" noChangeShapeType="1" noTextEdit="1"/>
+          </p:cNvSpPr>
+          <p:nvPr>
+            <p:extLst>
+              <p:ext uri="{386F3935-93C4-4BCD-93E2-E3B085C9AB24}">
+                <p16:designElem xmlns:p16="http://schemas.microsoft.com/office/powerpoint/2015/main" val="1"/>
+              </p:ext>
+            </p:extLst>
+          </p:nvPr>
+        </p:nvSpPr>
+        <p:spPr>
+          <a:xfrm>
+            <a:off x="0" y="0"/>
+            <a:ext cx="3581400" cy="6858000"/>
+          </a:xfrm>
+          <a:custGeom>
+            <a:avLst/>
+            <a:gdLst>
+              <a:gd name="connsiteX0" fmla="*/ 0 w 3581400"/>
+              <a:gd name="connsiteY0" fmla="*/ 0 h 6858000"/>
+              <a:gd name="connsiteX1" fmla="*/ 405246 w 3581400"/>
+              <a:gd name="connsiteY1" fmla="*/ 0 h 6858000"/>
+              <a:gd name="connsiteX2" fmla="*/ 3581400 w 3581400"/>
+              <a:gd name="connsiteY2" fmla="*/ 6858000 h 6858000"/>
+              <a:gd name="connsiteX3" fmla="*/ 0 w 3581400"/>
+              <a:gd name="connsiteY3" fmla="*/ 6858000 h 6858000"/>
+            </a:gdLst>
+            <a:ahLst/>
+            <a:cxnLst>
+              <a:cxn ang="0">
+                <a:pos x="connsiteX0" y="connsiteY0"/>
+              </a:cxn>
+              <a:cxn ang="0">
+                <a:pos x="connsiteX1" y="connsiteY1"/>
+              </a:cxn>
+              <a:cxn ang="0">
+                <a:pos x="connsiteX2" y="connsiteY2"/>
+              </a:cxn>
+              <a:cxn ang="0">
+                <a:pos x="connsiteX3" y="connsiteY3"/>
+              </a:cxn>
+            </a:cxnLst>
+            <a:rect l="l" t="t" r="r" b="b"/>
+            <a:pathLst>
+              <a:path w="3581400" h="6858000">
+                <a:moveTo>
+                  <a:pt x="0" y="0"/>
+                </a:moveTo>
+                <a:lnTo>
+                  <a:pt x="405246" y="0"/>
+                </a:lnTo>
+                <a:lnTo>
+                  <a:pt x="3581400" y="6858000"/>
+                </a:lnTo>
+                <a:lnTo>
+                  <a:pt x="0" y="6858000"/>
+                </a:lnTo>
+                <a:close/>
+              </a:path>
+            </a:pathLst>
+          </a:custGeom>
+          <a:solidFill>
+            <a:schemeClr val="bg1">
+              <a:alpha val="30000"/>
+            </a:schemeClr>
+          </a:solidFill>
+          <a:ln>
+            <a:noFill/>
+          </a:ln>
+        </p:spPr>
+        <p:style>
+          <a:lnRef idx="2">
+            <a:schemeClr val="accent1">
+              <a:shade val="50000"/>
+            </a:schemeClr>
+          </a:lnRef>
+          <a:fillRef idx="1">
+            <a:schemeClr val="accent1"/>
+          </a:fillRef>
+          <a:effectRef idx="0">
+            <a:schemeClr val="accent1"/>
+          </a:effectRef>
+          <a:fontRef idx="minor">
+            <a:schemeClr val="lt1"/>
+          </a:fontRef>
+        </p:style>
+        <p:txBody>
+          <a:bodyPr wrap="square" rtlCol="0" anchor="ctr">
+            <a:noAutofit/>
+          </a:bodyPr>
+          <a:lstStyle/>
+          <a:p>
+            <a:pPr algn="ctr"/>
+            <a:endParaRPr lang="en-US"/>
+          </a:p>
+        </p:txBody>
+      </p:sp>
+      <p:sp>
+        <p:nvSpPr>
+          <p:cNvPr id="2" name="Título 1"/>
+          <p:cNvSpPr>
+            <a:spLocks noGrp="1"/>
+          </p:cNvSpPr>
+          <p:nvPr>
+            <p:ph type="title"/>
+          </p:nvPr>
+        </p:nvSpPr>
+        <p:spPr>
+          <a:xfrm>
+            <a:off x="833002" y="365125"/>
+            <a:ext cx="10520702" cy="1325563"/>
+          </a:xfrm>
+        </p:spPr>
+        <p:txBody>
+          <a:bodyPr>
+            <a:normAutofit fontScale="90000"/>
+          </a:bodyPr>
+          <a:lstStyle/>
+          <a:p>
+            <a:r>
+              <a:rPr lang="es-ES" sz="5400" dirty="0"/>
+              <a:t>PYTHON: Máquinas de soporte vectorial</a:t>
+            </a:r>
+            <a:endParaRPr lang="es-ES" sz="6000" dirty="0"/>
+          </a:p>
+        </p:txBody>
+      </p:sp>
+      <p:sp>
+        <p:nvSpPr>
+          <p:cNvPr id="3" name="Marcador de contenido 2"/>
+          <p:cNvSpPr>
+            <a:spLocks noGrp="1"/>
+          </p:cNvSpPr>
+          <p:nvPr>
+            <p:ph idx="1"/>
+          </p:nvPr>
+        </p:nvSpPr>
+        <p:spPr>
+          <a:xfrm>
+            <a:off x="838201" y="1690689"/>
+            <a:ext cx="10515598" cy="4486274"/>
+          </a:xfrm>
+        </p:spPr>
+        <p:txBody>
+          <a:bodyPr>
+            <a:normAutofit/>
+          </a:bodyPr>
+          <a:lstStyle/>
+          <a:p>
+            <a:r>
+              <a:rPr lang="es-ES" sz="2400" dirty="0"/>
+              <a:t>Parte de la librería de Anaconda</a:t>
+            </a:r>
+          </a:p>
+          <a:p>
+            <a:r>
+              <a:rPr lang="es-ES" sz="2400" dirty="0"/>
+              <a:t>Utilizamos distintos parámetros para experimentar:</a:t>
+            </a:r>
+          </a:p>
+          <a:p>
+            <a:pPr lvl="1"/>
+            <a:r>
+              <a:rPr lang="es-ES" sz="2000" dirty="0"/>
+              <a:t>El tipo de </a:t>
+            </a:r>
+            <a:r>
+              <a:rPr lang="es-ES" sz="2000" dirty="0" err="1"/>
+              <a:t>kernel</a:t>
+            </a:r>
+            <a:r>
+              <a:rPr lang="es-ES" sz="2000" dirty="0"/>
+              <a:t> (lineal, radial o </a:t>
+            </a:r>
+            <a:r>
+              <a:rPr lang="es-ES" sz="2000" dirty="0" err="1"/>
+              <a:t>polinomial</a:t>
+            </a:r>
+            <a:r>
+              <a:rPr lang="es-ES" sz="2000" dirty="0"/>
+              <a:t>)</a:t>
+            </a:r>
+          </a:p>
+          <a:p>
+            <a:pPr lvl="1"/>
+            <a:r>
+              <a:rPr lang="es-ES" sz="2000" dirty="0"/>
+              <a:t>La rigidez de la clasificación</a:t>
+            </a:r>
+          </a:p>
+          <a:p>
+            <a:pPr lvl="1"/>
+            <a:r>
+              <a:rPr lang="es-ES" sz="2000" dirty="0"/>
+              <a:t>La influencia de un ejemplo en el resto (gamma)</a:t>
+            </a:r>
+          </a:p>
+          <a:p>
+            <a:pPr lvl="1"/>
+            <a:r>
+              <a:rPr lang="es-ES" sz="2000" dirty="0"/>
+              <a:t>Grado del polinomio (nº de dimensiones)</a:t>
+            </a:r>
+          </a:p>
+          <a:p>
+            <a:r>
+              <a:rPr lang="es-ES" sz="2400" dirty="0"/>
+              <a:t>Genera un modelo, que además probamos con los datos de test</a:t>
+            </a:r>
+          </a:p>
+          <a:p>
+            <a:r>
+              <a:rPr lang="es-ES" sz="2400" dirty="0"/>
+              <a:t>Buenos resultados a 5 días</a:t>
+            </a:r>
+          </a:p>
+          <a:p>
+            <a:endParaRPr lang="es-ES" dirty="0"/>
+          </a:p>
+        </p:txBody>
+      </p:sp>
+      <p:graphicFrame>
+        <p:nvGraphicFramePr>
+          <p:cNvPr id="4" name="Tabla 3"/>
+          <p:cNvGraphicFramePr>
+            <a:graphicFrameLocks noGrp="1"/>
+          </p:cNvGraphicFramePr>
+          <p:nvPr>
+            <p:extLst>
+              <p:ext uri="{D42A27DB-BD31-4B8C-83A1-F6EECF244321}">
+                <p14:modId xmlns:p14="http://schemas.microsoft.com/office/powerpoint/2010/main" val="1493646743"/>
+              </p:ext>
+            </p:extLst>
+          </p:nvPr>
+        </p:nvGraphicFramePr>
+        <p:xfrm>
+          <a:off x="203202" y="5065486"/>
+          <a:ext cx="11800111" cy="1209530"/>
+        </p:xfrm>
+        <a:graphic>
+          <a:graphicData uri="http://schemas.openxmlformats.org/drawingml/2006/table">
+            <a:tbl>
+              <a:tblPr>
+                <a:tableStyleId>{5C22544A-7EE6-4342-B048-85BDC9FD1C3A}</a:tableStyleId>
+              </a:tblPr>
+              <a:tblGrid>
+                <a:gridCol w="1021931">
+                  <a:extLst>
+                    <a:ext uri="{9D8B030D-6E8A-4147-A177-3AD203B41FA5}">
+                      <a16:colId xmlns:a16="http://schemas.microsoft.com/office/drawing/2014/main" val="3215955292"/>
+                    </a:ext>
+                  </a:extLst>
+                </a:gridCol>
+                <a:gridCol w="1469027">
+                  <a:extLst>
+                    <a:ext uri="{9D8B030D-6E8A-4147-A177-3AD203B41FA5}">
+                      <a16:colId xmlns:a16="http://schemas.microsoft.com/office/drawing/2014/main" val="97030916"/>
+                    </a:ext>
+                  </a:extLst>
+                </a:gridCol>
+                <a:gridCol w="1053866">
+                  <a:extLst>
+                    <a:ext uri="{9D8B030D-6E8A-4147-A177-3AD203B41FA5}">
+                      <a16:colId xmlns:a16="http://schemas.microsoft.com/office/drawing/2014/main" val="4065635111"/>
+                    </a:ext>
+                  </a:extLst>
+                </a:gridCol>
+                <a:gridCol w="1325317">
+                  <a:extLst>
+                    <a:ext uri="{9D8B030D-6E8A-4147-A177-3AD203B41FA5}">
+                      <a16:colId xmlns:a16="http://schemas.microsoft.com/office/drawing/2014/main" val="414981276"/>
+                    </a:ext>
+                  </a:extLst>
+                </a:gridCol>
+                <a:gridCol w="1309349">
+                  <a:extLst>
+                    <a:ext uri="{9D8B030D-6E8A-4147-A177-3AD203B41FA5}">
+                      <a16:colId xmlns:a16="http://schemas.microsoft.com/office/drawing/2014/main" val="2421585600"/>
+                    </a:ext>
+                  </a:extLst>
+                </a:gridCol>
+                <a:gridCol w="1421123">
+                  <a:extLst>
+                    <a:ext uri="{9D8B030D-6E8A-4147-A177-3AD203B41FA5}">
+                      <a16:colId xmlns:a16="http://schemas.microsoft.com/office/drawing/2014/main" val="1477928825"/>
+                    </a:ext>
+                  </a:extLst>
+                </a:gridCol>
+                <a:gridCol w="1548864">
+                  <a:extLst>
+                    <a:ext uri="{9D8B030D-6E8A-4147-A177-3AD203B41FA5}">
+                      <a16:colId xmlns:a16="http://schemas.microsoft.com/office/drawing/2014/main" val="3590194689"/>
+                    </a:ext>
+                  </a:extLst>
+                </a:gridCol>
+                <a:gridCol w="1245479">
+                  <a:extLst>
+                    <a:ext uri="{9D8B030D-6E8A-4147-A177-3AD203B41FA5}">
+                      <a16:colId xmlns:a16="http://schemas.microsoft.com/office/drawing/2014/main" val="3558903979"/>
+                    </a:ext>
+                  </a:extLst>
+                </a:gridCol>
+                <a:gridCol w="1405155">
+                  <a:extLst>
+                    <a:ext uri="{9D8B030D-6E8A-4147-A177-3AD203B41FA5}">
+                      <a16:colId xmlns:a16="http://schemas.microsoft.com/office/drawing/2014/main" val="304150670"/>
+                    </a:ext>
+                  </a:extLst>
+                </a:gridCol>
+              </a:tblGrid>
+              <a:tr h="670699">
+                <a:tc>
+                  <a:txBody>
+                    <a:bodyPr/>
+                    <a:lstStyle/>
+                    <a:p>
+                      <a:pPr algn="l" fontAlgn="b"/>
+                      <a:endParaRPr lang="es-ES" sz="1400" b="0" i="0" u="none" strike="noStrike" dirty="0">
+                        <a:solidFill>
+                          <a:srgbClr val="000000"/>
+                        </a:solidFill>
+                        <a:effectLst/>
+                        <a:latin typeface="Liberation Sans"/>
+                      </a:endParaRPr>
+                    </a:p>
+                  </a:txBody>
+                  <a:tcPr marL="11038" marR="11038" marT="11038" marB="0" anchor="b"/>
+                </a:tc>
+                <a:tc>
+                  <a:txBody>
+                    <a:bodyPr/>
+                    <a:lstStyle/>
+                    <a:p>
+                      <a:pPr algn="l" fontAlgn="b"/>
+                      <a:r>
+                        <a:rPr lang="es-ES" sz="1400" u="none" strike="noStrike" dirty="0">
+                          <a:effectLst/>
+                        </a:rPr>
+                        <a:t>1DayNormal</a:t>
+                      </a:r>
+                      <a:endParaRPr lang="es-ES" sz="1400" b="0" i="0" u="none" strike="noStrike" dirty="0">
+                        <a:solidFill>
+                          <a:srgbClr val="000000"/>
+                        </a:solidFill>
+                        <a:effectLst/>
+                        <a:latin typeface="Liberation Sans"/>
+                      </a:endParaRPr>
+                    </a:p>
+                  </a:txBody>
+                  <a:tcPr marL="11038" marR="11038" marT="11038" marB="0" anchor="b"/>
+                </a:tc>
+                <a:tc>
+                  <a:txBody>
+                    <a:bodyPr/>
+                    <a:lstStyle/>
+                    <a:p>
+                      <a:pPr algn="l" fontAlgn="b"/>
+                      <a:r>
+                        <a:rPr lang="es-ES" sz="1400" u="none" strike="noStrike" dirty="0">
+                          <a:effectLst/>
+                        </a:rPr>
+                        <a:t>1DayChange</a:t>
+                      </a:r>
+                      <a:endParaRPr lang="es-ES" sz="1400" b="0" i="0" u="none" strike="noStrike" dirty="0">
+                        <a:solidFill>
+                          <a:srgbClr val="000000"/>
+                        </a:solidFill>
+                        <a:effectLst/>
+                        <a:latin typeface="Liberation Sans"/>
+                      </a:endParaRPr>
+                    </a:p>
+                  </a:txBody>
+                  <a:tcPr marL="11038" marR="11038" marT="11038" marB="0" anchor="b"/>
+                </a:tc>
+                <a:tc>
+                  <a:txBody>
+                    <a:bodyPr/>
+                    <a:lstStyle/>
+                    <a:p>
+                      <a:pPr algn="l" fontAlgn="b"/>
+                      <a:r>
+                        <a:rPr lang="es-ES" sz="1400" u="none" strike="noStrike" dirty="0">
+                          <a:effectLst/>
+                        </a:rPr>
+                        <a:t>1DayRChange</a:t>
+                      </a:r>
+                      <a:endParaRPr lang="es-ES" sz="1400" b="0" i="0" u="none" strike="noStrike" dirty="0">
+                        <a:solidFill>
+                          <a:srgbClr val="000000"/>
+                        </a:solidFill>
+                        <a:effectLst/>
+                        <a:latin typeface="Liberation Sans"/>
+                      </a:endParaRPr>
+                    </a:p>
+                  </a:txBody>
+                  <a:tcPr marL="11038" marR="11038" marT="11038" marB="0" anchor="b"/>
+                </a:tc>
+                <a:tc>
+                  <a:txBody>
+                    <a:bodyPr/>
+                    <a:lstStyle/>
+                    <a:p>
+                      <a:pPr algn="l" fontAlgn="b"/>
+                      <a:r>
+                        <a:rPr lang="es-ES" sz="1400" u="none" strike="noStrike" dirty="0">
+                          <a:effectLst/>
+                        </a:rPr>
+                        <a:t>1DayNormalized</a:t>
+                      </a:r>
+                      <a:endParaRPr lang="es-ES" sz="1400" b="0" i="0" u="none" strike="noStrike" dirty="0">
+                        <a:solidFill>
+                          <a:srgbClr val="000000"/>
+                        </a:solidFill>
+                        <a:effectLst/>
+                        <a:latin typeface="Liberation Sans"/>
+                      </a:endParaRPr>
+                    </a:p>
+                  </a:txBody>
+                  <a:tcPr marL="11038" marR="11038" marT="11038" marB="0" anchor="b"/>
+                </a:tc>
+                <a:tc>
+                  <a:txBody>
+                    <a:bodyPr/>
+                    <a:lstStyle/>
+                    <a:p>
+                      <a:pPr algn="l" fontAlgn="b"/>
+                      <a:r>
+                        <a:rPr lang="es-ES" sz="1400" u="none" strike="noStrike" dirty="0">
+                          <a:effectLst/>
+                        </a:rPr>
+                        <a:t>5DaysNormal</a:t>
+                      </a:r>
+                      <a:endParaRPr lang="es-ES" sz="1400" b="0" i="0" u="none" strike="noStrike" dirty="0">
+                        <a:solidFill>
+                          <a:srgbClr val="000000"/>
+                        </a:solidFill>
+                        <a:effectLst/>
+                        <a:latin typeface="Liberation Sans"/>
+                      </a:endParaRPr>
+                    </a:p>
+                  </a:txBody>
+                  <a:tcPr marL="11038" marR="11038" marT="11038" marB="0" anchor="b"/>
+                </a:tc>
+                <a:tc>
+                  <a:txBody>
+                    <a:bodyPr/>
+                    <a:lstStyle/>
+                    <a:p>
+                      <a:pPr algn="l" fontAlgn="b"/>
+                      <a:r>
+                        <a:rPr lang="es-ES" sz="1400" u="none" strike="noStrike" dirty="0">
+                          <a:effectLst/>
+                        </a:rPr>
+                        <a:t>5DaysChange</a:t>
+                      </a:r>
+                      <a:endParaRPr lang="es-ES" sz="1400" b="0" i="0" u="none" strike="noStrike" dirty="0">
+                        <a:solidFill>
+                          <a:srgbClr val="000000"/>
+                        </a:solidFill>
+                        <a:effectLst/>
+                        <a:latin typeface="Liberation Sans"/>
+                      </a:endParaRPr>
+                    </a:p>
+                  </a:txBody>
+                  <a:tcPr marL="11038" marR="11038" marT="11038" marB="0" anchor="b"/>
+                </a:tc>
+                <a:tc>
+                  <a:txBody>
+                    <a:bodyPr/>
+                    <a:lstStyle/>
+                    <a:p>
+                      <a:pPr algn="l" fontAlgn="b"/>
+                      <a:r>
+                        <a:rPr lang="es-ES" sz="1400" u="none" strike="noStrike" dirty="0">
+                          <a:effectLst/>
+                        </a:rPr>
+                        <a:t>5DaysRChange</a:t>
+                      </a:r>
+                      <a:endParaRPr lang="es-ES" sz="1400" b="0" i="0" u="none" strike="noStrike" dirty="0">
+                        <a:solidFill>
+                          <a:srgbClr val="000000"/>
+                        </a:solidFill>
+                        <a:effectLst/>
+                        <a:latin typeface="Liberation Sans"/>
+                      </a:endParaRPr>
+                    </a:p>
+                  </a:txBody>
+                  <a:tcPr marL="11038" marR="11038" marT="11038" marB="0" anchor="b"/>
+                </a:tc>
+                <a:tc>
+                  <a:txBody>
+                    <a:bodyPr/>
+                    <a:lstStyle/>
+                    <a:p>
+                      <a:pPr algn="l" fontAlgn="b"/>
+                      <a:r>
+                        <a:rPr lang="es-ES" sz="1400" u="none" strike="noStrike" dirty="0">
+                          <a:effectLst/>
+                        </a:rPr>
+                        <a:t>5DaysNormalized</a:t>
+                      </a:r>
+                      <a:endParaRPr lang="es-ES" sz="1400" b="0" i="0" u="none" strike="noStrike" dirty="0">
+                        <a:solidFill>
+                          <a:srgbClr val="000000"/>
+                        </a:solidFill>
+                        <a:effectLst/>
+                        <a:latin typeface="Liberation Sans"/>
+                      </a:endParaRPr>
+                    </a:p>
+                  </a:txBody>
+                  <a:tcPr marL="11038" marR="11038" marT="11038" marB="0" anchor="b"/>
+                </a:tc>
+                <a:extLst>
+                  <a:ext uri="{0D108BD9-81ED-4DB2-BD59-A6C34878D82A}">
+                    <a16:rowId xmlns:a16="http://schemas.microsoft.com/office/drawing/2014/main" val="2538865235"/>
+                  </a:ext>
+                </a:extLst>
+              </a:tr>
+              <a:tr h="538831">
+                <a:tc>
+                  <a:txBody>
+                    <a:bodyPr/>
+                    <a:lstStyle/>
+                    <a:p>
+                      <a:pPr algn="l" fontAlgn="b"/>
+                      <a:r>
+                        <a:rPr lang="es-ES" sz="2000" u="none" strike="noStrike" dirty="0" err="1">
+                          <a:effectLst/>
+                        </a:rPr>
+                        <a:t>svm</a:t>
+                      </a:r>
+                      <a:endParaRPr lang="es-ES" sz="2000" b="0" i="0" u="none" strike="noStrike" dirty="0">
+                        <a:solidFill>
+                          <a:srgbClr val="000000"/>
+                        </a:solidFill>
+                        <a:effectLst/>
+                        <a:latin typeface="Liberation Sans"/>
+                      </a:endParaRPr>
+                    </a:p>
+                  </a:txBody>
+                  <a:tcPr marL="11038" marR="11038" marT="11038" marB="0" anchor="b"/>
+                </a:tc>
+                <a:tc>
+                  <a:txBody>
+                    <a:bodyPr/>
+                    <a:lstStyle/>
+                    <a:p>
+                      <a:pPr algn="r" fontAlgn="b"/>
+                      <a:r>
+                        <a:rPr lang="es-ES" sz="2000" u="none" strike="noStrike" dirty="0">
+                          <a:effectLst/>
+                        </a:rPr>
+                        <a:t>51,63%</a:t>
+                      </a:r>
+                      <a:endParaRPr lang="es-ES" sz="2000" b="0" i="0" u="none" strike="noStrike" dirty="0">
+                        <a:solidFill>
+                          <a:srgbClr val="000000"/>
+                        </a:solidFill>
+                        <a:effectLst/>
+                        <a:latin typeface="Liberation Sans"/>
+                      </a:endParaRPr>
+                    </a:p>
+                  </a:txBody>
+                  <a:tcPr marL="11038" marR="11038" marT="11038" marB="0" anchor="b"/>
+                </a:tc>
+                <a:tc>
+                  <a:txBody>
+                    <a:bodyPr/>
+                    <a:lstStyle/>
+                    <a:p>
+                      <a:pPr algn="r" fontAlgn="b"/>
+                      <a:r>
+                        <a:rPr lang="es-ES" sz="2000" b="1" i="0" u="none" strike="noStrike" dirty="0">
+                          <a:effectLst/>
+                        </a:rPr>
+                        <a:t>57,44%</a:t>
+                      </a:r>
+                      <a:endParaRPr lang="es-ES" sz="2000" b="1" i="0" u="none" strike="noStrike" dirty="0">
+                        <a:solidFill>
+                          <a:srgbClr val="000000"/>
+                        </a:solidFill>
+                        <a:effectLst/>
+                        <a:latin typeface="Liberation Sans"/>
+                      </a:endParaRPr>
+                    </a:p>
+                  </a:txBody>
+                  <a:tcPr marL="11038" marR="11038" marT="11038" marB="0" anchor="b"/>
+                </a:tc>
+                <a:tc>
+                  <a:txBody>
+                    <a:bodyPr/>
+                    <a:lstStyle/>
+                    <a:p>
+                      <a:pPr algn="r" fontAlgn="b"/>
+                      <a:r>
+                        <a:rPr lang="es-ES" sz="2000" u="none" strike="noStrike" dirty="0">
+                          <a:effectLst/>
+                        </a:rPr>
+                        <a:t>51,62%</a:t>
+                      </a:r>
+                      <a:endParaRPr lang="es-ES" sz="2000" b="0" i="0" u="none" strike="noStrike" dirty="0">
+                        <a:solidFill>
+                          <a:srgbClr val="000000"/>
+                        </a:solidFill>
+                        <a:effectLst/>
+                        <a:latin typeface="Liberation Sans"/>
+                      </a:endParaRPr>
+                    </a:p>
+                  </a:txBody>
+                  <a:tcPr marL="11038" marR="11038" marT="11038" marB="0" anchor="b"/>
+                </a:tc>
+                <a:tc>
+                  <a:txBody>
+                    <a:bodyPr/>
+                    <a:lstStyle/>
+                    <a:p>
+                      <a:pPr algn="r" fontAlgn="b"/>
+                      <a:r>
+                        <a:rPr lang="es-ES" sz="2000" u="none" strike="noStrike" dirty="0">
+                          <a:effectLst/>
+                        </a:rPr>
+                        <a:t>51,63%</a:t>
+                      </a:r>
+                      <a:endParaRPr lang="es-ES" sz="2000" b="0" i="0" u="none" strike="noStrike" dirty="0">
+                        <a:solidFill>
+                          <a:srgbClr val="000000"/>
+                        </a:solidFill>
+                        <a:effectLst/>
+                        <a:latin typeface="Liberation Sans"/>
+                      </a:endParaRPr>
+                    </a:p>
+                  </a:txBody>
+                  <a:tcPr marL="11038" marR="11038" marT="11038" marB="0" anchor="b"/>
+                </a:tc>
+                <a:tc>
+                  <a:txBody>
+                    <a:bodyPr/>
+                    <a:lstStyle/>
+                    <a:p>
+                      <a:pPr algn="r" fontAlgn="b"/>
+                      <a:r>
+                        <a:rPr lang="es-ES" sz="2000" u="none" strike="noStrike" dirty="0">
+                          <a:effectLst/>
+                        </a:rPr>
+                        <a:t>55,12%</a:t>
+                      </a:r>
+                      <a:endParaRPr lang="es-ES" sz="2000" b="0" i="0" u="none" strike="noStrike" dirty="0">
+                        <a:solidFill>
+                          <a:srgbClr val="000000"/>
+                        </a:solidFill>
+                        <a:effectLst/>
+                        <a:latin typeface="Liberation Sans"/>
+                      </a:endParaRPr>
+                    </a:p>
+                  </a:txBody>
+                  <a:tcPr marL="11038" marR="11038" marT="11038" marB="0" anchor="b"/>
+                </a:tc>
+                <a:tc>
+                  <a:txBody>
+                    <a:bodyPr/>
+                    <a:lstStyle/>
+                    <a:p>
+                      <a:pPr algn="r" fontAlgn="b"/>
+                      <a:r>
+                        <a:rPr lang="es-ES" sz="2000" u="none" strike="noStrike" dirty="0">
+                          <a:effectLst/>
+                        </a:rPr>
+                        <a:t>53,49%</a:t>
+                      </a:r>
+                      <a:endParaRPr lang="es-ES" sz="2000" b="0" i="0" u="none" strike="noStrike" dirty="0">
+                        <a:solidFill>
+                          <a:srgbClr val="000000"/>
+                        </a:solidFill>
+                        <a:effectLst/>
+                        <a:latin typeface="Liberation Sans"/>
+                      </a:endParaRPr>
+                    </a:p>
+                  </a:txBody>
+                  <a:tcPr marL="11038" marR="11038" marT="11038" marB="0" anchor="b"/>
+                </a:tc>
+                <a:tc>
+                  <a:txBody>
+                    <a:bodyPr/>
+                    <a:lstStyle/>
+                    <a:p>
+                      <a:pPr algn="r" fontAlgn="b"/>
+                      <a:r>
+                        <a:rPr lang="es-ES" sz="2000" u="none" strike="noStrike" dirty="0">
+                          <a:effectLst/>
+                        </a:rPr>
+                        <a:t>51,63%</a:t>
+                      </a:r>
+                      <a:endParaRPr lang="es-ES" sz="2000" b="0" i="0" u="none" strike="noStrike" dirty="0">
+                        <a:solidFill>
+                          <a:srgbClr val="000000"/>
+                        </a:solidFill>
+                        <a:effectLst/>
+                        <a:latin typeface="Liberation Sans"/>
+                      </a:endParaRPr>
+                    </a:p>
+                  </a:txBody>
+                  <a:tcPr marL="11038" marR="11038" marT="11038" marB="0" anchor="b"/>
+                </a:tc>
+                <a:tc>
+                  <a:txBody>
+                    <a:bodyPr/>
+                    <a:lstStyle/>
+                    <a:p>
+                      <a:pPr algn="r" fontAlgn="b"/>
+                      <a:r>
+                        <a:rPr lang="es-ES" sz="2000" u="none" strike="noStrike" dirty="0">
+                          <a:effectLst/>
+                        </a:rPr>
+                        <a:t>54,89%</a:t>
+                      </a:r>
+                      <a:endParaRPr lang="es-ES" sz="2000" b="0" i="0" u="none" strike="noStrike" dirty="0">
+                        <a:solidFill>
+                          <a:srgbClr val="000000"/>
+                        </a:solidFill>
+                        <a:effectLst/>
+                        <a:latin typeface="Liberation Sans"/>
+                      </a:endParaRPr>
+                    </a:p>
+                  </a:txBody>
+                  <a:tcPr marL="11038" marR="11038" marT="11038" marB="0" anchor="b"/>
+                </a:tc>
+                <a:extLst>
+                  <a:ext uri="{0D108BD9-81ED-4DB2-BD59-A6C34878D82A}">
+                    <a16:rowId xmlns:a16="http://schemas.microsoft.com/office/drawing/2014/main" val="2052034286"/>
+                  </a:ext>
+                </a:extLst>
+              </a:tr>
+            </a:tbl>
+          </a:graphicData>
+        </a:graphic>
+      </p:graphicFrame>
+    </p:spTree>
+    <p:extLst>
+      <p:ext uri="{BB962C8B-B14F-4D97-AF65-F5344CB8AC3E}">
+        <p14:creationId xmlns:p14="http://schemas.microsoft.com/office/powerpoint/2010/main" val="727731094"/>
+      </p:ext>
+    </p:extLst>
+  </p:cSld>
+  <p:clrMapOvr>
+    <a:overrideClrMapping bg1="dk1" tx1="lt1" bg2="dk2" tx2="lt2" accent1="accent1" accent2="accent2" accent3="accent3" accent4="accent4" accent5="accent5" accent6="accent6" hlink="hlink" folHlink="folHlink"/>
+  </p:clrMapOvr>
+</p:sld>
+</file>
+
+<file path=ppt/slides/slide17.xml><?xml version="1.0" encoding="utf-8"?>
+<p:sld xmlns:a="http://schemas.openxmlformats.org/drawingml/2006/main" xmlns:r="http://schemas.openxmlformats.org/officeDocument/2006/relationships" xmlns:p="http://schemas.openxmlformats.org/presentationml/2006/main">
+  <p:cSld>
+    <p:spTree>
+      <p:nvGrpSpPr>
+        <p:cNvPr id="1" name=""/>
+        <p:cNvGrpSpPr/>
+        <p:nvPr/>
+      </p:nvGrpSpPr>
+      <p:grpSpPr>
+        <a:xfrm>
+          <a:off x="0" y="0"/>
+          <a:ext cx="0" cy="0"/>
+          <a:chOff x="0" y="0"/>
+          <a:chExt cx="0" cy="0"/>
+        </a:xfrm>
+      </p:grpSpPr>
+      <p:sp>
+        <p:nvSpPr>
+          <p:cNvPr id="5" name="Rectangle 4"/>
+          <p:cNvSpPr>
+            <a:spLocks noGrp="1" noRot="1" noChangeAspect="1" noMove="1" noResize="1" noEditPoints="1" noAdjustHandles="1" noChangeArrowheads="1" noChangeShapeType="1" noTextEdit="1"/>
+          </p:cNvSpPr>
+          <p:nvPr>
+            <p:extLst>
+              <p:ext uri="{386F3935-93C4-4BCD-93E2-E3B085C9AB24}">
+                <p16:designElem xmlns:p16="http://schemas.microsoft.com/office/powerpoint/2015/main" val="1"/>
+              </p:ext>
+            </p:extLst>
+          </p:nvPr>
+        </p:nvSpPr>
+        <p:spPr>
+          <a:xfrm>
+            <a:off x="0" y="-3324"/>
+            <a:ext cx="12192000" cy="6861324"/>
+          </a:xfrm>
+          <a:prstGeom prst="rect">
+            <a:avLst/>
+          </a:prstGeom>
+          <a:solidFill>
+            <a:srgbClr val="404040"/>
+          </a:solidFill>
+          <a:ln>
+            <a:noFill/>
+          </a:ln>
+        </p:spPr>
+        <p:style>
+          <a:lnRef idx="2">
+            <a:schemeClr val="accent1">
+              <a:shade val="50000"/>
+            </a:schemeClr>
+          </a:lnRef>
+          <a:fillRef idx="1">
+            <a:schemeClr val="accent1"/>
+          </a:fillRef>
+          <a:effectRef idx="0">
+            <a:schemeClr val="accent1"/>
+          </a:effectRef>
+          <a:fontRef idx="minor">
+            <a:schemeClr val="lt1"/>
+          </a:fontRef>
+        </p:style>
+        <p:txBody>
+          <a:bodyPr rtlCol="0" anchor="ctr"/>
+          <a:lstStyle/>
+          <a:p>
+            <a:pPr algn="ctr"/>
+            <a:endParaRPr lang="en-US"/>
+          </a:p>
+        </p:txBody>
+      </p:sp>
+      <p:sp>
+        <p:nvSpPr>
+          <p:cNvPr id="6" name="Freeform 13"/>
+          <p:cNvSpPr>
+            <a:spLocks noGrp="1" noRot="1" noChangeAspect="1" noMove="1" noResize="1" noEditPoints="1" noAdjustHandles="1" noChangeArrowheads="1" noChangeShapeType="1" noTextEdit="1"/>
+          </p:cNvSpPr>
+          <p:nvPr>
+            <p:extLst>
+              <p:ext uri="{386F3935-93C4-4BCD-93E2-E3B085C9AB24}">
+                <p16:designElem xmlns:p16="http://schemas.microsoft.com/office/powerpoint/2015/main" val="1"/>
+              </p:ext>
+            </p:extLst>
+          </p:nvPr>
+        </p:nvSpPr>
+        <p:spPr>
+          <a:xfrm>
+            <a:off x="0" y="0"/>
+            <a:ext cx="11786754" cy="6858000"/>
+          </a:xfrm>
+          <a:custGeom>
+            <a:avLst/>
+            <a:gdLst>
+              <a:gd name="connsiteX0" fmla="*/ 0 w 11786754"/>
+              <a:gd name="connsiteY0" fmla="*/ 0 h 6858000"/>
+              <a:gd name="connsiteX1" fmla="*/ 8610600 w 11786754"/>
+              <a:gd name="connsiteY1" fmla="*/ 0 h 6858000"/>
+              <a:gd name="connsiteX2" fmla="*/ 11786754 w 11786754"/>
+              <a:gd name="connsiteY2" fmla="*/ 6858000 h 6858000"/>
+              <a:gd name="connsiteX3" fmla="*/ 0 w 11786754"/>
+              <a:gd name="connsiteY3" fmla="*/ 6858000 h 6858000"/>
+            </a:gdLst>
+            <a:ahLst/>
+            <a:cxnLst>
+              <a:cxn ang="0">
+                <a:pos x="connsiteX0" y="connsiteY0"/>
+              </a:cxn>
+              <a:cxn ang="0">
+                <a:pos x="connsiteX1" y="connsiteY1"/>
+              </a:cxn>
+              <a:cxn ang="0">
+                <a:pos x="connsiteX2" y="connsiteY2"/>
+              </a:cxn>
+              <a:cxn ang="0">
+                <a:pos x="connsiteX3" y="connsiteY3"/>
+              </a:cxn>
+            </a:cxnLst>
+            <a:rect l="l" t="t" r="r" b="b"/>
+            <a:pathLst>
+              <a:path w="11786754" h="6858000">
+                <a:moveTo>
+                  <a:pt x="0" y="0"/>
+                </a:moveTo>
+                <a:lnTo>
+                  <a:pt x="8610600" y="0"/>
+                </a:lnTo>
+                <a:lnTo>
+                  <a:pt x="11786754" y="6858000"/>
+                </a:lnTo>
+                <a:lnTo>
+                  <a:pt x="0" y="6858000"/>
+                </a:lnTo>
+                <a:close/>
+              </a:path>
+            </a:pathLst>
+          </a:custGeom>
+          <a:solidFill>
+            <a:schemeClr val="bg1">
+              <a:alpha val="30000"/>
+            </a:schemeClr>
+          </a:solidFill>
+          <a:ln>
+            <a:noFill/>
+          </a:ln>
+        </p:spPr>
+        <p:style>
+          <a:lnRef idx="2">
+            <a:schemeClr val="accent1">
+              <a:shade val="50000"/>
+            </a:schemeClr>
+          </a:lnRef>
+          <a:fillRef idx="1">
+            <a:schemeClr val="accent1"/>
+          </a:fillRef>
+          <a:effectRef idx="0">
+            <a:schemeClr val="accent1"/>
+          </a:effectRef>
+          <a:fontRef idx="minor">
+            <a:schemeClr val="lt1"/>
+          </a:fontRef>
+        </p:style>
+        <p:txBody>
+          <a:bodyPr rtlCol="0" anchor="ctr"/>
+          <a:lstStyle/>
+          <a:p>
+            <a:pPr algn="ctr"/>
+            <a:endParaRPr lang="en-US"/>
+          </a:p>
+        </p:txBody>
+      </p:sp>
+      <p:sp>
+        <p:nvSpPr>
+          <p:cNvPr id="7" name="Freeform 11"/>
+          <p:cNvSpPr>
+            <a:spLocks noGrp="1" noRot="1" noChangeAspect="1" noMove="1" noResize="1" noEditPoints="1" noAdjustHandles="1" noChangeArrowheads="1" noChangeShapeType="1" noTextEdit="1"/>
+          </p:cNvSpPr>
+          <p:nvPr>
+            <p:extLst>
+              <p:ext uri="{386F3935-93C4-4BCD-93E2-E3B085C9AB24}">
+                <p16:designElem xmlns:p16="http://schemas.microsoft.com/office/powerpoint/2015/main" val="1"/>
+              </p:ext>
+            </p:extLst>
+          </p:nvPr>
+        </p:nvSpPr>
+        <p:spPr>
+          <a:xfrm>
+            <a:off x="0" y="0"/>
+            <a:ext cx="3581400" cy="6858000"/>
+          </a:xfrm>
+          <a:custGeom>
+            <a:avLst/>
+            <a:gdLst>
+              <a:gd name="connsiteX0" fmla="*/ 0 w 3581400"/>
+              <a:gd name="connsiteY0" fmla="*/ 0 h 6858000"/>
+              <a:gd name="connsiteX1" fmla="*/ 405246 w 3581400"/>
+              <a:gd name="connsiteY1" fmla="*/ 0 h 6858000"/>
+              <a:gd name="connsiteX2" fmla="*/ 3581400 w 3581400"/>
+              <a:gd name="connsiteY2" fmla="*/ 6858000 h 6858000"/>
+              <a:gd name="connsiteX3" fmla="*/ 0 w 3581400"/>
+              <a:gd name="connsiteY3" fmla="*/ 6858000 h 6858000"/>
+            </a:gdLst>
+            <a:ahLst/>
+            <a:cxnLst>
+              <a:cxn ang="0">
+                <a:pos x="connsiteX0" y="connsiteY0"/>
+              </a:cxn>
+              <a:cxn ang="0">
+                <a:pos x="connsiteX1" y="connsiteY1"/>
+              </a:cxn>
+              <a:cxn ang="0">
+                <a:pos x="connsiteX2" y="connsiteY2"/>
+              </a:cxn>
+              <a:cxn ang="0">
+                <a:pos x="connsiteX3" y="connsiteY3"/>
+              </a:cxn>
+            </a:cxnLst>
+            <a:rect l="l" t="t" r="r" b="b"/>
+            <a:pathLst>
+              <a:path w="3581400" h="6858000">
+                <a:moveTo>
+                  <a:pt x="0" y="0"/>
+                </a:moveTo>
+                <a:lnTo>
+                  <a:pt x="405246" y="0"/>
+                </a:lnTo>
+                <a:lnTo>
+                  <a:pt x="3581400" y="6858000"/>
+                </a:lnTo>
+                <a:lnTo>
+                  <a:pt x="0" y="6858000"/>
+                </a:lnTo>
+                <a:close/>
+              </a:path>
+            </a:pathLst>
+          </a:custGeom>
+          <a:solidFill>
+            <a:schemeClr val="bg1">
+              <a:alpha val="30000"/>
+            </a:schemeClr>
+          </a:solidFill>
+          <a:ln>
+            <a:noFill/>
+          </a:ln>
+        </p:spPr>
+        <p:style>
+          <a:lnRef idx="2">
+            <a:schemeClr val="accent1">
+              <a:shade val="50000"/>
+            </a:schemeClr>
+          </a:lnRef>
+          <a:fillRef idx="1">
+            <a:schemeClr val="accent1"/>
+          </a:fillRef>
+          <a:effectRef idx="0">
+            <a:schemeClr val="accent1"/>
+          </a:effectRef>
+          <a:fontRef idx="minor">
+            <a:schemeClr val="lt1"/>
+          </a:fontRef>
+        </p:style>
+        <p:txBody>
+          <a:bodyPr wrap="square" rtlCol="0" anchor="ctr">
+            <a:noAutofit/>
+          </a:bodyPr>
+          <a:lstStyle/>
+          <a:p>
+            <a:pPr algn="ctr"/>
+            <a:endParaRPr lang="en-US"/>
+          </a:p>
+        </p:txBody>
+      </p:sp>
+      <p:sp>
+        <p:nvSpPr>
+          <p:cNvPr id="2" name="Título 1"/>
+          <p:cNvSpPr>
+            <a:spLocks noGrp="1"/>
+          </p:cNvSpPr>
+          <p:nvPr>
+            <p:ph type="title"/>
+          </p:nvPr>
+        </p:nvSpPr>
+        <p:spPr>
+          <a:xfrm>
+            <a:off x="833002" y="365125"/>
+            <a:ext cx="10520702" cy="1325563"/>
+          </a:xfrm>
+        </p:spPr>
+        <p:txBody>
+          <a:bodyPr>
+            <a:normAutofit/>
+          </a:bodyPr>
+          <a:lstStyle/>
+          <a:p>
+            <a:r>
+              <a:rPr lang="es-ES" sz="5400" dirty="0"/>
+              <a:t>PYTHON: </a:t>
+            </a:r>
+            <a:r>
+              <a:rPr lang="es-ES" sz="5400" dirty="0" err="1"/>
+              <a:t>Random</a:t>
+            </a:r>
+            <a:r>
+              <a:rPr lang="es-ES" sz="5400" dirty="0"/>
+              <a:t> </a:t>
+            </a:r>
+            <a:r>
+              <a:rPr lang="es-ES" sz="5400" dirty="0" err="1"/>
+              <a:t>forest</a:t>
+            </a:r>
+            <a:endParaRPr lang="es-ES" sz="6000" dirty="0"/>
+          </a:p>
+        </p:txBody>
+      </p:sp>
+      <p:sp>
+        <p:nvSpPr>
+          <p:cNvPr id="3" name="Marcador de contenido 2"/>
+          <p:cNvSpPr>
+            <a:spLocks noGrp="1"/>
+          </p:cNvSpPr>
+          <p:nvPr>
+            <p:ph idx="1"/>
+          </p:nvPr>
+        </p:nvSpPr>
+        <p:spPr>
+          <a:xfrm>
+            <a:off x="838201" y="1690689"/>
+            <a:ext cx="10515598" cy="4486274"/>
+          </a:xfrm>
+        </p:spPr>
+        <p:txBody>
+          <a:bodyPr>
+            <a:normAutofit/>
+          </a:bodyPr>
+          <a:lstStyle/>
+          <a:p>
+            <a:r>
+              <a:rPr lang="es-ES" dirty="0"/>
+              <a:t>Variamos un parámetro para probar distintas configuraciones:</a:t>
+            </a:r>
+          </a:p>
+          <a:p>
+            <a:pPr lvl="1"/>
+            <a:r>
+              <a:rPr lang="es-ES" dirty="0"/>
+              <a:t>Número de estimadores</a:t>
+            </a:r>
+          </a:p>
+          <a:p>
+            <a:r>
+              <a:rPr lang="es-ES" dirty="0"/>
+              <a:t>Al probarlo con los datos de test, encontramos los mejores resultados de la práctica</a:t>
+            </a:r>
+          </a:p>
+          <a:p>
+            <a:endParaRPr lang="es-ES" dirty="0"/>
+          </a:p>
+          <a:p>
+            <a:endParaRPr lang="es-ES" dirty="0"/>
+          </a:p>
+          <a:p>
+            <a:r>
+              <a:rPr lang="es-ES" dirty="0"/>
+              <a:t>De nuevo, mejores resultados con una predicción de 5 días</a:t>
+            </a:r>
+          </a:p>
+          <a:p>
+            <a:endParaRPr lang="es-ES" dirty="0"/>
+          </a:p>
+        </p:txBody>
+      </p:sp>
+      <p:graphicFrame>
+        <p:nvGraphicFramePr>
+          <p:cNvPr id="9" name="Tabla 8"/>
+          <p:cNvGraphicFramePr>
+            <a:graphicFrameLocks noGrp="1"/>
+          </p:cNvGraphicFramePr>
+          <p:nvPr>
+            <p:extLst>
+              <p:ext uri="{D42A27DB-BD31-4B8C-83A1-F6EECF244321}">
+                <p14:modId xmlns:p14="http://schemas.microsoft.com/office/powerpoint/2010/main" val="1072729137"/>
+              </p:ext>
+            </p:extLst>
+          </p:nvPr>
+        </p:nvGraphicFramePr>
+        <p:xfrm>
+          <a:off x="434926" y="3674267"/>
+          <a:ext cx="11316853" cy="719932"/>
+        </p:xfrm>
+        <a:graphic>
+          <a:graphicData uri="http://schemas.openxmlformats.org/drawingml/2006/table">
+            <a:tbl>
+              <a:tblPr>
+                <a:tableStyleId>{5C22544A-7EE6-4342-B048-85BDC9FD1C3A}</a:tableStyleId>
+              </a:tblPr>
+              <a:tblGrid>
+                <a:gridCol w="980080">
+                  <a:extLst>
+                    <a:ext uri="{9D8B030D-6E8A-4147-A177-3AD203B41FA5}">
+                      <a16:colId xmlns:a16="http://schemas.microsoft.com/office/drawing/2014/main" val="3004782095"/>
+                    </a:ext>
+                  </a:extLst>
+                </a:gridCol>
+                <a:gridCol w="1408864">
+                  <a:extLst>
+                    <a:ext uri="{9D8B030D-6E8A-4147-A177-3AD203B41FA5}">
+                      <a16:colId xmlns:a16="http://schemas.microsoft.com/office/drawing/2014/main" val="4186406271"/>
+                    </a:ext>
+                  </a:extLst>
+                </a:gridCol>
+                <a:gridCol w="1010707">
+                  <a:extLst>
+                    <a:ext uri="{9D8B030D-6E8A-4147-A177-3AD203B41FA5}">
+                      <a16:colId xmlns:a16="http://schemas.microsoft.com/office/drawing/2014/main" val="2640527630"/>
+                    </a:ext>
+                  </a:extLst>
+                </a:gridCol>
+                <a:gridCol w="1271041">
+                  <a:extLst>
+                    <a:ext uri="{9D8B030D-6E8A-4147-A177-3AD203B41FA5}">
+                      <a16:colId xmlns:a16="http://schemas.microsoft.com/office/drawing/2014/main" val="260997157"/>
+                    </a:ext>
+                  </a:extLst>
+                </a:gridCol>
+                <a:gridCol w="1255727">
+                  <a:extLst>
+                    <a:ext uri="{9D8B030D-6E8A-4147-A177-3AD203B41FA5}">
+                      <a16:colId xmlns:a16="http://schemas.microsoft.com/office/drawing/2014/main" val="1039690343"/>
+                    </a:ext>
+                  </a:extLst>
+                </a:gridCol>
+                <a:gridCol w="1362922">
+                  <a:extLst>
+                    <a:ext uri="{9D8B030D-6E8A-4147-A177-3AD203B41FA5}">
+                      <a16:colId xmlns:a16="http://schemas.microsoft.com/office/drawing/2014/main" val="592308215"/>
+                    </a:ext>
+                  </a:extLst>
+                </a:gridCol>
+                <a:gridCol w="1485432">
+                  <a:extLst>
+                    <a:ext uri="{9D8B030D-6E8A-4147-A177-3AD203B41FA5}">
+                      <a16:colId xmlns:a16="http://schemas.microsoft.com/office/drawing/2014/main" val="723057721"/>
+                    </a:ext>
+                  </a:extLst>
+                </a:gridCol>
+                <a:gridCol w="1194471">
+                  <a:extLst>
+                    <a:ext uri="{9D8B030D-6E8A-4147-A177-3AD203B41FA5}">
+                      <a16:colId xmlns:a16="http://schemas.microsoft.com/office/drawing/2014/main" val="1665868013"/>
+                    </a:ext>
+                  </a:extLst>
+                </a:gridCol>
+                <a:gridCol w="1347609">
+                  <a:extLst>
+                    <a:ext uri="{9D8B030D-6E8A-4147-A177-3AD203B41FA5}">
+                      <a16:colId xmlns:a16="http://schemas.microsoft.com/office/drawing/2014/main" val="509979848"/>
+                    </a:ext>
+                  </a:extLst>
+                </a:gridCol>
+              </a:tblGrid>
+              <a:tr h="359966">
+                <a:tc>
+                  <a:txBody>
+                    <a:bodyPr/>
+                    <a:lstStyle/>
+                    <a:p>
+                      <a:pPr algn="l" fontAlgn="b"/>
+                      <a:endParaRPr lang="es-ES" sz="1400" b="0" i="0" u="none" strike="noStrike" dirty="0">
+                        <a:solidFill>
+                          <a:srgbClr val="000000"/>
+                        </a:solidFill>
+                        <a:effectLst/>
+                        <a:latin typeface="Liberation Sans"/>
+                      </a:endParaRPr>
+                    </a:p>
+                  </a:txBody>
+                  <a:tcPr marL="9525" marR="9525" marT="9525" marB="0" anchor="b"/>
+                </a:tc>
+                <a:tc>
+                  <a:txBody>
+                    <a:bodyPr/>
+                    <a:lstStyle/>
+                    <a:p>
+                      <a:pPr algn="l" fontAlgn="b"/>
+                      <a:r>
+                        <a:rPr lang="es-ES" sz="1400" u="none" strike="noStrike" dirty="0">
+                          <a:effectLst/>
+                        </a:rPr>
+                        <a:t>1DayNormal</a:t>
+                      </a:r>
+                      <a:endParaRPr lang="es-ES" sz="1400" b="0" i="0" u="none" strike="noStrike" dirty="0">
+                        <a:solidFill>
+                          <a:srgbClr val="000000"/>
+                        </a:solidFill>
+                        <a:effectLst/>
+                        <a:latin typeface="Liberation Sans"/>
+                      </a:endParaRPr>
+                    </a:p>
+                  </a:txBody>
+                  <a:tcPr marL="9525" marR="9525" marT="9525" marB="0" anchor="b"/>
+                </a:tc>
+                <a:tc>
+                  <a:txBody>
+                    <a:bodyPr/>
+                    <a:lstStyle/>
+                    <a:p>
+                      <a:pPr algn="l" fontAlgn="b"/>
+                      <a:r>
+                        <a:rPr lang="es-ES" sz="1400" u="none" strike="noStrike" dirty="0">
+                          <a:effectLst/>
+                        </a:rPr>
+                        <a:t>1DayChange</a:t>
+                      </a:r>
+                      <a:endParaRPr lang="es-ES" sz="1400" b="0" i="0" u="none" strike="noStrike" dirty="0">
+                        <a:solidFill>
+                          <a:srgbClr val="000000"/>
+                        </a:solidFill>
+                        <a:effectLst/>
+                        <a:latin typeface="Liberation Sans"/>
+                      </a:endParaRPr>
+                    </a:p>
+                  </a:txBody>
+                  <a:tcPr marL="9525" marR="9525" marT="9525" marB="0" anchor="b"/>
+                </a:tc>
+                <a:tc>
+                  <a:txBody>
+                    <a:bodyPr/>
+                    <a:lstStyle/>
+                    <a:p>
+                      <a:pPr algn="l" fontAlgn="b"/>
+                      <a:r>
+                        <a:rPr lang="es-ES" sz="1400" u="none" strike="noStrike" dirty="0">
+                          <a:effectLst/>
+                        </a:rPr>
+                        <a:t>1DayRChange</a:t>
+                      </a:r>
+                      <a:endParaRPr lang="es-ES" sz="1400" b="0" i="0" u="none" strike="noStrike" dirty="0">
+                        <a:solidFill>
+                          <a:srgbClr val="000000"/>
+                        </a:solidFill>
+                        <a:effectLst/>
+                        <a:latin typeface="Liberation Sans"/>
+                      </a:endParaRPr>
+                    </a:p>
+                  </a:txBody>
+                  <a:tcPr marL="9525" marR="9525" marT="9525" marB="0" anchor="b"/>
+                </a:tc>
+                <a:tc>
+                  <a:txBody>
+                    <a:bodyPr/>
+                    <a:lstStyle/>
+                    <a:p>
+                      <a:pPr algn="l" fontAlgn="b"/>
+                      <a:r>
+                        <a:rPr lang="es-ES" sz="1400" u="none" strike="noStrike" dirty="0">
+                          <a:effectLst/>
+                        </a:rPr>
+                        <a:t>1DayNormalized</a:t>
+                      </a:r>
+                      <a:endParaRPr lang="es-ES" sz="1400" b="0" i="0" u="none" strike="noStrike" dirty="0">
+                        <a:solidFill>
+                          <a:srgbClr val="000000"/>
+                        </a:solidFill>
+                        <a:effectLst/>
+                        <a:latin typeface="Liberation Sans"/>
+                      </a:endParaRPr>
+                    </a:p>
+                  </a:txBody>
+                  <a:tcPr marL="9525" marR="9525" marT="9525" marB="0" anchor="b"/>
+                </a:tc>
+                <a:tc>
+                  <a:txBody>
+                    <a:bodyPr/>
+                    <a:lstStyle/>
+                    <a:p>
+                      <a:pPr algn="l" fontAlgn="b"/>
+                      <a:r>
+                        <a:rPr lang="es-ES" sz="1400" u="none" strike="noStrike" dirty="0">
+                          <a:effectLst/>
+                        </a:rPr>
+                        <a:t>5DaysNormal</a:t>
+                      </a:r>
+                      <a:endParaRPr lang="es-ES" sz="1400" b="0" i="0" u="none" strike="noStrike" dirty="0">
+                        <a:solidFill>
+                          <a:srgbClr val="000000"/>
+                        </a:solidFill>
+                        <a:effectLst/>
+                        <a:latin typeface="Liberation Sans"/>
+                      </a:endParaRPr>
+                    </a:p>
+                  </a:txBody>
+                  <a:tcPr marL="9525" marR="9525" marT="9525" marB="0" anchor="b"/>
+                </a:tc>
+                <a:tc>
+                  <a:txBody>
+                    <a:bodyPr/>
+                    <a:lstStyle/>
+                    <a:p>
+                      <a:pPr algn="l" fontAlgn="b"/>
+                      <a:r>
+                        <a:rPr lang="es-ES" sz="1400" u="none" strike="noStrike" dirty="0">
+                          <a:effectLst/>
+                        </a:rPr>
+                        <a:t>5DaysChange</a:t>
+                      </a:r>
+                      <a:endParaRPr lang="es-ES" sz="1400" b="0" i="0" u="none" strike="noStrike" dirty="0">
+                        <a:solidFill>
+                          <a:srgbClr val="000000"/>
+                        </a:solidFill>
+                        <a:effectLst/>
+                        <a:latin typeface="Liberation Sans"/>
+                      </a:endParaRPr>
+                    </a:p>
+                  </a:txBody>
+                  <a:tcPr marL="9525" marR="9525" marT="9525" marB="0" anchor="b"/>
+                </a:tc>
+                <a:tc>
+                  <a:txBody>
+                    <a:bodyPr/>
+                    <a:lstStyle/>
+                    <a:p>
+                      <a:pPr algn="l" fontAlgn="b"/>
+                      <a:r>
+                        <a:rPr lang="es-ES" sz="1400" u="none" strike="noStrike" dirty="0">
+                          <a:effectLst/>
+                        </a:rPr>
+                        <a:t>5DaysRChange</a:t>
+                      </a:r>
+                      <a:endParaRPr lang="es-ES" sz="1400" b="0" i="0" u="none" strike="noStrike" dirty="0">
+                        <a:solidFill>
+                          <a:srgbClr val="000000"/>
+                        </a:solidFill>
+                        <a:effectLst/>
+                        <a:latin typeface="Liberation Sans"/>
+                      </a:endParaRPr>
+                    </a:p>
+                  </a:txBody>
+                  <a:tcPr marL="9525" marR="9525" marT="9525" marB="0" anchor="b"/>
+                </a:tc>
+                <a:tc>
+                  <a:txBody>
+                    <a:bodyPr/>
+                    <a:lstStyle/>
+                    <a:p>
+                      <a:pPr algn="l" fontAlgn="b"/>
+                      <a:r>
+                        <a:rPr lang="es-ES" sz="1400" u="none" strike="noStrike" dirty="0">
+                          <a:effectLst/>
+                        </a:rPr>
+                        <a:t>5DaysNormalized</a:t>
+                      </a:r>
+                      <a:endParaRPr lang="es-ES" sz="1400" b="0" i="0" u="none" strike="noStrike" dirty="0">
+                        <a:solidFill>
+                          <a:srgbClr val="000000"/>
+                        </a:solidFill>
+                        <a:effectLst/>
+                        <a:latin typeface="Liberation Sans"/>
+                      </a:endParaRPr>
+                    </a:p>
+                  </a:txBody>
+                  <a:tcPr marL="9525" marR="9525" marT="9525" marB="0" anchor="b"/>
+                </a:tc>
+                <a:extLst>
+                  <a:ext uri="{0D108BD9-81ED-4DB2-BD59-A6C34878D82A}">
+                    <a16:rowId xmlns:a16="http://schemas.microsoft.com/office/drawing/2014/main" val="1685154367"/>
+                  </a:ext>
+                </a:extLst>
+              </a:tr>
+              <a:tr h="359966">
+                <a:tc>
+                  <a:txBody>
+                    <a:bodyPr/>
+                    <a:lstStyle/>
+                    <a:p>
+                      <a:pPr algn="l" fontAlgn="b"/>
+                      <a:r>
+                        <a:rPr lang="es-ES" sz="2000" b="0" u="none" strike="noStrike" dirty="0" err="1">
+                          <a:effectLst/>
+                        </a:rPr>
+                        <a:t>rfc</a:t>
+                      </a:r>
+                      <a:endParaRPr lang="es-ES" sz="2000" b="0" i="0" u="none" strike="noStrike" dirty="0">
+                        <a:solidFill>
+                          <a:srgbClr val="000000"/>
+                        </a:solidFill>
+                        <a:effectLst/>
+                        <a:latin typeface="Liberation Sans"/>
+                      </a:endParaRPr>
+                    </a:p>
+                  </a:txBody>
+                  <a:tcPr marL="9525" marR="9525" marT="9525" marB="0" anchor="b"/>
+                </a:tc>
+                <a:tc>
+                  <a:txBody>
+                    <a:bodyPr/>
+                    <a:lstStyle/>
+                    <a:p>
+                      <a:pPr algn="r" fontAlgn="b"/>
+                      <a:r>
+                        <a:rPr lang="es-ES" sz="2000" b="0" u="none" strike="noStrike" dirty="0">
+                          <a:effectLst/>
+                        </a:rPr>
+                        <a:t>49,53%</a:t>
+                      </a:r>
+                      <a:endParaRPr lang="es-ES" sz="2000" b="0" i="0" u="none" strike="noStrike" dirty="0">
+                        <a:solidFill>
+                          <a:srgbClr val="000000"/>
+                        </a:solidFill>
+                        <a:effectLst/>
+                        <a:latin typeface="Liberation Sans"/>
+                      </a:endParaRPr>
+                    </a:p>
+                  </a:txBody>
+                  <a:tcPr marL="9525" marR="9525" marT="9525" marB="0" anchor="b"/>
+                </a:tc>
+                <a:tc>
+                  <a:txBody>
+                    <a:bodyPr/>
+                    <a:lstStyle/>
+                    <a:p>
+                      <a:pPr algn="r" fontAlgn="b"/>
+                      <a:r>
+                        <a:rPr lang="es-ES" sz="2000" b="0" u="none" strike="noStrike" dirty="0">
+                          <a:effectLst/>
+                        </a:rPr>
+                        <a:t>54,65%</a:t>
+                      </a:r>
+                      <a:endParaRPr lang="es-ES" sz="2000" b="0" i="0" u="none" strike="noStrike" dirty="0">
+                        <a:solidFill>
+                          <a:srgbClr val="000000"/>
+                        </a:solidFill>
+                        <a:effectLst/>
+                        <a:latin typeface="Liberation Sans"/>
+                      </a:endParaRPr>
+                    </a:p>
+                  </a:txBody>
+                  <a:tcPr marL="9525" marR="9525" marT="9525" marB="0" anchor="b"/>
+                </a:tc>
+                <a:tc>
+                  <a:txBody>
+                    <a:bodyPr/>
+                    <a:lstStyle/>
+                    <a:p>
+                      <a:pPr algn="r" fontAlgn="b"/>
+                      <a:r>
+                        <a:rPr lang="es-ES" sz="2000" b="0" u="none" strike="noStrike" dirty="0">
+                          <a:effectLst/>
+                        </a:rPr>
+                        <a:t>55,81%</a:t>
+                      </a:r>
+                      <a:endParaRPr lang="es-ES" sz="2000" b="0" i="0" u="none" strike="noStrike" dirty="0">
+                        <a:solidFill>
+                          <a:srgbClr val="000000"/>
+                        </a:solidFill>
+                        <a:effectLst/>
+                        <a:latin typeface="Liberation Sans"/>
+                      </a:endParaRPr>
+                    </a:p>
+                  </a:txBody>
+                  <a:tcPr marL="9525" marR="9525" marT="9525" marB="0" anchor="b"/>
+                </a:tc>
+                <a:tc>
+                  <a:txBody>
+                    <a:bodyPr/>
+                    <a:lstStyle/>
+                    <a:p>
+                      <a:pPr algn="r" fontAlgn="b"/>
+                      <a:r>
+                        <a:rPr lang="es-ES" sz="2000" b="0" u="none" strike="noStrike" dirty="0">
+                          <a:effectLst/>
+                        </a:rPr>
+                        <a:t>50,23%</a:t>
+                      </a:r>
+                      <a:endParaRPr lang="es-ES" sz="2000" b="0" i="0" u="none" strike="noStrike" dirty="0">
+                        <a:solidFill>
+                          <a:srgbClr val="000000"/>
+                        </a:solidFill>
+                        <a:effectLst/>
+                        <a:latin typeface="Liberation Sans"/>
+                      </a:endParaRPr>
+                    </a:p>
+                  </a:txBody>
+                  <a:tcPr marL="9525" marR="9525" marT="9525" marB="0" anchor="b"/>
+                </a:tc>
+                <a:tc>
+                  <a:txBody>
+                    <a:bodyPr/>
+                    <a:lstStyle/>
+                    <a:p>
+                      <a:pPr algn="r" fontAlgn="b"/>
+                      <a:r>
+                        <a:rPr lang="es-ES" sz="2000" b="0" u="none" strike="noStrike" dirty="0">
+                          <a:effectLst/>
+                        </a:rPr>
+                        <a:t>52,56%</a:t>
+                      </a:r>
+                      <a:endParaRPr lang="es-ES" sz="2000" b="0" i="0" u="none" strike="noStrike" dirty="0">
+                        <a:solidFill>
+                          <a:srgbClr val="000000"/>
+                        </a:solidFill>
+                        <a:effectLst/>
+                        <a:latin typeface="Liberation Sans"/>
+                      </a:endParaRPr>
+                    </a:p>
+                  </a:txBody>
+                  <a:tcPr marL="9525" marR="9525" marT="9525" marB="0" anchor="b"/>
+                </a:tc>
+                <a:tc>
+                  <a:txBody>
+                    <a:bodyPr/>
+                    <a:lstStyle/>
+                    <a:p>
+                      <a:pPr algn="r" fontAlgn="b"/>
+                      <a:r>
+                        <a:rPr lang="es-ES" sz="2000" b="1" u="none" strike="noStrike" dirty="0">
+                          <a:effectLst/>
+                        </a:rPr>
+                        <a:t>59,30%</a:t>
+                      </a:r>
+                      <a:endParaRPr lang="es-ES" sz="2000" b="1" i="0" u="none" strike="noStrike" dirty="0">
+                        <a:solidFill>
+                          <a:srgbClr val="000000"/>
+                        </a:solidFill>
+                        <a:effectLst/>
+                        <a:latin typeface="Liberation Sans"/>
+                      </a:endParaRPr>
+                    </a:p>
+                  </a:txBody>
+                  <a:tcPr marL="9525" marR="9525" marT="9525" marB="0" anchor="b"/>
+                </a:tc>
+                <a:tc>
+                  <a:txBody>
+                    <a:bodyPr/>
+                    <a:lstStyle/>
+                    <a:p>
+                      <a:pPr algn="r" fontAlgn="b"/>
+                      <a:r>
+                        <a:rPr lang="es-ES" sz="2000" b="0" u="none" strike="noStrike" dirty="0">
+                          <a:effectLst/>
+                        </a:rPr>
+                        <a:t>57,67%</a:t>
+                      </a:r>
+                      <a:endParaRPr lang="es-ES" sz="2000" b="0" i="0" u="none" strike="noStrike" dirty="0">
+                        <a:solidFill>
+                          <a:srgbClr val="000000"/>
+                        </a:solidFill>
+                        <a:effectLst/>
+                        <a:latin typeface="Liberation Sans"/>
+                      </a:endParaRPr>
+                    </a:p>
+                  </a:txBody>
+                  <a:tcPr marL="9525" marR="9525" marT="9525" marB="0" anchor="b"/>
+                </a:tc>
+                <a:tc>
+                  <a:txBody>
+                    <a:bodyPr/>
+                    <a:lstStyle/>
+                    <a:p>
+                      <a:pPr algn="r" fontAlgn="b"/>
+                      <a:r>
+                        <a:rPr lang="es-ES" sz="2000" b="0" u="none" strike="noStrike" dirty="0">
+                          <a:effectLst/>
+                        </a:rPr>
+                        <a:t>52,79%</a:t>
+                      </a:r>
+                      <a:endParaRPr lang="es-ES" sz="2000" b="0" i="0" u="none" strike="noStrike" dirty="0">
+                        <a:solidFill>
+                          <a:srgbClr val="000000"/>
+                        </a:solidFill>
+                        <a:effectLst/>
+                        <a:latin typeface="Liberation Sans"/>
+                      </a:endParaRPr>
+                    </a:p>
+                  </a:txBody>
+                  <a:tcPr marL="9525" marR="9525" marT="9525" marB="0" anchor="b"/>
+                </a:tc>
+                <a:extLst>
+                  <a:ext uri="{0D108BD9-81ED-4DB2-BD59-A6C34878D82A}">
+                    <a16:rowId xmlns:a16="http://schemas.microsoft.com/office/drawing/2014/main" val="2493422845"/>
+                  </a:ext>
+                </a:extLst>
+              </a:tr>
+            </a:tbl>
+          </a:graphicData>
+        </a:graphic>
+      </p:graphicFrame>
+    </p:spTree>
+    <p:extLst>
+      <p:ext uri="{BB962C8B-B14F-4D97-AF65-F5344CB8AC3E}">
+        <p14:creationId xmlns:p14="http://schemas.microsoft.com/office/powerpoint/2010/main" val="2691739327"/>
+      </p:ext>
+    </p:extLst>
+  </p:cSld>
+  <p:clrMapOvr>
+    <a:overrideClrMapping bg1="dk1" tx1="lt1" bg2="dk2" tx2="lt2" accent1="accent1" accent2="accent2" accent3="accent3" accent4="accent4" accent5="accent5" accent6="accent6" hlink="hlink" folHlink="folHlink"/>
+  </p:clrMapOvr>
+</p:sld>
+</file>
+
+<file path=ppt/slides/slide18.xml><?xml version="1.0" encoding="utf-8"?>
+<p:sld xmlns:a="http://schemas.openxmlformats.org/drawingml/2006/main" xmlns:r="http://schemas.openxmlformats.org/officeDocument/2006/relationships" xmlns:p="http://schemas.openxmlformats.org/presentationml/2006/main">
+  <p:cSld>
+    <p:spTree>
+      <p:nvGrpSpPr>
+        <p:cNvPr id="1" name=""/>
+        <p:cNvGrpSpPr/>
+        <p:nvPr/>
+      </p:nvGrpSpPr>
+      <p:grpSpPr>
+        <a:xfrm>
+          <a:off x="0" y="0"/>
+          <a:ext cx="0" cy="0"/>
+          <a:chOff x="0" y="0"/>
+          <a:chExt cx="0" cy="0"/>
+        </a:xfrm>
+      </p:grpSpPr>
+      <p:sp>
+        <p:nvSpPr>
+          <p:cNvPr id="5" name="Rectangle 4"/>
+          <p:cNvSpPr>
+            <a:spLocks noGrp="1" noRot="1" noChangeAspect="1" noMove="1" noResize="1" noEditPoints="1" noAdjustHandles="1" noChangeArrowheads="1" noChangeShapeType="1" noTextEdit="1"/>
+          </p:cNvSpPr>
+          <p:nvPr>
+            <p:extLst>
+              <p:ext uri="{386F3935-93C4-4BCD-93E2-E3B085C9AB24}">
+                <p16:designElem xmlns:p16="http://schemas.microsoft.com/office/powerpoint/2015/main" val="1"/>
+              </p:ext>
+            </p:extLst>
+          </p:nvPr>
+        </p:nvSpPr>
+        <p:spPr>
+          <a:xfrm>
+            <a:off x="0" y="-3324"/>
+            <a:ext cx="12192000" cy="6861324"/>
+          </a:xfrm>
+          <a:prstGeom prst="rect">
+            <a:avLst/>
+          </a:prstGeom>
+          <a:solidFill>
+            <a:srgbClr val="404040"/>
+          </a:solidFill>
+          <a:ln>
+            <a:noFill/>
+          </a:ln>
+        </p:spPr>
+        <p:style>
+          <a:lnRef idx="2">
+            <a:schemeClr val="accent1">
+              <a:shade val="50000"/>
+            </a:schemeClr>
+          </a:lnRef>
+          <a:fillRef idx="1">
+            <a:schemeClr val="accent1"/>
+          </a:fillRef>
+          <a:effectRef idx="0">
+            <a:schemeClr val="accent1"/>
+          </a:effectRef>
+          <a:fontRef idx="minor">
+            <a:schemeClr val="lt1"/>
+          </a:fontRef>
+        </p:style>
+        <p:txBody>
+          <a:bodyPr rtlCol="0" anchor="ctr"/>
+          <a:lstStyle/>
+          <a:p>
+            <a:pPr algn="ctr"/>
+            <a:endParaRPr lang="en-US"/>
+          </a:p>
+        </p:txBody>
+      </p:sp>
+      <p:sp>
+        <p:nvSpPr>
+          <p:cNvPr id="6" name="Freeform 13"/>
+          <p:cNvSpPr>
+            <a:spLocks noGrp="1" noRot="1" noChangeAspect="1" noMove="1" noResize="1" noEditPoints="1" noAdjustHandles="1" noChangeArrowheads="1" noChangeShapeType="1" noTextEdit="1"/>
+          </p:cNvSpPr>
+          <p:nvPr>
+            <p:extLst>
+              <p:ext uri="{386F3935-93C4-4BCD-93E2-E3B085C9AB24}">
+                <p16:designElem xmlns:p16="http://schemas.microsoft.com/office/powerpoint/2015/main" val="1"/>
+              </p:ext>
+            </p:extLst>
+          </p:nvPr>
+        </p:nvSpPr>
+        <p:spPr>
+          <a:xfrm>
+            <a:off x="0" y="0"/>
+            <a:ext cx="11786754" cy="6858000"/>
+          </a:xfrm>
+          <a:custGeom>
+            <a:avLst/>
+            <a:gdLst>
+              <a:gd name="connsiteX0" fmla="*/ 0 w 11786754"/>
+              <a:gd name="connsiteY0" fmla="*/ 0 h 6858000"/>
+              <a:gd name="connsiteX1" fmla="*/ 8610600 w 11786754"/>
+              <a:gd name="connsiteY1" fmla="*/ 0 h 6858000"/>
+              <a:gd name="connsiteX2" fmla="*/ 11786754 w 11786754"/>
+              <a:gd name="connsiteY2" fmla="*/ 6858000 h 6858000"/>
+              <a:gd name="connsiteX3" fmla="*/ 0 w 11786754"/>
+              <a:gd name="connsiteY3" fmla="*/ 6858000 h 6858000"/>
+            </a:gdLst>
+            <a:ahLst/>
+            <a:cxnLst>
+              <a:cxn ang="0">
+                <a:pos x="connsiteX0" y="connsiteY0"/>
+              </a:cxn>
+              <a:cxn ang="0">
+                <a:pos x="connsiteX1" y="connsiteY1"/>
+              </a:cxn>
+              <a:cxn ang="0">
+                <a:pos x="connsiteX2" y="connsiteY2"/>
+              </a:cxn>
+              <a:cxn ang="0">
+                <a:pos x="connsiteX3" y="connsiteY3"/>
+              </a:cxn>
+            </a:cxnLst>
+            <a:rect l="l" t="t" r="r" b="b"/>
+            <a:pathLst>
+              <a:path w="11786754" h="6858000">
+                <a:moveTo>
+                  <a:pt x="0" y="0"/>
+                </a:moveTo>
+                <a:lnTo>
+                  <a:pt x="8610600" y="0"/>
+                </a:lnTo>
+                <a:lnTo>
+                  <a:pt x="11786754" y="6858000"/>
+                </a:lnTo>
+                <a:lnTo>
+                  <a:pt x="0" y="6858000"/>
+                </a:lnTo>
+                <a:close/>
+              </a:path>
+            </a:pathLst>
+          </a:custGeom>
+          <a:solidFill>
+            <a:schemeClr val="bg1">
+              <a:alpha val="30000"/>
+            </a:schemeClr>
+          </a:solidFill>
+          <a:ln>
+            <a:noFill/>
+          </a:ln>
+        </p:spPr>
+        <p:style>
+          <a:lnRef idx="2">
+            <a:schemeClr val="accent1">
+              <a:shade val="50000"/>
+            </a:schemeClr>
+          </a:lnRef>
+          <a:fillRef idx="1">
+            <a:schemeClr val="accent1"/>
+          </a:fillRef>
+          <a:effectRef idx="0">
+            <a:schemeClr val="accent1"/>
+          </a:effectRef>
+          <a:fontRef idx="minor">
+            <a:schemeClr val="lt1"/>
+          </a:fontRef>
+        </p:style>
+        <p:txBody>
+          <a:bodyPr rtlCol="0" anchor="ctr"/>
+          <a:lstStyle/>
+          <a:p>
+            <a:pPr algn="ctr"/>
+            <a:endParaRPr lang="en-US"/>
+          </a:p>
+        </p:txBody>
+      </p:sp>
+      <p:sp>
+        <p:nvSpPr>
+          <p:cNvPr id="7" name="Freeform 11"/>
+          <p:cNvSpPr>
+            <a:spLocks noGrp="1" noRot="1" noChangeAspect="1" noMove="1" noResize="1" noEditPoints="1" noAdjustHandles="1" noChangeArrowheads="1" noChangeShapeType="1" noTextEdit="1"/>
+          </p:cNvSpPr>
+          <p:nvPr>
+            <p:extLst>
+              <p:ext uri="{386F3935-93C4-4BCD-93E2-E3B085C9AB24}">
+                <p16:designElem xmlns:p16="http://schemas.microsoft.com/office/powerpoint/2015/main" val="1"/>
+              </p:ext>
+            </p:extLst>
+          </p:nvPr>
+        </p:nvSpPr>
+        <p:spPr>
+          <a:xfrm>
+            <a:off x="0" y="0"/>
+            <a:ext cx="3581400" cy="6858000"/>
+          </a:xfrm>
+          <a:custGeom>
+            <a:avLst/>
+            <a:gdLst>
+              <a:gd name="connsiteX0" fmla="*/ 0 w 3581400"/>
+              <a:gd name="connsiteY0" fmla="*/ 0 h 6858000"/>
+              <a:gd name="connsiteX1" fmla="*/ 405246 w 3581400"/>
+              <a:gd name="connsiteY1" fmla="*/ 0 h 6858000"/>
+              <a:gd name="connsiteX2" fmla="*/ 3581400 w 3581400"/>
+              <a:gd name="connsiteY2" fmla="*/ 6858000 h 6858000"/>
+              <a:gd name="connsiteX3" fmla="*/ 0 w 3581400"/>
+              <a:gd name="connsiteY3" fmla="*/ 6858000 h 6858000"/>
+            </a:gdLst>
+            <a:ahLst/>
+            <a:cxnLst>
+              <a:cxn ang="0">
+                <a:pos x="connsiteX0" y="connsiteY0"/>
+              </a:cxn>
+              <a:cxn ang="0">
+                <a:pos x="connsiteX1" y="connsiteY1"/>
+              </a:cxn>
+              <a:cxn ang="0">
+                <a:pos x="connsiteX2" y="connsiteY2"/>
+              </a:cxn>
+              <a:cxn ang="0">
+                <a:pos x="connsiteX3" y="connsiteY3"/>
+              </a:cxn>
+            </a:cxnLst>
+            <a:rect l="l" t="t" r="r" b="b"/>
+            <a:pathLst>
+              <a:path w="3581400" h="6858000">
+                <a:moveTo>
+                  <a:pt x="0" y="0"/>
+                </a:moveTo>
+                <a:lnTo>
+                  <a:pt x="405246" y="0"/>
+                </a:lnTo>
+                <a:lnTo>
+                  <a:pt x="3581400" y="6858000"/>
+                </a:lnTo>
+                <a:lnTo>
+                  <a:pt x="0" y="6858000"/>
+                </a:lnTo>
+                <a:close/>
+              </a:path>
+            </a:pathLst>
+          </a:custGeom>
+          <a:solidFill>
+            <a:schemeClr val="bg1">
+              <a:alpha val="30000"/>
+            </a:schemeClr>
+          </a:solidFill>
+          <a:ln>
+            <a:noFill/>
+          </a:ln>
+        </p:spPr>
+        <p:style>
+          <a:lnRef idx="2">
+            <a:schemeClr val="accent1">
+              <a:shade val="50000"/>
+            </a:schemeClr>
+          </a:lnRef>
+          <a:fillRef idx="1">
+            <a:schemeClr val="accent1"/>
+          </a:fillRef>
+          <a:effectRef idx="0">
+            <a:schemeClr val="accent1"/>
+          </a:effectRef>
+          <a:fontRef idx="minor">
+            <a:schemeClr val="lt1"/>
+          </a:fontRef>
+        </p:style>
+        <p:txBody>
+          <a:bodyPr wrap="square" rtlCol="0" anchor="ctr">
+            <a:noAutofit/>
+          </a:bodyPr>
+          <a:lstStyle/>
+          <a:p>
+            <a:pPr algn="ctr"/>
+            <a:endParaRPr lang="en-US"/>
+          </a:p>
+        </p:txBody>
+      </p:sp>
+      <p:sp>
+        <p:nvSpPr>
+          <p:cNvPr id="2" name="Título 1"/>
+          <p:cNvSpPr>
+            <a:spLocks noGrp="1"/>
+          </p:cNvSpPr>
+          <p:nvPr>
+            <p:ph type="title"/>
+          </p:nvPr>
+        </p:nvSpPr>
+        <p:spPr>
+          <a:xfrm>
+            <a:off x="833002" y="365125"/>
+            <a:ext cx="10520702" cy="1325563"/>
+          </a:xfrm>
+        </p:spPr>
+        <p:txBody>
+          <a:bodyPr>
+            <a:normAutofit/>
+          </a:bodyPr>
+          <a:lstStyle/>
+          <a:p>
+            <a:r>
+              <a:rPr lang="es-ES" sz="5400" dirty="0"/>
+              <a:t>PYTHON: </a:t>
+            </a:r>
+            <a:r>
+              <a:rPr lang="es-ES" sz="5400" dirty="0" err="1"/>
+              <a:t>kNN</a:t>
+            </a:r>
+            <a:endParaRPr lang="es-ES" sz="6000" dirty="0"/>
+          </a:p>
+        </p:txBody>
+      </p:sp>
+      <p:sp>
+        <p:nvSpPr>
+          <p:cNvPr id="3" name="Marcador de contenido 2"/>
+          <p:cNvSpPr>
+            <a:spLocks noGrp="1"/>
+          </p:cNvSpPr>
+          <p:nvPr>
+            <p:ph idx="1"/>
+          </p:nvPr>
+        </p:nvSpPr>
+        <p:spPr>
+          <a:xfrm>
+            <a:off x="838201" y="1690689"/>
+            <a:ext cx="10515598" cy="4486274"/>
+          </a:xfrm>
+        </p:spPr>
+        <p:txBody>
+          <a:bodyPr>
+            <a:normAutofit/>
+          </a:bodyPr>
+          <a:lstStyle/>
+          <a:p>
+            <a:r>
+              <a:rPr lang="es-ES" dirty="0"/>
+              <a:t>Tenemos un par de parámetros para probar:</a:t>
+            </a:r>
+          </a:p>
+          <a:p>
+            <a:pPr lvl="1"/>
+            <a:r>
+              <a:rPr lang="es-ES" dirty="0"/>
+              <a:t>Número de vecinos (k)</a:t>
+            </a:r>
+          </a:p>
+          <a:p>
+            <a:pPr lvl="1"/>
+            <a:r>
+              <a:rPr lang="es-ES" dirty="0"/>
+              <a:t>Tipo de algoritmo a utilizar (automático, árbol KD, </a:t>
+            </a:r>
+            <a:r>
+              <a:rPr lang="es-ES" dirty="0" err="1"/>
+              <a:t>Ball</a:t>
+            </a:r>
+            <a:r>
+              <a:rPr lang="es-ES" dirty="0"/>
+              <a:t> </a:t>
+            </a:r>
+            <a:r>
+              <a:rPr lang="es-ES" dirty="0" err="1"/>
+              <a:t>Tree</a:t>
+            </a:r>
+            <a:r>
+              <a:rPr lang="es-ES" dirty="0"/>
+              <a:t> y por fuerza bruta)</a:t>
+            </a:r>
+          </a:p>
+          <a:p>
+            <a:r>
+              <a:rPr lang="es-ES" dirty="0"/>
+              <a:t>A 5 días, de nuevo, los mejores resultados</a:t>
+            </a:r>
+          </a:p>
+          <a:p>
+            <a:endParaRPr lang="es-ES" dirty="0"/>
+          </a:p>
+          <a:p>
+            <a:endParaRPr lang="es-ES" dirty="0"/>
+          </a:p>
+          <a:p>
+            <a:r>
+              <a:rPr lang="es-ES" dirty="0"/>
+              <a:t>Aun así, los resultados no son lo suficientemente buenos para poder predecir correctamente un índice de </a:t>
+            </a:r>
+            <a:r>
+              <a:rPr lang="es-ES"/>
+              <a:t>la bolsa</a:t>
+            </a:r>
+            <a:endParaRPr lang="es-ES" dirty="0"/>
+          </a:p>
+        </p:txBody>
+      </p:sp>
+      <p:graphicFrame>
+        <p:nvGraphicFramePr>
+          <p:cNvPr id="4" name="Tabla 3"/>
+          <p:cNvGraphicFramePr>
+            <a:graphicFrameLocks noGrp="1"/>
+          </p:cNvGraphicFramePr>
+          <p:nvPr>
+            <p:extLst>
+              <p:ext uri="{D42A27DB-BD31-4B8C-83A1-F6EECF244321}">
+                <p14:modId xmlns:p14="http://schemas.microsoft.com/office/powerpoint/2010/main" val="1116615763"/>
+              </p:ext>
+            </p:extLst>
+          </p:nvPr>
+        </p:nvGraphicFramePr>
+        <p:xfrm>
+          <a:off x="361952" y="3731417"/>
+          <a:ext cx="11424801" cy="631032"/>
+        </p:xfrm>
+        <a:graphic>
+          <a:graphicData uri="http://schemas.openxmlformats.org/drawingml/2006/table">
+            <a:tbl>
+              <a:tblPr>
+                <a:tableStyleId>{5C22544A-7EE6-4342-B048-85BDC9FD1C3A}</a:tableStyleId>
+              </a:tblPr>
+              <a:tblGrid>
+                <a:gridCol w="989428">
+                  <a:extLst>
+                    <a:ext uri="{9D8B030D-6E8A-4147-A177-3AD203B41FA5}">
+                      <a16:colId xmlns:a16="http://schemas.microsoft.com/office/drawing/2014/main" val="465769424"/>
+                    </a:ext>
+                  </a:extLst>
+                </a:gridCol>
+                <a:gridCol w="1422303">
+                  <a:extLst>
+                    <a:ext uri="{9D8B030D-6E8A-4147-A177-3AD203B41FA5}">
+                      <a16:colId xmlns:a16="http://schemas.microsoft.com/office/drawing/2014/main" val="4013346244"/>
+                    </a:ext>
+                  </a:extLst>
+                </a:gridCol>
+                <a:gridCol w="1020348">
+                  <a:extLst>
+                    <a:ext uri="{9D8B030D-6E8A-4147-A177-3AD203B41FA5}">
+                      <a16:colId xmlns:a16="http://schemas.microsoft.com/office/drawing/2014/main" val="2293026185"/>
+                    </a:ext>
+                  </a:extLst>
+                </a:gridCol>
+                <a:gridCol w="1283164">
+                  <a:extLst>
+                    <a:ext uri="{9D8B030D-6E8A-4147-A177-3AD203B41FA5}">
+                      <a16:colId xmlns:a16="http://schemas.microsoft.com/office/drawing/2014/main" val="3300136333"/>
+                    </a:ext>
+                  </a:extLst>
+                </a:gridCol>
+                <a:gridCol w="1267705">
+                  <a:extLst>
+                    <a:ext uri="{9D8B030D-6E8A-4147-A177-3AD203B41FA5}">
+                      <a16:colId xmlns:a16="http://schemas.microsoft.com/office/drawing/2014/main" val="4072895687"/>
+                    </a:ext>
+                  </a:extLst>
+                </a:gridCol>
+                <a:gridCol w="1375923">
+                  <a:extLst>
+                    <a:ext uri="{9D8B030D-6E8A-4147-A177-3AD203B41FA5}">
+                      <a16:colId xmlns:a16="http://schemas.microsoft.com/office/drawing/2014/main" val="468902643"/>
+                    </a:ext>
+                  </a:extLst>
+                </a:gridCol>
+                <a:gridCol w="1499602">
+                  <a:extLst>
+                    <a:ext uri="{9D8B030D-6E8A-4147-A177-3AD203B41FA5}">
+                      <a16:colId xmlns:a16="http://schemas.microsoft.com/office/drawing/2014/main" val="2084472353"/>
+                    </a:ext>
+                  </a:extLst>
+                </a:gridCol>
+                <a:gridCol w="1205865">
+                  <a:extLst>
+                    <a:ext uri="{9D8B030D-6E8A-4147-A177-3AD203B41FA5}">
+                      <a16:colId xmlns:a16="http://schemas.microsoft.com/office/drawing/2014/main" val="3063823974"/>
+                    </a:ext>
+                  </a:extLst>
+                </a:gridCol>
+                <a:gridCol w="1360463">
+                  <a:extLst>
+                    <a:ext uri="{9D8B030D-6E8A-4147-A177-3AD203B41FA5}">
+                      <a16:colId xmlns:a16="http://schemas.microsoft.com/office/drawing/2014/main" val="2654634803"/>
+                    </a:ext>
+                  </a:extLst>
+                </a:gridCol>
+              </a:tblGrid>
+              <a:tr h="315516">
+                <a:tc>
+                  <a:txBody>
+                    <a:bodyPr/>
+                    <a:lstStyle/>
+                    <a:p>
+                      <a:pPr algn="l" fontAlgn="b"/>
+                      <a:endParaRPr lang="es-ES" sz="1400" b="0" i="0" u="none" strike="noStrike" dirty="0">
+                        <a:solidFill>
+                          <a:srgbClr val="000000"/>
+                        </a:solidFill>
+                        <a:effectLst/>
+                        <a:latin typeface="Liberation Sans"/>
+                      </a:endParaRPr>
+                    </a:p>
+                  </a:txBody>
+                  <a:tcPr marL="9525" marR="9525" marT="9525" marB="0" anchor="b"/>
+                </a:tc>
+                <a:tc>
+                  <a:txBody>
+                    <a:bodyPr/>
+                    <a:lstStyle/>
+                    <a:p>
+                      <a:pPr algn="l" fontAlgn="b"/>
+                      <a:r>
+                        <a:rPr lang="es-ES" sz="1400" u="none" strike="noStrike" dirty="0">
+                          <a:effectLst/>
+                        </a:rPr>
+                        <a:t>1DayNormal</a:t>
+                      </a:r>
+                      <a:endParaRPr lang="es-ES" sz="1400" b="0" i="0" u="none" strike="noStrike" dirty="0">
+                        <a:solidFill>
+                          <a:srgbClr val="000000"/>
+                        </a:solidFill>
+                        <a:effectLst/>
+                        <a:latin typeface="Liberation Sans"/>
+                      </a:endParaRPr>
+                    </a:p>
+                  </a:txBody>
+                  <a:tcPr marL="9525" marR="9525" marT="9525" marB="0" anchor="b"/>
+                </a:tc>
+                <a:tc>
+                  <a:txBody>
+                    <a:bodyPr/>
+                    <a:lstStyle/>
+                    <a:p>
+                      <a:pPr algn="l" fontAlgn="b"/>
+                      <a:r>
+                        <a:rPr lang="es-ES" sz="1400" u="none" strike="noStrike" dirty="0">
+                          <a:effectLst/>
+                        </a:rPr>
+                        <a:t>1DayChange</a:t>
+                      </a:r>
+                      <a:endParaRPr lang="es-ES" sz="1400" b="0" i="0" u="none" strike="noStrike" dirty="0">
+                        <a:solidFill>
+                          <a:srgbClr val="000000"/>
+                        </a:solidFill>
+                        <a:effectLst/>
+                        <a:latin typeface="Liberation Sans"/>
+                      </a:endParaRPr>
+                    </a:p>
+                  </a:txBody>
+                  <a:tcPr marL="9525" marR="9525" marT="9525" marB="0" anchor="b"/>
+                </a:tc>
+                <a:tc>
+                  <a:txBody>
+                    <a:bodyPr/>
+                    <a:lstStyle/>
+                    <a:p>
+                      <a:pPr algn="l" fontAlgn="b"/>
+                      <a:r>
+                        <a:rPr lang="es-ES" sz="1400" u="none" strike="noStrike" dirty="0">
+                          <a:effectLst/>
+                        </a:rPr>
+                        <a:t>1DayRChange</a:t>
+                      </a:r>
+                      <a:endParaRPr lang="es-ES" sz="1400" b="0" i="0" u="none" strike="noStrike" dirty="0">
+                        <a:solidFill>
+                          <a:srgbClr val="000000"/>
+                        </a:solidFill>
+                        <a:effectLst/>
+                        <a:latin typeface="Liberation Sans"/>
+                      </a:endParaRPr>
+                    </a:p>
+                  </a:txBody>
+                  <a:tcPr marL="9525" marR="9525" marT="9525" marB="0" anchor="b"/>
+                </a:tc>
+                <a:tc>
+                  <a:txBody>
+                    <a:bodyPr/>
+                    <a:lstStyle/>
+                    <a:p>
+                      <a:pPr algn="l" fontAlgn="b"/>
+                      <a:r>
+                        <a:rPr lang="es-ES" sz="1400" u="none" strike="noStrike" dirty="0">
+                          <a:effectLst/>
+                        </a:rPr>
+                        <a:t>1DayNormalized</a:t>
+                      </a:r>
+                      <a:endParaRPr lang="es-ES" sz="1400" b="0" i="0" u="none" strike="noStrike" dirty="0">
+                        <a:solidFill>
+                          <a:srgbClr val="000000"/>
+                        </a:solidFill>
+                        <a:effectLst/>
+                        <a:latin typeface="Liberation Sans"/>
+                      </a:endParaRPr>
+                    </a:p>
+                  </a:txBody>
+                  <a:tcPr marL="9525" marR="9525" marT="9525" marB="0" anchor="b"/>
+                </a:tc>
+                <a:tc>
+                  <a:txBody>
+                    <a:bodyPr/>
+                    <a:lstStyle/>
+                    <a:p>
+                      <a:pPr algn="l" fontAlgn="b"/>
+                      <a:r>
+                        <a:rPr lang="es-ES" sz="1400" u="none" strike="noStrike" dirty="0">
+                          <a:effectLst/>
+                        </a:rPr>
+                        <a:t>5DaysNormal</a:t>
+                      </a:r>
+                      <a:endParaRPr lang="es-ES" sz="1400" b="0" i="0" u="none" strike="noStrike" dirty="0">
+                        <a:solidFill>
+                          <a:srgbClr val="000000"/>
+                        </a:solidFill>
+                        <a:effectLst/>
+                        <a:latin typeface="Liberation Sans"/>
+                      </a:endParaRPr>
+                    </a:p>
+                  </a:txBody>
+                  <a:tcPr marL="9525" marR="9525" marT="9525" marB="0" anchor="b"/>
+                </a:tc>
+                <a:tc>
+                  <a:txBody>
+                    <a:bodyPr/>
+                    <a:lstStyle/>
+                    <a:p>
+                      <a:pPr algn="l" fontAlgn="b"/>
+                      <a:r>
+                        <a:rPr lang="es-ES" sz="1400" u="none" strike="noStrike" dirty="0">
+                          <a:effectLst/>
+                        </a:rPr>
+                        <a:t>5DaysChange</a:t>
+                      </a:r>
+                      <a:endParaRPr lang="es-ES" sz="1400" b="0" i="0" u="none" strike="noStrike" dirty="0">
+                        <a:solidFill>
+                          <a:srgbClr val="000000"/>
+                        </a:solidFill>
+                        <a:effectLst/>
+                        <a:latin typeface="Liberation Sans"/>
+                      </a:endParaRPr>
+                    </a:p>
+                  </a:txBody>
+                  <a:tcPr marL="9525" marR="9525" marT="9525" marB="0" anchor="b"/>
+                </a:tc>
+                <a:tc>
+                  <a:txBody>
+                    <a:bodyPr/>
+                    <a:lstStyle/>
+                    <a:p>
+                      <a:pPr algn="l" fontAlgn="b"/>
+                      <a:r>
+                        <a:rPr lang="es-ES" sz="1400" u="none" strike="noStrike" dirty="0">
+                          <a:effectLst/>
+                        </a:rPr>
+                        <a:t>5DaysRChange</a:t>
+                      </a:r>
+                      <a:endParaRPr lang="es-ES" sz="1400" b="0" i="0" u="none" strike="noStrike" dirty="0">
+                        <a:solidFill>
+                          <a:srgbClr val="000000"/>
+                        </a:solidFill>
+                        <a:effectLst/>
+                        <a:latin typeface="Liberation Sans"/>
+                      </a:endParaRPr>
+                    </a:p>
+                  </a:txBody>
+                  <a:tcPr marL="9525" marR="9525" marT="9525" marB="0" anchor="b"/>
+                </a:tc>
+                <a:tc>
+                  <a:txBody>
+                    <a:bodyPr/>
+                    <a:lstStyle/>
+                    <a:p>
+                      <a:pPr algn="l" fontAlgn="b"/>
+                      <a:r>
+                        <a:rPr lang="es-ES" sz="1400" u="none" strike="noStrike" dirty="0">
+                          <a:effectLst/>
+                        </a:rPr>
+                        <a:t>5DaysNormalized</a:t>
+                      </a:r>
+                      <a:endParaRPr lang="es-ES" sz="1400" b="0" i="0" u="none" strike="noStrike" dirty="0">
+                        <a:solidFill>
+                          <a:srgbClr val="000000"/>
+                        </a:solidFill>
+                        <a:effectLst/>
+                        <a:latin typeface="Liberation Sans"/>
+                      </a:endParaRPr>
+                    </a:p>
+                  </a:txBody>
+                  <a:tcPr marL="9525" marR="9525" marT="9525" marB="0" anchor="b"/>
+                </a:tc>
+                <a:extLst>
+                  <a:ext uri="{0D108BD9-81ED-4DB2-BD59-A6C34878D82A}">
+                    <a16:rowId xmlns:a16="http://schemas.microsoft.com/office/drawing/2014/main" val="1352303788"/>
+                  </a:ext>
+                </a:extLst>
+              </a:tr>
+              <a:tr h="315516">
+                <a:tc>
+                  <a:txBody>
+                    <a:bodyPr/>
+                    <a:lstStyle/>
+                    <a:p>
+                      <a:pPr algn="l" fontAlgn="b"/>
+                      <a:r>
+                        <a:rPr lang="es-ES" sz="2000" u="none" strike="noStrike">
+                          <a:effectLst/>
+                        </a:rPr>
+                        <a:t>knn</a:t>
+                      </a:r>
+                      <a:endParaRPr lang="es-ES" sz="2000" b="0" i="0" u="none" strike="noStrike">
+                        <a:solidFill>
+                          <a:srgbClr val="000000"/>
+                        </a:solidFill>
+                        <a:effectLst/>
+                        <a:latin typeface="Liberation Sans"/>
+                      </a:endParaRPr>
+                    </a:p>
+                  </a:txBody>
+                  <a:tcPr marL="9525" marR="9525" marT="9525" marB="0" anchor="b"/>
+                </a:tc>
+                <a:tc>
+                  <a:txBody>
+                    <a:bodyPr/>
+                    <a:lstStyle/>
+                    <a:p>
+                      <a:pPr algn="r" fontAlgn="b"/>
+                      <a:r>
+                        <a:rPr lang="es-ES" sz="2000" u="none" strike="noStrike">
+                          <a:effectLst/>
+                        </a:rPr>
+                        <a:t>50,93%</a:t>
+                      </a:r>
+                      <a:endParaRPr lang="es-ES" sz="2000" b="0" i="0" u="none" strike="noStrike">
+                        <a:solidFill>
+                          <a:srgbClr val="000000"/>
+                        </a:solidFill>
+                        <a:effectLst/>
+                        <a:latin typeface="Liberation Sans"/>
+                      </a:endParaRPr>
+                    </a:p>
+                  </a:txBody>
+                  <a:tcPr marL="9525" marR="9525" marT="9525" marB="0" anchor="b"/>
+                </a:tc>
+                <a:tc>
+                  <a:txBody>
+                    <a:bodyPr/>
+                    <a:lstStyle/>
+                    <a:p>
+                      <a:pPr algn="r" fontAlgn="b"/>
+                      <a:r>
+                        <a:rPr lang="es-ES" sz="2000" u="none" strike="noStrike">
+                          <a:effectLst/>
+                        </a:rPr>
+                        <a:t>52,79%</a:t>
+                      </a:r>
+                      <a:endParaRPr lang="es-ES" sz="2000" b="0" i="0" u="none" strike="noStrike">
+                        <a:solidFill>
+                          <a:srgbClr val="000000"/>
+                        </a:solidFill>
+                        <a:effectLst/>
+                        <a:latin typeface="Liberation Sans"/>
+                      </a:endParaRPr>
+                    </a:p>
+                  </a:txBody>
+                  <a:tcPr marL="9525" marR="9525" marT="9525" marB="0" anchor="b"/>
+                </a:tc>
+                <a:tc>
+                  <a:txBody>
+                    <a:bodyPr/>
+                    <a:lstStyle/>
+                    <a:p>
+                      <a:pPr algn="r" fontAlgn="b"/>
+                      <a:r>
+                        <a:rPr lang="es-ES" sz="2000" u="none" strike="noStrike">
+                          <a:effectLst/>
+                        </a:rPr>
+                        <a:t>49,07%</a:t>
+                      </a:r>
+                      <a:endParaRPr lang="es-ES" sz="2000" b="0" i="0" u="none" strike="noStrike">
+                        <a:solidFill>
+                          <a:srgbClr val="000000"/>
+                        </a:solidFill>
+                        <a:effectLst/>
+                        <a:latin typeface="Liberation Sans"/>
+                      </a:endParaRPr>
+                    </a:p>
+                  </a:txBody>
+                  <a:tcPr marL="9525" marR="9525" marT="9525" marB="0" anchor="b"/>
+                </a:tc>
+                <a:tc>
+                  <a:txBody>
+                    <a:bodyPr/>
+                    <a:lstStyle/>
+                    <a:p>
+                      <a:pPr algn="r" fontAlgn="b"/>
+                      <a:r>
+                        <a:rPr lang="es-ES" sz="2000" u="none" strike="noStrike" dirty="0">
+                          <a:effectLst/>
+                        </a:rPr>
+                        <a:t>50,70%</a:t>
+                      </a:r>
+                      <a:endParaRPr lang="es-ES" sz="2000" b="0" i="0" u="none" strike="noStrike" dirty="0">
+                        <a:solidFill>
+                          <a:srgbClr val="000000"/>
+                        </a:solidFill>
+                        <a:effectLst/>
+                        <a:latin typeface="Liberation Sans"/>
+                      </a:endParaRPr>
+                    </a:p>
+                  </a:txBody>
+                  <a:tcPr marL="9525" marR="9525" marT="9525" marB="0" anchor="b"/>
+                </a:tc>
+                <a:tc>
+                  <a:txBody>
+                    <a:bodyPr/>
+                    <a:lstStyle/>
+                    <a:p>
+                      <a:pPr algn="r" fontAlgn="b"/>
+                      <a:r>
+                        <a:rPr lang="es-ES" sz="2000" u="none" strike="noStrike">
+                          <a:effectLst/>
+                        </a:rPr>
+                        <a:t>50,70%</a:t>
+                      </a:r>
+                      <a:endParaRPr lang="es-ES" sz="2000" b="0" i="0" u="none" strike="noStrike">
+                        <a:solidFill>
+                          <a:srgbClr val="000000"/>
+                        </a:solidFill>
+                        <a:effectLst/>
+                        <a:latin typeface="Liberation Sans"/>
+                      </a:endParaRPr>
+                    </a:p>
+                  </a:txBody>
+                  <a:tcPr marL="9525" marR="9525" marT="9525" marB="0" anchor="b"/>
+                </a:tc>
+                <a:tc>
+                  <a:txBody>
+                    <a:bodyPr/>
+                    <a:lstStyle/>
+                    <a:p>
+                      <a:pPr algn="r" fontAlgn="b"/>
+                      <a:r>
+                        <a:rPr lang="es-ES" sz="2000" u="none" strike="noStrike">
+                          <a:effectLst/>
+                        </a:rPr>
+                        <a:t>53,95%</a:t>
+                      </a:r>
+                      <a:endParaRPr lang="es-ES" sz="2000" b="0" i="0" u="none" strike="noStrike">
+                        <a:solidFill>
+                          <a:srgbClr val="000000"/>
+                        </a:solidFill>
+                        <a:effectLst/>
+                        <a:latin typeface="Liberation Sans"/>
+                      </a:endParaRPr>
+                    </a:p>
+                  </a:txBody>
+                  <a:tcPr marL="9525" marR="9525" marT="9525" marB="0" anchor="b"/>
+                </a:tc>
+                <a:tc>
+                  <a:txBody>
+                    <a:bodyPr/>
+                    <a:lstStyle/>
+                    <a:p>
+                      <a:pPr algn="r" fontAlgn="b"/>
+                      <a:r>
+                        <a:rPr lang="es-ES" sz="2000" u="none" strike="noStrike">
+                          <a:effectLst/>
+                        </a:rPr>
+                        <a:t>54,19%</a:t>
+                      </a:r>
+                      <a:endParaRPr lang="es-ES" sz="2000" b="0" i="0" u="none" strike="noStrike">
+                        <a:solidFill>
+                          <a:srgbClr val="000000"/>
+                        </a:solidFill>
+                        <a:effectLst/>
+                        <a:latin typeface="Liberation Sans"/>
+                      </a:endParaRPr>
+                    </a:p>
+                  </a:txBody>
+                  <a:tcPr marL="9525" marR="9525" marT="9525" marB="0" anchor="b"/>
+                </a:tc>
+                <a:tc>
+                  <a:txBody>
+                    <a:bodyPr/>
+                    <a:lstStyle/>
+                    <a:p>
+                      <a:pPr algn="r" fontAlgn="b"/>
+                      <a:r>
+                        <a:rPr lang="es-ES" sz="2000" u="none" strike="noStrike" dirty="0">
+                          <a:effectLst/>
+                        </a:rPr>
+                        <a:t>51,86%</a:t>
+                      </a:r>
+                      <a:endParaRPr lang="es-ES" sz="2000" b="0" i="0" u="none" strike="noStrike" dirty="0">
+                        <a:solidFill>
+                          <a:srgbClr val="000000"/>
+                        </a:solidFill>
+                        <a:effectLst/>
+                        <a:latin typeface="Liberation Sans"/>
+                      </a:endParaRPr>
+                    </a:p>
+                  </a:txBody>
+                  <a:tcPr marL="9525" marR="9525" marT="9525" marB="0" anchor="b"/>
+                </a:tc>
+                <a:extLst>
+                  <a:ext uri="{0D108BD9-81ED-4DB2-BD59-A6C34878D82A}">
+                    <a16:rowId xmlns:a16="http://schemas.microsoft.com/office/drawing/2014/main" val="3823845897"/>
+                  </a:ext>
+                </a:extLst>
+              </a:tr>
+            </a:tbl>
+          </a:graphicData>
+        </a:graphic>
+      </p:graphicFrame>
+    </p:spTree>
+    <p:extLst>
+      <p:ext uri="{BB962C8B-B14F-4D97-AF65-F5344CB8AC3E}">
+        <p14:creationId xmlns:p14="http://schemas.microsoft.com/office/powerpoint/2010/main" val="2405218555"/>
+      </p:ext>
+    </p:extLst>
+  </p:cSld>
+  <p:clrMapOvr>
+    <a:overrideClrMapping bg1="dk1" tx1="lt1" bg2="dk2" tx2="lt2" accent1="accent1" accent2="accent2" accent3="accent3" accent4="accent4" accent5="accent5" accent6="accent6" hlink="hlink" folHlink="folHlink"/>
   </p:clrMapOvr>
 </p:sld>
 </file>

</xml_diff>